<commit_message>
Updated Data Analysis Powerpoint
</commit_message>
<xml_diff>
--- a/D2-documentation/Data Analysis.pptx
+++ b/D2-documentation/Data Analysis.pptx
@@ -6321,7 +6321,7 @@
         <p:spPr>
           <a:xfrm>
             <a:off x="6136257" y="3151517"/>
-            <a:ext cx="1" cy="3272287"/>
+            <a:ext cx="0" cy="3007058"/>
           </a:xfrm>
           <a:prstGeom prst="straightConnector1">
             <a:avLst/>
@@ -6357,8 +6357,8 @@
         </p:nvSpPr>
         <p:spPr>
           <a:xfrm>
-            <a:off x="5005256" y="2718707"/>
-            <a:ext cx="1557313" cy="307777"/>
+            <a:off x="5244177" y="2658151"/>
+            <a:ext cx="1583799" cy="307777"/>
           </a:xfrm>
           <a:prstGeom prst="rect">
             <a:avLst/>
@@ -6371,11 +6371,53 @@
           <a:lstStyle/>
           <a:p>
             <a:r>
+              <a:rPr lang="en-US" sz="1400" dirty="0">
+                <a:latin typeface="Arial" panose="020B0604020202020204" pitchFamily="34" charset="0"/>
+                <a:cs typeface="Arial" panose="020B0604020202020204" pitchFamily="34" charset="0"/>
+              </a:rPr>
+              <a:t>A</a:t>
+            </a:r>
+            <a:r>
               <a:rPr lang="en-US" sz="1400" dirty="0" smtClean="0">
                 <a:latin typeface="Arial" panose="020B0604020202020204" pitchFamily="34" charset="0"/>
                 <a:cs typeface="Arial" panose="020B0604020202020204" pitchFamily="34" charset="0"/>
               </a:rPr>
-              <a:t>Manual Dexterity</a:t>
+              <a:t>dministrative</a:t>
+            </a:r>
+            <a:endParaRPr lang="en-US" sz="1400" dirty="0">
+              <a:latin typeface="Arial" panose="020B0604020202020204" pitchFamily="34" charset="0"/>
+              <a:cs typeface="Arial" panose="020B0604020202020204" pitchFamily="34" charset="0"/>
+            </a:endParaRPr>
+          </a:p>
+        </p:txBody>
+      </p:sp>
+      <p:sp>
+        <p:nvSpPr>
+          <p:cNvPr id="13" name="Rectangle 12"/>
+          <p:cNvSpPr/>
+          <p:nvPr/>
+        </p:nvSpPr>
+        <p:spPr>
+          <a:xfrm>
+            <a:off x="4850559" y="6093214"/>
+            <a:ext cx="1712011" cy="307777"/>
+          </a:xfrm>
+          <a:prstGeom prst="rect">
+            <a:avLst/>
+          </a:prstGeom>
+        </p:spPr>
+        <p:txBody>
+          <a:bodyPr wrap="square">
+            <a:spAutoFit/>
+          </a:bodyPr>
+          <a:lstStyle/>
+          <a:p>
+            <a:r>
+              <a:rPr lang="en-US" sz="1400" dirty="0" smtClean="0">
+                <a:latin typeface="Arial" panose="020B0604020202020204" pitchFamily="34" charset="0"/>
+                <a:cs typeface="Arial" panose="020B0604020202020204" pitchFamily="34" charset="0"/>
+              </a:rPr>
+              <a:t>Non-Administrative</a:t>
             </a:r>
             <a:endParaRPr lang="en-US" sz="1400" dirty="0">
               <a:latin typeface="Arial" panose="020B0604020202020204" pitchFamily="34" charset="0"/>
@@ -6539,7 +6581,7 @@
                 <a:latin typeface="Arial" panose="020B0604020202020204" pitchFamily="34" charset="0"/>
                 <a:cs typeface="Arial" panose="020B0604020202020204" pitchFamily="34" charset="0"/>
               </a:rPr>
-              <a:t>e can further explore the type of data collect and the reasoning behind it.</a:t>
+              <a:t>e can further explore the type of data collected and the reasoning behind it.</a:t>
             </a:r>
           </a:p>
           <a:p>
@@ -6651,7 +6693,7 @@
                 <a:latin typeface="Arial" panose="020B0604020202020204" pitchFamily="34" charset="0"/>
                 <a:cs typeface="Arial" panose="020B0604020202020204" pitchFamily="34" charset="0"/>
               </a:rPr>
-              <a:t>This was done for two reasons:</a:t>
+              <a:t>The logarithmic equation above was used for two reasons:</a:t>
             </a:r>
           </a:p>
           <a:p>
@@ -7087,7 +7129,7 @@
                 <a:latin typeface="Arial" panose="020B0604020202020204" pitchFamily="34" charset="0"/>
                 <a:cs typeface="Arial" panose="020B0604020202020204" pitchFamily="34" charset="0"/>
               </a:rPr>
-              <a:t>The SCRIPTS  folder contains the analysis and (RESULTS) for each variable where the graphs are also embed and located within the program itself</a:t>
+              <a:t>The SCRIPTS  folder contains the analysis and (RESULTS) for each variable where the graphs are also embed and located within the program itself, or within the PLOTS directory.</a:t>
             </a:r>
             <a:endParaRPr lang="en-US" sz="1400" dirty="0">
               <a:latin typeface="Arial" panose="020B0604020202020204" pitchFamily="34" charset="0"/>
@@ -7524,7 +7566,7 @@
                 <a:latin typeface="Arial" panose="020B0604020202020204" pitchFamily="34" charset="0"/>
                 <a:cs typeface="Arial" panose="020B0604020202020204" pitchFamily="34" charset="0"/>
               </a:rPr>
-              <a:t>The following slides represent the RESULT plots found in the SCRIPTS and PLOTS directories. </a:t>
+              <a:t>The following two slides represent the plots found in the SCRIPTS and PLOTS directories. </a:t>
             </a:r>
           </a:p>
           <a:p>
@@ -7536,7 +7578,7 @@
                 <a:latin typeface="Arial" panose="020B0604020202020204" pitchFamily="34" charset="0"/>
                 <a:cs typeface="Arial" panose="020B0604020202020204" pitchFamily="34" charset="0"/>
               </a:rPr>
-              <a:t>Please look within the PLOTS directory for more data.</a:t>
+              <a:t>More data can be found within the PLOTS directory:</a:t>
             </a:r>
           </a:p>
           <a:p>
@@ -7665,7 +7707,7 @@
                 <a:latin typeface="Arial" panose="020B0604020202020204" pitchFamily="34" charset="0"/>
                 <a:cs typeface="Arial" panose="020B0604020202020204" pitchFamily="34" charset="0"/>
               </a:rPr>
-              <a:t>We checked our scripts, and there seems to be a true bimodal distribution for the level 7 SOC categories. We believe this is a distribution for two types of labor, office vs non-office.</a:t>
+              <a:t>We checked our scripts, and there seems to be a true bimodal distribution for the level 6 SOC categories. We believe this is a distribution for two types of labor, administrative vs non-administrative.</a:t>
             </a:r>
           </a:p>
           <a:p>
@@ -7729,7 +7771,7 @@
                 <a:latin typeface="Arial" panose="020B0604020202020204" pitchFamily="34" charset="0"/>
                 <a:cs typeface="Arial" panose="020B0604020202020204" pitchFamily="34" charset="0"/>
               </a:rPr>
-              <a:t>Any other suggestions as to what other statistical measurements we can perform.</a:t>
+              <a:t>Any other suggestions as to what other statistical measurements we can perform would be appreciated?</a:t>
             </a:r>
           </a:p>
           <a:p>
@@ -7928,42 +7970,6 @@
           <a:chExt cx="0" cy="0"/>
         </a:xfrm>
       </p:grpSpPr>
-      <p:sp>
-        <p:nvSpPr>
-          <p:cNvPr id="2" name="Title 1"/>
-          <p:cNvSpPr>
-            <a:spLocks noGrp="1"/>
-          </p:cNvSpPr>
-          <p:nvPr>
-            <p:ph type="title"/>
-          </p:nvPr>
-        </p:nvSpPr>
-        <p:spPr>
-          <a:xfrm>
-            <a:off x="2301240" y="881554"/>
-            <a:ext cx="10515600" cy="447675"/>
-          </a:xfrm>
-        </p:spPr>
-        <p:txBody>
-          <a:bodyPr>
-            <a:normAutofit/>
-          </a:bodyPr>
-          <a:lstStyle/>
-          <a:p>
-            <a:r>
-              <a:rPr lang="en-US" sz="1400" b="1" dirty="0" smtClean="0">
-                <a:latin typeface="Arial" panose="020B0604020202020204" pitchFamily="34" charset="0"/>
-                <a:cs typeface="Arial" panose="020B0604020202020204" pitchFamily="34" charset="0"/>
-              </a:rPr>
-              <a:t>GENDER SOC LEVEL 1</a:t>
-            </a:r>
-            <a:endParaRPr lang="en-US" sz="1400" b="1" dirty="0">
-              <a:latin typeface="Arial" panose="020B0604020202020204" pitchFamily="34" charset="0"/>
-              <a:cs typeface="Arial" panose="020B0604020202020204" pitchFamily="34" charset="0"/>
-            </a:endParaRPr>
-          </a:p>
-        </p:txBody>
-      </p:sp>
       <p:pic>
         <p:nvPicPr>
           <p:cNvPr id="6" name="Picture 5"/>
@@ -7980,8 +7986,8 @@
         </p:blipFill>
         <p:spPr>
           <a:xfrm>
-            <a:off x="1139613" y="1630680"/>
-            <a:ext cx="4768427" cy="3576320"/>
+            <a:off x="96702" y="3549476"/>
+            <a:ext cx="3930952" cy="2948214"/>
           </a:xfrm>
           <a:prstGeom prst="rect">
             <a:avLst/>
@@ -8004,7 +8010,7 @@
         </p:blipFill>
         <p:spPr>
           <a:xfrm>
-            <a:off x="6446519" y="81280"/>
+            <a:off x="3824431" y="3432235"/>
             <a:ext cx="4253653" cy="3190240"/>
           </a:xfrm>
           <a:prstGeom prst="rect">
@@ -8028,7 +8034,7 @@
         </p:blipFill>
         <p:spPr>
           <a:xfrm>
-            <a:off x="6446519" y="3418840"/>
+            <a:off x="7802979" y="3432235"/>
             <a:ext cx="4253653" cy="3190240"/>
           </a:xfrm>
           <a:prstGeom prst="rect">
@@ -8097,6 +8103,164 @@
               <a:solidFill>
                 <a:schemeClr val="bg1"/>
               </a:solidFill>
+              <a:latin typeface="Arial" panose="020B0604020202020204" pitchFamily="34" charset="0"/>
+              <a:cs typeface="Arial" panose="020B0604020202020204" pitchFamily="34" charset="0"/>
+            </a:endParaRPr>
+          </a:p>
+        </p:txBody>
+      </p:sp>
+      <p:pic>
+        <p:nvPicPr>
+          <p:cNvPr id="12" name="Picture 11"/>
+          <p:cNvPicPr>
+            <a:picLocks noChangeAspect="1"/>
+          </p:cNvPicPr>
+          <p:nvPr/>
+        </p:nvPicPr>
+        <p:blipFill>
+          <a:blip r:embed="rId5"/>
+          <a:stretch>
+            <a:fillRect/>
+          </a:stretch>
+        </p:blipFill>
+        <p:spPr>
+          <a:xfrm>
+            <a:off x="4994565" y="675551"/>
+            <a:ext cx="6607498" cy="2873925"/>
+          </a:xfrm>
+          <a:prstGeom prst="rect">
+            <a:avLst/>
+          </a:prstGeom>
+        </p:spPr>
+      </p:pic>
+      <p:sp>
+        <p:nvSpPr>
+          <p:cNvPr id="14" name="TextBox 13"/>
+          <p:cNvSpPr txBox="1"/>
+          <p:nvPr/>
+        </p:nvSpPr>
+        <p:spPr>
+          <a:xfrm>
+            <a:off x="537028" y="1077903"/>
+            <a:ext cx="4355920" cy="2677656"/>
+          </a:xfrm>
+          <a:prstGeom prst="rect">
+            <a:avLst/>
+          </a:prstGeom>
+          <a:noFill/>
+        </p:spPr>
+        <p:txBody>
+          <a:bodyPr wrap="square" rtlCol="0">
+            <a:spAutoFit/>
+          </a:bodyPr>
+          <a:lstStyle/>
+          <a:p>
+            <a:r>
+              <a:rPr lang="en-US" sz="1400" dirty="0" smtClean="0">
+                <a:latin typeface="Arial" panose="020B0604020202020204" pitchFamily="34" charset="0"/>
+                <a:cs typeface="Arial" panose="020B0604020202020204" pitchFamily="34" charset="0"/>
+              </a:rPr>
+              <a:t>Since, the relative index is a function of:</a:t>
+            </a:r>
+          </a:p>
+          <a:p>
+            <a:pPr algn="ctr"/>
+            <a:r>
+              <a:rPr lang="en-US" sz="1400" dirty="0" smtClean="0">
+                <a:latin typeface="Arial" panose="020B0604020202020204" pitchFamily="34" charset="0"/>
+                <a:cs typeface="Arial" panose="020B0604020202020204" pitchFamily="34" charset="0"/>
+              </a:rPr>
+              <a:t> </a:t>
+            </a:r>
+            <a:r>
+              <a:rPr lang="en-US" sz="1400" dirty="0" err="1" smtClean="0">
+                <a:latin typeface="Arial" panose="020B0604020202020204" pitchFamily="34" charset="0"/>
+                <a:cs typeface="Arial" panose="020B0604020202020204" pitchFamily="34" charset="0"/>
+              </a:rPr>
+              <a:t>y</a:t>
+            </a:r>
+            <a:r>
+              <a:rPr lang="en-US" sz="1400" baseline="-25000" dirty="0" err="1" smtClean="0">
+                <a:latin typeface="Arial" panose="020B0604020202020204" pitchFamily="34" charset="0"/>
+                <a:cs typeface="Arial" panose="020B0604020202020204" pitchFamily="34" charset="0"/>
+              </a:rPr>
+              <a:t>log</a:t>
+            </a:r>
+            <a:r>
+              <a:rPr lang="en-US" sz="1400" dirty="0" smtClean="0">
+                <a:latin typeface="Arial" panose="020B0604020202020204" pitchFamily="34" charset="0"/>
+                <a:cs typeface="Arial" panose="020B0604020202020204" pitchFamily="34" charset="0"/>
+              </a:rPr>
+              <a:t>  =  [-1 * log10(</a:t>
+            </a:r>
+            <a:r>
+              <a:rPr lang="en-US" sz="1400" dirty="0" err="1" smtClean="0">
+                <a:latin typeface="Arial" panose="020B0604020202020204" pitchFamily="34" charset="0"/>
+                <a:cs typeface="Arial" panose="020B0604020202020204" pitchFamily="34" charset="0"/>
+              </a:rPr>
+              <a:t>y</a:t>
+            </a:r>
+            <a:r>
+              <a:rPr lang="en-US" sz="1400" baseline="-25000" dirty="0" err="1" smtClean="0">
+                <a:latin typeface="Arial" panose="020B0604020202020204" pitchFamily="34" charset="0"/>
+                <a:cs typeface="Arial" panose="020B0604020202020204" pitchFamily="34" charset="0"/>
+              </a:rPr>
+              <a:t>data</a:t>
+            </a:r>
+            <a:r>
+              <a:rPr lang="en-US" sz="1400" dirty="0" smtClean="0">
+                <a:latin typeface="Arial" panose="020B0604020202020204" pitchFamily="34" charset="0"/>
+                <a:cs typeface="Arial" panose="020B0604020202020204" pitchFamily="34" charset="0"/>
+              </a:rPr>
+              <a:t>)],</a:t>
+            </a:r>
+          </a:p>
+          <a:p>
+            <a:pPr algn="ctr"/>
+            <a:endParaRPr lang="en-US" sz="1400" dirty="0" smtClean="0">
+              <a:latin typeface="Arial" panose="020B0604020202020204" pitchFamily="34" charset="0"/>
+              <a:cs typeface="Arial" panose="020B0604020202020204" pitchFamily="34" charset="0"/>
+            </a:endParaRPr>
+          </a:p>
+          <a:p>
+            <a:r>
+              <a:rPr lang="en-US" sz="1400" dirty="0">
+                <a:latin typeface="Arial" panose="020B0604020202020204" pitchFamily="34" charset="0"/>
+                <a:cs typeface="Arial" panose="020B0604020202020204" pitchFamily="34" charset="0"/>
+              </a:rPr>
+              <a:t>t</a:t>
+            </a:r>
+            <a:r>
+              <a:rPr lang="en-US" sz="1400" dirty="0" smtClean="0">
+                <a:latin typeface="Arial" panose="020B0604020202020204" pitchFamily="34" charset="0"/>
+                <a:cs typeface="Arial" panose="020B0604020202020204" pitchFamily="34" charset="0"/>
+              </a:rPr>
+              <a:t>hen a higher relative log index, correlates to a small fatality/injury rate.</a:t>
+            </a:r>
+          </a:p>
+          <a:p>
+            <a:endParaRPr lang="en-US" sz="1400" dirty="0">
+              <a:latin typeface="Arial" panose="020B0604020202020204" pitchFamily="34" charset="0"/>
+              <a:cs typeface="Arial" panose="020B0604020202020204" pitchFamily="34" charset="0"/>
+            </a:endParaRPr>
+          </a:p>
+          <a:p>
+            <a:r>
+              <a:rPr lang="en-US" sz="1400" dirty="0" smtClean="0">
+                <a:latin typeface="Arial" panose="020B0604020202020204" pitchFamily="34" charset="0"/>
+                <a:cs typeface="Arial" panose="020B0604020202020204" pitchFamily="34" charset="0"/>
+              </a:rPr>
+              <a:t>Since the categories on the x axis are ranked from left to right with increasing job risk. We can see a positive slope, that indicates that people with a higher perception of risk have a lower fatality rate.</a:t>
+            </a:r>
+          </a:p>
+          <a:p>
+            <a:endParaRPr lang="en-US" sz="1400" dirty="0">
+              <a:latin typeface="Arial" panose="020B0604020202020204" pitchFamily="34" charset="0"/>
+              <a:cs typeface="Arial" panose="020B0604020202020204" pitchFamily="34" charset="0"/>
+            </a:endParaRPr>
+          </a:p>
+          <a:p>
+            <a:endParaRPr lang="en-US" sz="1400" dirty="0" smtClean="0">
               <a:latin typeface="Arial" panose="020B0604020202020204" pitchFamily="34" charset="0"/>
               <a:cs typeface="Arial" panose="020B0604020202020204" pitchFamily="34" charset="0"/>
             </a:endParaRPr>

</xml_diff>

<commit_message>
fixed bimodel error, the error was in the array count init values, removed level_6 analysis
</commit_message>
<xml_diff>
--- a/D2-documentation/Data Analysis.pptx
+++ b/D2-documentation/Data Analysis.pptx
@@ -5,7 +5,7 @@
     <p:sldMasterId id="2147483648" r:id="rId1"/>
   </p:sldMasterIdLst>
   <p:notesMasterIdLst>
-    <p:notesMasterId r:id="rId11"/>
+    <p:notesMasterId r:id="rId10"/>
   </p:notesMasterIdLst>
   <p:sldIdLst>
     <p:sldId id="439" r:id="rId2"/>
@@ -16,7 +16,6 @@
     <p:sldId id="452" r:id="rId7"/>
     <p:sldId id="460" r:id="rId8"/>
     <p:sldId id="457" r:id="rId9"/>
-    <p:sldId id="459" r:id="rId10"/>
   </p:sldIdLst>
   <p:sldSz cx="12192000" cy="6858000"/>
   <p:notesSz cx="6858000" cy="9144000"/>
@@ -7703,24 +7702,114 @@
               <a:buAutoNum type="arabicParenR"/>
             </a:pPr>
             <a:r>
+              <a:rPr lang="en-US" sz="1400" dirty="0">
+                <a:latin typeface="Arial" panose="020B0604020202020204" pitchFamily="34" charset="0"/>
+                <a:cs typeface="Arial" panose="020B0604020202020204" pitchFamily="34" charset="0"/>
+              </a:rPr>
+              <a:t>Since, the relative index is a function </a:t>
+            </a:r>
+            <a:r>
               <a:rPr lang="en-US" sz="1400" dirty="0" smtClean="0">
                 <a:latin typeface="Arial" panose="020B0604020202020204" pitchFamily="34" charset="0"/>
                 <a:cs typeface="Arial" panose="020B0604020202020204" pitchFamily="34" charset="0"/>
               </a:rPr>
-              <a:t>We checked our scripts, and there seems to be a true bimodal distribution for the level 6 SOC categories. We believe this is a distribution for two types of labor, administrative vs non-administrative.</a:t>
-            </a:r>
-          </a:p>
-          <a:p>
-            <a:pPr marL="342900" indent="-342900">
-              <a:buAutoNum type="arabicParenR"/>
-            </a:pPr>
+              <a:t>of, </a:t>
+            </a:r>
+            <a:r>
+              <a:rPr lang="en-US" sz="1400" dirty="0" err="1" smtClean="0">
+                <a:latin typeface="Arial" panose="020B0604020202020204" pitchFamily="34" charset="0"/>
+                <a:cs typeface="Arial" panose="020B0604020202020204" pitchFamily="34" charset="0"/>
+              </a:rPr>
+              <a:t>y</a:t>
+            </a:r>
+            <a:r>
+              <a:rPr lang="en-US" sz="1400" baseline="-25000" dirty="0" err="1" smtClean="0">
+                <a:latin typeface="Arial" panose="020B0604020202020204" pitchFamily="34" charset="0"/>
+                <a:cs typeface="Arial" panose="020B0604020202020204" pitchFamily="34" charset="0"/>
+              </a:rPr>
+              <a:t>log</a:t>
+            </a:r>
             <a:r>
               <a:rPr lang="en-US" sz="1400" dirty="0" smtClean="0">
                 <a:latin typeface="Arial" panose="020B0604020202020204" pitchFamily="34" charset="0"/>
                 <a:cs typeface="Arial" panose="020B0604020202020204" pitchFamily="34" charset="0"/>
               </a:rPr>
-              <a:t>We plan on separating the data sets, and confirming the above, by performing two level 1 analysis for the two distributions of labor type.</a:t>
-            </a:r>
+              <a:t>  </a:t>
+            </a:r>
+            <a:r>
+              <a:rPr lang="en-US" sz="1400" dirty="0">
+                <a:latin typeface="Arial" panose="020B0604020202020204" pitchFamily="34" charset="0"/>
+                <a:cs typeface="Arial" panose="020B0604020202020204" pitchFamily="34" charset="0"/>
+              </a:rPr>
+              <a:t>=  [-1 * log10(</a:t>
+            </a:r>
+            <a:r>
+              <a:rPr lang="en-US" sz="1400" dirty="0" err="1">
+                <a:latin typeface="Arial" panose="020B0604020202020204" pitchFamily="34" charset="0"/>
+                <a:cs typeface="Arial" panose="020B0604020202020204" pitchFamily="34" charset="0"/>
+              </a:rPr>
+              <a:t>y</a:t>
+            </a:r>
+            <a:r>
+              <a:rPr lang="en-US" sz="1400" baseline="-25000" dirty="0" err="1">
+                <a:latin typeface="Arial" panose="020B0604020202020204" pitchFamily="34" charset="0"/>
+                <a:cs typeface="Arial" panose="020B0604020202020204" pitchFamily="34" charset="0"/>
+              </a:rPr>
+              <a:t>data</a:t>
+            </a:r>
+            <a:r>
+              <a:rPr lang="en-US" sz="1400" dirty="0" smtClean="0">
+                <a:latin typeface="Arial" panose="020B0604020202020204" pitchFamily="34" charset="0"/>
+                <a:cs typeface="Arial" panose="020B0604020202020204" pitchFamily="34" charset="0"/>
+              </a:rPr>
+              <a:t>)], then </a:t>
+            </a:r>
+            <a:r>
+              <a:rPr lang="en-US" sz="1400" dirty="0">
+                <a:latin typeface="Arial" panose="020B0604020202020204" pitchFamily="34" charset="0"/>
+                <a:cs typeface="Arial" panose="020B0604020202020204" pitchFamily="34" charset="0"/>
+              </a:rPr>
+              <a:t>a higher relative log </a:t>
+            </a:r>
+            <a:r>
+              <a:rPr lang="en-US" sz="1400" dirty="0" smtClean="0">
+                <a:latin typeface="Arial" panose="020B0604020202020204" pitchFamily="34" charset="0"/>
+                <a:cs typeface="Arial" panose="020B0604020202020204" pitchFamily="34" charset="0"/>
+              </a:rPr>
+              <a:t>index value </a:t>
+            </a:r>
+            <a:r>
+              <a:rPr lang="en-US" sz="1400" dirty="0">
+                <a:latin typeface="Arial" panose="020B0604020202020204" pitchFamily="34" charset="0"/>
+                <a:cs typeface="Arial" panose="020B0604020202020204" pitchFamily="34" charset="0"/>
+              </a:rPr>
+              <a:t>correlates to a small fatality/injury </a:t>
+            </a:r>
+            <a:r>
+              <a:rPr lang="en-US" sz="1400" dirty="0" smtClean="0">
+                <a:latin typeface="Arial" panose="020B0604020202020204" pitchFamily="34" charset="0"/>
+                <a:cs typeface="Arial" panose="020B0604020202020204" pitchFamily="34" charset="0"/>
+              </a:rPr>
+              <a:t>rate. Since </a:t>
+            </a:r>
+            <a:r>
+              <a:rPr lang="en-US" sz="1400" dirty="0">
+                <a:latin typeface="Arial" panose="020B0604020202020204" pitchFamily="34" charset="0"/>
+                <a:cs typeface="Arial" panose="020B0604020202020204" pitchFamily="34" charset="0"/>
+              </a:rPr>
+              <a:t>the categories on the x axis are ranked from left to right with increasing job risk. We can see a positive slope, that indicates that people with a higher perception of risk have a lower fatality rate</a:t>
+            </a:r>
+            <a:r>
+              <a:rPr lang="en-US" sz="1400" dirty="0" smtClean="0">
+                <a:latin typeface="Arial" panose="020B0604020202020204" pitchFamily="34" charset="0"/>
+                <a:cs typeface="Arial" panose="020B0604020202020204" pitchFamily="34" charset="0"/>
+              </a:rPr>
+              <a:t>.</a:t>
+            </a:r>
+            <a:endParaRPr lang="en-US" sz="1400" dirty="0">
+              <a:latin typeface="Arial" panose="020B0604020202020204" pitchFamily="34" charset="0"/>
+              <a:cs typeface="Arial" panose="020B0604020202020204" pitchFamily="34" charset="0"/>
+            </a:endParaRPr>
           </a:p>
           <a:p>
             <a:pPr marL="342900" indent="-342900">
@@ -7986,8 +8075,8 @@
         </p:blipFill>
         <p:spPr>
           <a:xfrm>
-            <a:off x="96702" y="3549476"/>
-            <a:ext cx="3930952" cy="2948214"/>
+            <a:off x="48253" y="3440971"/>
+            <a:ext cx="4267078" cy="3200309"/>
           </a:xfrm>
           <a:prstGeom prst="rect">
             <a:avLst/>
@@ -8010,7 +8099,7 @@
         </p:blipFill>
         <p:spPr>
           <a:xfrm>
-            <a:off x="3824431" y="3432235"/>
+            <a:off x="3945546" y="3432235"/>
             <a:ext cx="4253653" cy="3190240"/>
           </a:xfrm>
           <a:prstGeom prst="rect">
@@ -8034,7 +8123,7 @@
         </p:blipFill>
         <p:spPr>
           <a:xfrm>
-            <a:off x="7802979" y="3432235"/>
+            <a:off x="7821147" y="3432235"/>
             <a:ext cx="4253653" cy="3190240"/>
           </a:xfrm>
           <a:prstGeom prst="rect">
@@ -8125,12 +8214,17 @@
         </p:blipFill>
         <p:spPr>
           <a:xfrm>
-            <a:off x="4994565" y="675551"/>
+            <a:off x="5006677" y="675551"/>
             <a:ext cx="6607498" cy="2873925"/>
           </a:xfrm>
           <a:prstGeom prst="rect">
             <a:avLst/>
           </a:prstGeom>
+          <a:ln>
+            <a:solidFill>
+              <a:schemeClr val="tx1"/>
+            </a:solidFill>
+          </a:ln>
         </p:spPr>
       </p:pic>
       <p:sp>
@@ -8141,8 +8235,190 @@
         </p:nvSpPr>
         <p:spPr>
           <a:xfrm>
-            <a:off x="537028" y="1077903"/>
-            <a:ext cx="4355920" cy="2677656"/>
+            <a:off x="537028" y="675550"/>
+            <a:ext cx="4361976" cy="2893100"/>
+          </a:xfrm>
+          <a:prstGeom prst="rect">
+            <a:avLst/>
+          </a:prstGeom>
+          <a:noFill/>
+          <a:ln>
+            <a:solidFill>
+              <a:schemeClr val="tx1"/>
+            </a:solidFill>
+          </a:ln>
+        </p:spPr>
+        <p:txBody>
+          <a:bodyPr wrap="square" rtlCol="0">
+            <a:spAutoFit/>
+          </a:bodyPr>
+          <a:lstStyle/>
+          <a:p>
+            <a:endParaRPr lang="en-US" sz="1400" dirty="0">
+              <a:latin typeface="Arial" panose="020B0604020202020204" pitchFamily="34" charset="0"/>
+              <a:cs typeface="Arial" panose="020B0604020202020204" pitchFamily="34" charset="0"/>
+            </a:endParaRPr>
+          </a:p>
+          <a:p>
+            <a:r>
+              <a:rPr lang="en-US" sz="1400" dirty="0" smtClean="0">
+                <a:latin typeface="Arial" panose="020B0604020202020204" pitchFamily="34" charset="0"/>
+                <a:cs typeface="Arial" panose="020B0604020202020204" pitchFamily="34" charset="0"/>
+              </a:rPr>
+              <a:t>Since, the relative index is a function of:</a:t>
+            </a:r>
+          </a:p>
+          <a:p>
+            <a:endParaRPr lang="en-US" sz="1400" dirty="0" smtClean="0">
+              <a:latin typeface="Arial" panose="020B0604020202020204" pitchFamily="34" charset="0"/>
+              <a:cs typeface="Arial" panose="020B0604020202020204" pitchFamily="34" charset="0"/>
+            </a:endParaRPr>
+          </a:p>
+          <a:p>
+            <a:pPr algn="ctr"/>
+            <a:r>
+              <a:rPr lang="en-US" sz="1400" dirty="0" smtClean="0">
+                <a:latin typeface="Arial" panose="020B0604020202020204" pitchFamily="34" charset="0"/>
+                <a:cs typeface="Arial" panose="020B0604020202020204" pitchFamily="34" charset="0"/>
+              </a:rPr>
+              <a:t> </a:t>
+            </a:r>
+            <a:r>
+              <a:rPr lang="en-US" sz="1400" dirty="0" err="1" smtClean="0">
+                <a:latin typeface="Arial" panose="020B0604020202020204" pitchFamily="34" charset="0"/>
+                <a:cs typeface="Arial" panose="020B0604020202020204" pitchFamily="34" charset="0"/>
+              </a:rPr>
+              <a:t>y</a:t>
+            </a:r>
+            <a:r>
+              <a:rPr lang="en-US" sz="1400" baseline="-25000" dirty="0" err="1" smtClean="0">
+                <a:latin typeface="Arial" panose="020B0604020202020204" pitchFamily="34" charset="0"/>
+                <a:cs typeface="Arial" panose="020B0604020202020204" pitchFamily="34" charset="0"/>
+              </a:rPr>
+              <a:t>log</a:t>
+            </a:r>
+            <a:r>
+              <a:rPr lang="en-US" sz="1400" dirty="0" smtClean="0">
+                <a:latin typeface="Arial" panose="020B0604020202020204" pitchFamily="34" charset="0"/>
+                <a:cs typeface="Arial" panose="020B0604020202020204" pitchFamily="34" charset="0"/>
+              </a:rPr>
+              <a:t>  =  [-1 * log10(</a:t>
+            </a:r>
+            <a:r>
+              <a:rPr lang="en-US" sz="1400" dirty="0" err="1" smtClean="0">
+                <a:latin typeface="Arial" panose="020B0604020202020204" pitchFamily="34" charset="0"/>
+                <a:cs typeface="Arial" panose="020B0604020202020204" pitchFamily="34" charset="0"/>
+              </a:rPr>
+              <a:t>y</a:t>
+            </a:r>
+            <a:r>
+              <a:rPr lang="en-US" sz="1400" baseline="-25000" dirty="0" err="1" smtClean="0">
+                <a:latin typeface="Arial" panose="020B0604020202020204" pitchFamily="34" charset="0"/>
+                <a:cs typeface="Arial" panose="020B0604020202020204" pitchFamily="34" charset="0"/>
+              </a:rPr>
+              <a:t>data</a:t>
+            </a:r>
+            <a:r>
+              <a:rPr lang="en-US" sz="1400" dirty="0" smtClean="0">
+                <a:latin typeface="Arial" panose="020B0604020202020204" pitchFamily="34" charset="0"/>
+                <a:cs typeface="Arial" panose="020B0604020202020204" pitchFamily="34" charset="0"/>
+              </a:rPr>
+              <a:t>)],</a:t>
+            </a:r>
+          </a:p>
+          <a:p>
+            <a:pPr algn="ctr"/>
+            <a:endParaRPr lang="en-US" sz="1400" dirty="0" smtClean="0">
+              <a:latin typeface="Arial" panose="020B0604020202020204" pitchFamily="34" charset="0"/>
+              <a:cs typeface="Arial" panose="020B0604020202020204" pitchFamily="34" charset="0"/>
+            </a:endParaRPr>
+          </a:p>
+          <a:p>
+            <a:r>
+              <a:rPr lang="en-US" sz="1400" dirty="0">
+                <a:latin typeface="Arial" panose="020B0604020202020204" pitchFamily="34" charset="0"/>
+                <a:cs typeface="Arial" panose="020B0604020202020204" pitchFamily="34" charset="0"/>
+              </a:rPr>
+              <a:t>t</a:t>
+            </a:r>
+            <a:r>
+              <a:rPr lang="en-US" sz="1400" dirty="0" smtClean="0">
+                <a:latin typeface="Arial" panose="020B0604020202020204" pitchFamily="34" charset="0"/>
+                <a:cs typeface="Arial" panose="020B0604020202020204" pitchFamily="34" charset="0"/>
+              </a:rPr>
+              <a:t>hen a higher relative log index, correlates to a small fatality/injury rate.</a:t>
+            </a:r>
+          </a:p>
+          <a:p>
+            <a:endParaRPr lang="en-US" sz="1400" dirty="0">
+              <a:latin typeface="Arial" panose="020B0604020202020204" pitchFamily="34" charset="0"/>
+              <a:cs typeface="Arial" panose="020B0604020202020204" pitchFamily="34" charset="0"/>
+            </a:endParaRPr>
+          </a:p>
+          <a:p>
+            <a:r>
+              <a:rPr lang="en-US" sz="1400" dirty="0" smtClean="0">
+                <a:latin typeface="Arial" panose="020B0604020202020204" pitchFamily="34" charset="0"/>
+                <a:cs typeface="Arial" panose="020B0604020202020204" pitchFamily="34" charset="0"/>
+              </a:rPr>
+              <a:t>Since the categories on the x axis are ranked from left to right with increasing job risk. We can see a positive slope, that indicates that people with a higher perception of risk have a lower fatality rate.</a:t>
+            </a:r>
+          </a:p>
+          <a:p>
+            <a:endParaRPr lang="en-US" sz="1400" dirty="0" smtClean="0">
+              <a:latin typeface="Arial" panose="020B0604020202020204" pitchFamily="34" charset="0"/>
+              <a:cs typeface="Arial" panose="020B0604020202020204" pitchFamily="34" charset="0"/>
+            </a:endParaRPr>
+          </a:p>
+        </p:txBody>
+      </p:sp>
+      <p:cxnSp>
+        <p:nvCxnSpPr>
+          <p:cNvPr id="15" name="Straight Arrow Connector 14"/>
+          <p:cNvCxnSpPr/>
+          <p:nvPr/>
+        </p:nvCxnSpPr>
+        <p:spPr>
+          <a:xfrm>
+            <a:off x="1429128" y="6630913"/>
+            <a:ext cx="2410141" cy="9727"/>
+          </a:xfrm>
+          <a:prstGeom prst="straightConnector1">
+            <a:avLst/>
+          </a:prstGeom>
+          <a:ln w="25400">
+            <a:solidFill>
+              <a:schemeClr val="tx1"/>
+            </a:solidFill>
+            <a:prstDash val="dash"/>
+            <a:tailEnd type="triangle" w="lg" len="lg"/>
+          </a:ln>
+        </p:spPr>
+        <p:style>
+          <a:lnRef idx="1">
+            <a:schemeClr val="accent1"/>
+          </a:lnRef>
+          <a:fillRef idx="0">
+            <a:schemeClr val="accent1"/>
+          </a:fillRef>
+          <a:effectRef idx="0">
+            <a:schemeClr val="accent1"/>
+          </a:effectRef>
+          <a:fontRef idx="minor">
+            <a:schemeClr val="tx1"/>
+          </a:fontRef>
+        </p:style>
+      </p:cxnSp>
+      <p:sp>
+        <p:nvSpPr>
+          <p:cNvPr id="19" name="TextBox 18"/>
+          <p:cNvSpPr txBox="1"/>
+          <p:nvPr/>
+        </p:nvSpPr>
+        <p:spPr>
+          <a:xfrm>
+            <a:off x="708508" y="6468586"/>
+            <a:ext cx="463588" cy="307777"/>
           </a:xfrm>
           <a:prstGeom prst="rect">
             <a:avLst/>
@@ -8150,7 +8426,7 @@
           <a:noFill/>
         </p:spPr>
         <p:txBody>
-          <a:bodyPr wrap="square" rtlCol="0">
+          <a:bodyPr wrap="none" rtlCol="0">
             <a:spAutoFit/>
           </a:bodyPr>
           <a:lstStyle/>
@@ -8160,322 +8436,19 @@
                 <a:latin typeface="Arial" panose="020B0604020202020204" pitchFamily="34" charset="0"/>
                 <a:cs typeface="Arial" panose="020B0604020202020204" pitchFamily="34" charset="0"/>
               </a:rPr>
-              <a:t>Since, the relative index is a function of:</a:t>
-            </a:r>
-          </a:p>
-          <a:p>
-            <a:pPr algn="ctr"/>
-            <a:r>
-              <a:rPr lang="en-US" sz="1400" dirty="0" smtClean="0">
-                <a:latin typeface="Arial" panose="020B0604020202020204" pitchFamily="34" charset="0"/>
-                <a:cs typeface="Arial" panose="020B0604020202020204" pitchFamily="34" charset="0"/>
-              </a:rPr>
-              <a:t> </a:t>
-            </a:r>
-            <a:r>
-              <a:rPr lang="en-US" sz="1400" dirty="0" err="1" smtClean="0">
-                <a:latin typeface="Arial" panose="020B0604020202020204" pitchFamily="34" charset="0"/>
-                <a:cs typeface="Arial" panose="020B0604020202020204" pitchFamily="34" charset="0"/>
-              </a:rPr>
-              <a:t>y</a:t>
-            </a:r>
-            <a:r>
-              <a:rPr lang="en-US" sz="1400" baseline="-25000" dirty="0" err="1" smtClean="0">
-                <a:latin typeface="Arial" panose="020B0604020202020204" pitchFamily="34" charset="0"/>
-                <a:cs typeface="Arial" panose="020B0604020202020204" pitchFamily="34" charset="0"/>
-              </a:rPr>
-              <a:t>log</a:t>
-            </a:r>
-            <a:r>
-              <a:rPr lang="en-US" sz="1400" dirty="0" smtClean="0">
-                <a:latin typeface="Arial" panose="020B0604020202020204" pitchFamily="34" charset="0"/>
-                <a:cs typeface="Arial" panose="020B0604020202020204" pitchFamily="34" charset="0"/>
-              </a:rPr>
-              <a:t>  =  [-1 * log10(</a:t>
-            </a:r>
-            <a:r>
-              <a:rPr lang="en-US" sz="1400" dirty="0" err="1" smtClean="0">
-                <a:latin typeface="Arial" panose="020B0604020202020204" pitchFamily="34" charset="0"/>
-                <a:cs typeface="Arial" panose="020B0604020202020204" pitchFamily="34" charset="0"/>
-              </a:rPr>
-              <a:t>y</a:t>
-            </a:r>
-            <a:r>
-              <a:rPr lang="en-US" sz="1400" baseline="-25000" dirty="0" err="1" smtClean="0">
-                <a:latin typeface="Arial" panose="020B0604020202020204" pitchFamily="34" charset="0"/>
-                <a:cs typeface="Arial" panose="020B0604020202020204" pitchFamily="34" charset="0"/>
-              </a:rPr>
-              <a:t>data</a:t>
-            </a:r>
-            <a:r>
-              <a:rPr lang="en-US" sz="1400" dirty="0" smtClean="0">
-                <a:latin typeface="Arial" panose="020B0604020202020204" pitchFamily="34" charset="0"/>
-                <a:cs typeface="Arial" panose="020B0604020202020204" pitchFamily="34" charset="0"/>
-              </a:rPr>
-              <a:t>)],</a:t>
-            </a:r>
-          </a:p>
-          <a:p>
-            <a:pPr algn="ctr"/>
-            <a:endParaRPr lang="en-US" sz="1400" dirty="0" smtClean="0">
-              <a:latin typeface="Arial" panose="020B0604020202020204" pitchFamily="34" charset="0"/>
-              <a:cs typeface="Arial" panose="020B0604020202020204" pitchFamily="34" charset="0"/>
-            </a:endParaRPr>
-          </a:p>
-          <a:p>
-            <a:r>
-              <a:rPr lang="en-US" sz="1400" dirty="0">
-                <a:latin typeface="Arial" panose="020B0604020202020204" pitchFamily="34" charset="0"/>
-                <a:cs typeface="Arial" panose="020B0604020202020204" pitchFamily="34" charset="0"/>
-              </a:rPr>
-              <a:t>t</a:t>
-            </a:r>
-            <a:r>
-              <a:rPr lang="en-US" sz="1400" dirty="0" smtClean="0">
-                <a:latin typeface="Arial" panose="020B0604020202020204" pitchFamily="34" charset="0"/>
-                <a:cs typeface="Arial" panose="020B0604020202020204" pitchFamily="34" charset="0"/>
-              </a:rPr>
-              <a:t>hen a higher relative log index, correlates to a small fatality/injury rate.</a:t>
-            </a:r>
-          </a:p>
-          <a:p>
+              <a:t>risk</a:t>
+            </a:r>
             <a:endParaRPr lang="en-US" sz="1400" dirty="0">
               <a:latin typeface="Arial" panose="020B0604020202020204" pitchFamily="34" charset="0"/>
               <a:cs typeface="Arial" panose="020B0604020202020204" pitchFamily="34" charset="0"/>
             </a:endParaRPr>
           </a:p>
-          <a:p>
-            <a:r>
-              <a:rPr lang="en-US" sz="1400" dirty="0" smtClean="0">
-                <a:latin typeface="Arial" panose="020B0604020202020204" pitchFamily="34" charset="0"/>
-                <a:cs typeface="Arial" panose="020B0604020202020204" pitchFamily="34" charset="0"/>
-              </a:rPr>
-              <a:t>Since the categories on the x axis are ranked from left to right with increasing job risk. We can see a positive slope, that indicates that people with a higher perception of risk have a lower fatality rate.</a:t>
-            </a:r>
-          </a:p>
-          <a:p>
-            <a:endParaRPr lang="en-US" sz="1400" dirty="0">
-              <a:latin typeface="Arial" panose="020B0604020202020204" pitchFamily="34" charset="0"/>
-              <a:cs typeface="Arial" panose="020B0604020202020204" pitchFamily="34" charset="0"/>
-            </a:endParaRPr>
-          </a:p>
-          <a:p>
-            <a:endParaRPr lang="en-US" sz="1400" dirty="0" smtClean="0">
-              <a:latin typeface="Arial" panose="020B0604020202020204" pitchFamily="34" charset="0"/>
-              <a:cs typeface="Arial" panose="020B0604020202020204" pitchFamily="34" charset="0"/>
-            </a:endParaRPr>
-          </a:p>
         </p:txBody>
       </p:sp>
     </p:spTree>
     <p:extLst>
       <p:ext uri="{BB962C8B-B14F-4D97-AF65-F5344CB8AC3E}">
         <p14:creationId xmlns:p14="http://schemas.microsoft.com/office/powerpoint/2010/main" val="2790798261"/>
-      </p:ext>
-    </p:extLst>
-  </p:cSld>
-  <p:clrMapOvr>
-    <a:masterClrMapping/>
-  </p:clrMapOvr>
-</p:sld>
-</file>
-
-<file path=ppt/slides/slide9.xml><?xml version="1.0" encoding="utf-8"?>
-<p:sld xmlns:a="http://schemas.openxmlformats.org/drawingml/2006/main" xmlns:r="http://schemas.openxmlformats.org/officeDocument/2006/relationships" xmlns:p="http://schemas.openxmlformats.org/presentationml/2006/main">
-  <p:cSld>
-    <p:spTree>
-      <p:nvGrpSpPr>
-        <p:cNvPr id="1" name=""/>
-        <p:cNvGrpSpPr/>
-        <p:nvPr/>
-      </p:nvGrpSpPr>
-      <p:grpSpPr>
-        <a:xfrm>
-          <a:off x="0" y="0"/>
-          <a:ext cx="0" cy="0"/>
-          <a:chOff x="0" y="0"/>
-          <a:chExt cx="0" cy="0"/>
-        </a:xfrm>
-      </p:grpSpPr>
-      <p:sp>
-        <p:nvSpPr>
-          <p:cNvPr id="2" name="Title 1"/>
-          <p:cNvSpPr>
-            <a:spLocks noGrp="1"/>
-          </p:cNvSpPr>
-          <p:nvPr>
-            <p:ph type="title"/>
-          </p:nvPr>
-        </p:nvSpPr>
-        <p:spPr>
-          <a:xfrm>
-            <a:off x="2026920" y="863774"/>
-            <a:ext cx="10515600" cy="447675"/>
-          </a:xfrm>
-        </p:spPr>
-        <p:txBody>
-          <a:bodyPr>
-            <a:normAutofit/>
-          </a:bodyPr>
-          <a:lstStyle/>
-          <a:p>
-            <a:r>
-              <a:rPr lang="en-US" sz="1400" b="1" dirty="0" smtClean="0">
-                <a:latin typeface="Arial" panose="020B0604020202020204" pitchFamily="34" charset="0"/>
-                <a:cs typeface="Arial" panose="020B0604020202020204" pitchFamily="34" charset="0"/>
-              </a:rPr>
-              <a:t>GENDER SOC LEVEL 6</a:t>
-            </a:r>
-            <a:endParaRPr lang="en-US" sz="1400" b="1" dirty="0">
-              <a:latin typeface="Arial" panose="020B0604020202020204" pitchFamily="34" charset="0"/>
-              <a:cs typeface="Arial" panose="020B0604020202020204" pitchFamily="34" charset="0"/>
-            </a:endParaRPr>
-          </a:p>
-        </p:txBody>
-      </p:sp>
-      <p:pic>
-        <p:nvPicPr>
-          <p:cNvPr id="3" name="Picture 2"/>
-          <p:cNvPicPr>
-            <a:picLocks noChangeAspect="1"/>
-          </p:cNvPicPr>
-          <p:nvPr/>
-        </p:nvPicPr>
-        <p:blipFill>
-          <a:blip r:embed="rId2"/>
-          <a:stretch>
-            <a:fillRect/>
-          </a:stretch>
-        </p:blipFill>
-        <p:spPr>
-          <a:xfrm>
-            <a:off x="1005840" y="1595120"/>
-            <a:ext cx="4714240" cy="3535680"/>
-          </a:xfrm>
-          <a:prstGeom prst="rect">
-            <a:avLst/>
-          </a:prstGeom>
-        </p:spPr>
-      </p:pic>
-      <p:pic>
-        <p:nvPicPr>
-          <p:cNvPr id="4" name="Picture 3"/>
-          <p:cNvPicPr>
-            <a:picLocks noChangeAspect="1"/>
-          </p:cNvPicPr>
-          <p:nvPr/>
-        </p:nvPicPr>
-        <p:blipFill>
-          <a:blip r:embed="rId3"/>
-          <a:stretch>
-            <a:fillRect/>
-          </a:stretch>
-        </p:blipFill>
-        <p:spPr>
-          <a:xfrm>
-            <a:off x="6085840" y="60960"/>
-            <a:ext cx="4602480" cy="3451860"/>
-          </a:xfrm>
-          <a:prstGeom prst="rect">
-            <a:avLst/>
-          </a:prstGeom>
-        </p:spPr>
-      </p:pic>
-      <p:pic>
-        <p:nvPicPr>
-          <p:cNvPr id="5" name="Picture 4"/>
-          <p:cNvPicPr>
-            <a:picLocks noChangeAspect="1"/>
-          </p:cNvPicPr>
-          <p:nvPr/>
-        </p:nvPicPr>
-        <p:blipFill>
-          <a:blip r:embed="rId4"/>
-          <a:stretch>
-            <a:fillRect/>
-          </a:stretch>
-        </p:blipFill>
-        <p:spPr>
-          <a:xfrm>
-            <a:off x="6146800" y="3362960"/>
-            <a:ext cx="4551680" cy="3413760"/>
-          </a:xfrm>
-          <a:prstGeom prst="rect">
-            <a:avLst/>
-          </a:prstGeom>
-        </p:spPr>
-      </p:pic>
-      <p:sp>
-        <p:nvSpPr>
-          <p:cNvPr id="10" name="Title 1">
-            <a:extLst>
-              <a:ext uri="{FF2B5EF4-FFF2-40B4-BE49-F238E27FC236}">
-                <a16:creationId xmlns:a16="http://schemas.microsoft.com/office/drawing/2014/main" id="{E316B5D4-4FE6-49C6-BD43-0BB822385B6D}"/>
-              </a:ext>
-            </a:extLst>
-          </p:cNvPr>
-          <p:cNvSpPr txBox="1">
-            <a:spLocks/>
-          </p:cNvSpPr>
-          <p:nvPr/>
-        </p:nvSpPr>
-        <p:spPr>
-          <a:xfrm>
-            <a:off x="537028" y="211016"/>
-            <a:ext cx="11065035" cy="369087"/>
-          </a:xfrm>
-          <a:prstGeom prst="rect">
-            <a:avLst/>
-          </a:prstGeom>
-          <a:solidFill>
-            <a:srgbClr val="00B0F0"/>
-          </a:solidFill>
-        </p:spPr>
-        <p:txBody>
-          <a:bodyPr vert="horz" lIns="91440" tIns="45720" rIns="91440" bIns="45720" rtlCol="0" anchor="ctr">
-            <a:normAutofit/>
-          </a:bodyPr>
-          <a:lstStyle>
-            <a:lvl1pPr algn="l" defTabSz="914400" rtl="0" eaLnBrk="1" latinLnBrk="0" hangingPunct="1">
-              <a:lnSpc>
-                <a:spcPct val="90000"/>
-              </a:lnSpc>
-              <a:spcBef>
-                <a:spcPct val="0"/>
-              </a:spcBef>
-              <a:buNone/>
-              <a:defRPr sz="4400" kern="1200">
-                <a:solidFill>
-                  <a:schemeClr val="tx1"/>
-                </a:solidFill>
-                <a:latin typeface="+mj-lt"/>
-                <a:ea typeface="+mj-ea"/>
-                <a:cs typeface="+mj-cs"/>
-              </a:defRPr>
-            </a:lvl1pPr>
-          </a:lstStyle>
-          <a:p>
-            <a:r>
-              <a:rPr lang="en-US" sz="2000" b="1" dirty="0" smtClean="0">
-                <a:latin typeface="Arial" panose="020B0604020202020204" pitchFamily="34" charset="0"/>
-                <a:cs typeface="Arial" panose="020B0604020202020204" pitchFamily="34" charset="0"/>
-              </a:rPr>
-              <a:t>Example Data:  SOC level 6</a:t>
-            </a:r>
-            <a:endParaRPr lang="en-US" sz="2000" b="1" dirty="0">
-              <a:solidFill>
-                <a:schemeClr val="bg1"/>
-              </a:solidFill>
-              <a:latin typeface="Arial" panose="020B0604020202020204" pitchFamily="34" charset="0"/>
-              <a:cs typeface="Arial" panose="020B0604020202020204" pitchFamily="34" charset="0"/>
-            </a:endParaRPr>
-          </a:p>
-        </p:txBody>
-      </p:sp>
-    </p:spTree>
-    <p:extLst>
-      <p:ext uri="{BB962C8B-B14F-4D97-AF65-F5344CB8AC3E}">
-        <p14:creationId xmlns:p14="http://schemas.microsoft.com/office/powerpoint/2010/main" val="3403459914"/>
       </p:ext>
     </p:extLst>
   </p:cSld>

</xml_diff>

<commit_message>
Added averaged data plots and script, added a global method to average data.
</commit_message>
<xml_diff>
--- a/D2-documentation/Data Analysis.pptx
+++ b/D2-documentation/Data Analysis.pptx
@@ -8380,7 +8380,7 @@
         </p:nvCxnSpPr>
         <p:spPr>
           <a:xfrm>
-            <a:off x="1429128" y="6630913"/>
+            <a:off x="5223478" y="6641280"/>
             <a:ext cx="2410141" cy="9727"/>
           </a:xfrm>
           <a:prstGeom prst="straightConnector1">
@@ -8417,7 +8417,7 @@
         </p:nvSpPr>
         <p:spPr>
           <a:xfrm>
-            <a:off x="708508" y="6468586"/>
+            <a:off x="4502858" y="6478953"/>
             <a:ext cx="463588" cy="307777"/>
           </a:xfrm>
           <a:prstGeom prst="rect">

</xml_diff>

<commit_message>
updated powerpoint with rp labels
</commit_message>
<xml_diff>
--- a/D2-documentation/Data Analysis.pptx
+++ b/D2-documentation/Data Analysis.pptx
@@ -5,7 +5,7 @@
     <p:sldMasterId id="2147483648" r:id="rId1"/>
   </p:sldMasterIdLst>
   <p:notesMasterIdLst>
-    <p:notesMasterId r:id="rId17"/>
+    <p:notesMasterId r:id="rId18"/>
   </p:notesMasterIdLst>
   <p:sldIdLst>
     <p:sldId id="439" r:id="rId2"/>
@@ -16,13 +16,14 @@
     <p:sldId id="453" r:id="rId7"/>
     <p:sldId id="463" r:id="rId8"/>
     <p:sldId id="456" r:id="rId9"/>
-    <p:sldId id="464" r:id="rId10"/>
-    <p:sldId id="452" r:id="rId11"/>
-    <p:sldId id="460" r:id="rId12"/>
-    <p:sldId id="465" r:id="rId13"/>
-    <p:sldId id="457" r:id="rId14"/>
-    <p:sldId id="466" r:id="rId15"/>
-    <p:sldId id="467" r:id="rId16"/>
+    <p:sldId id="468" r:id="rId10"/>
+    <p:sldId id="464" r:id="rId11"/>
+    <p:sldId id="452" r:id="rId12"/>
+    <p:sldId id="460" r:id="rId13"/>
+    <p:sldId id="465" r:id="rId14"/>
+    <p:sldId id="457" r:id="rId15"/>
+    <p:sldId id="466" r:id="rId16"/>
+    <p:sldId id="467" r:id="rId17"/>
   </p:sldIdLst>
   <p:sldSz cx="12192000" cy="6858000"/>
   <p:notesSz cx="6858000" cy="9144000"/>
@@ -214,7 +215,7 @@
           <a:p>
             <a:fld id="{B2747E39-D197-4674-8C62-CC28612C7D1A}" type="datetimeFigureOut">
               <a:rPr lang="en-US" smtClean="0"/>
-              <a:t>4/14/2021</a:t>
+              <a:t>4/15/2021</a:t>
             </a:fld>
             <a:endParaRPr lang="en-US"/>
           </a:p>
@@ -481,6 +482,90 @@
 </p:notesMaster>
 </file>
 
+<file path=ppt/notesSlides/notesSlide1.xml><?xml version="1.0" encoding="utf-8"?>
+<p:notes xmlns:a="http://schemas.openxmlformats.org/drawingml/2006/main" xmlns:r="http://schemas.openxmlformats.org/officeDocument/2006/relationships" xmlns:p="http://schemas.openxmlformats.org/presentationml/2006/main">
+  <p:cSld>
+    <p:spTree>
+      <p:nvGrpSpPr>
+        <p:cNvPr id="1" name=""/>
+        <p:cNvGrpSpPr/>
+        <p:nvPr/>
+      </p:nvGrpSpPr>
+      <p:grpSpPr>
+        <a:xfrm>
+          <a:off x="0" y="0"/>
+          <a:ext cx="0" cy="0"/>
+          <a:chOff x="0" y="0"/>
+          <a:chExt cx="0" cy="0"/>
+        </a:xfrm>
+      </p:grpSpPr>
+      <p:sp>
+        <p:nvSpPr>
+          <p:cNvPr id="2" name="Slide Image Placeholder 1"/>
+          <p:cNvSpPr>
+            <a:spLocks noGrp="1" noRot="1" noChangeAspect="1"/>
+          </p:cNvSpPr>
+          <p:nvPr>
+            <p:ph type="sldImg"/>
+          </p:nvPr>
+        </p:nvSpPr>
+        <p:spPr/>
+      </p:sp>
+      <p:sp>
+        <p:nvSpPr>
+          <p:cNvPr id="3" name="Notes Placeholder 2"/>
+          <p:cNvSpPr>
+            <a:spLocks noGrp="1"/>
+          </p:cNvSpPr>
+          <p:nvPr>
+            <p:ph type="body" idx="1"/>
+          </p:nvPr>
+        </p:nvSpPr>
+        <p:spPr/>
+        <p:txBody>
+          <a:bodyPr/>
+          <a:lstStyle/>
+          <a:p>
+            <a:endParaRPr lang="en-US" dirty="0"/>
+          </a:p>
+        </p:txBody>
+      </p:sp>
+      <p:sp>
+        <p:nvSpPr>
+          <p:cNvPr id="4" name="Slide Number Placeholder 3"/>
+          <p:cNvSpPr>
+            <a:spLocks noGrp="1"/>
+          </p:cNvSpPr>
+          <p:nvPr>
+            <p:ph type="sldNum" sz="quarter" idx="10"/>
+          </p:nvPr>
+        </p:nvSpPr>
+        <p:spPr/>
+        <p:txBody>
+          <a:bodyPr/>
+          <a:lstStyle/>
+          <a:p>
+            <a:fld id="{F0E330A2-CD2B-45CA-AD44-A7A41C6AD554}" type="slidenum">
+              <a:rPr lang="en-US" smtClean="0"/>
+              <a:t>14</a:t>
+            </a:fld>
+            <a:endParaRPr lang="en-US"/>
+          </a:p>
+        </p:txBody>
+      </p:sp>
+    </p:spTree>
+    <p:extLst>
+      <p:ext uri="{BB962C8B-B14F-4D97-AF65-F5344CB8AC3E}">
+        <p14:creationId xmlns:p14="http://schemas.microsoft.com/office/powerpoint/2010/main" val="4032170760"/>
+      </p:ext>
+    </p:extLst>
+  </p:cSld>
+  <p:clrMapOvr>
+    <a:masterClrMapping/>
+  </p:clrMapOvr>
+</p:notes>
+</file>
+
 <file path=ppt/slideLayouts/slideLayout1.xml><?xml version="1.0" encoding="utf-8"?>
 <p:sldLayout xmlns:a="http://schemas.openxmlformats.org/drawingml/2006/main" xmlns:r="http://schemas.openxmlformats.org/officeDocument/2006/relationships" xmlns:p="http://schemas.openxmlformats.org/presentationml/2006/main" type="title" preserve="1">
   <p:cSld name="Title Slide">
@@ -610,7 +695,7 @@
           <a:p>
             <a:fld id="{38DC3FF6-C206-4596-A28C-C063AEE62E89}" type="datetimeFigureOut">
               <a:rPr lang="en-US" smtClean="0"/>
-              <a:t>4/14/2021</a:t>
+              <a:t>4/15/2021</a:t>
             </a:fld>
             <a:endParaRPr lang="en-US"/>
           </a:p>
@@ -778,7 +863,7 @@
           <a:p>
             <a:fld id="{38DC3FF6-C206-4596-A28C-C063AEE62E89}" type="datetimeFigureOut">
               <a:rPr lang="en-US" smtClean="0"/>
-              <a:t>4/14/2021</a:t>
+              <a:t>4/15/2021</a:t>
             </a:fld>
             <a:endParaRPr lang="en-US"/>
           </a:p>
@@ -956,7 +1041,7 @@
           <a:p>
             <a:fld id="{38DC3FF6-C206-4596-A28C-C063AEE62E89}" type="datetimeFigureOut">
               <a:rPr lang="en-US" smtClean="0"/>
-              <a:t>4/14/2021</a:t>
+              <a:t>4/15/2021</a:t>
             </a:fld>
             <a:endParaRPr lang="en-US"/>
           </a:p>
@@ -1124,7 +1209,7 @@
           <a:p>
             <a:fld id="{38DC3FF6-C206-4596-A28C-C063AEE62E89}" type="datetimeFigureOut">
               <a:rPr lang="en-US" smtClean="0"/>
-              <a:t>4/14/2021</a:t>
+              <a:t>4/15/2021</a:t>
             </a:fld>
             <a:endParaRPr lang="en-US"/>
           </a:p>
@@ -1369,7 +1454,7 @@
           <a:p>
             <a:fld id="{38DC3FF6-C206-4596-A28C-C063AEE62E89}" type="datetimeFigureOut">
               <a:rPr lang="en-US" smtClean="0"/>
-              <a:t>4/14/2021</a:t>
+              <a:t>4/15/2021</a:t>
             </a:fld>
             <a:endParaRPr lang="en-US"/>
           </a:p>
@@ -1598,7 +1683,7 @@
           <a:p>
             <a:fld id="{38DC3FF6-C206-4596-A28C-C063AEE62E89}" type="datetimeFigureOut">
               <a:rPr lang="en-US" smtClean="0"/>
-              <a:t>4/14/2021</a:t>
+              <a:t>4/15/2021</a:t>
             </a:fld>
             <a:endParaRPr lang="en-US"/>
           </a:p>
@@ -1962,7 +2047,7 @@
           <a:p>
             <a:fld id="{38DC3FF6-C206-4596-A28C-C063AEE62E89}" type="datetimeFigureOut">
               <a:rPr lang="en-US" smtClean="0"/>
-              <a:t>4/14/2021</a:t>
+              <a:t>4/15/2021</a:t>
             </a:fld>
             <a:endParaRPr lang="en-US"/>
           </a:p>
@@ -2079,7 +2164,7 @@
           <a:p>
             <a:fld id="{38DC3FF6-C206-4596-A28C-C063AEE62E89}" type="datetimeFigureOut">
               <a:rPr lang="en-US" smtClean="0"/>
-              <a:t>4/14/2021</a:t>
+              <a:t>4/15/2021</a:t>
             </a:fld>
             <a:endParaRPr lang="en-US"/>
           </a:p>
@@ -2174,7 +2259,7 @@
           <a:p>
             <a:fld id="{38DC3FF6-C206-4596-A28C-C063AEE62E89}" type="datetimeFigureOut">
               <a:rPr lang="en-US" smtClean="0"/>
-              <a:t>4/14/2021</a:t>
+              <a:t>4/15/2021</a:t>
             </a:fld>
             <a:endParaRPr lang="en-US"/>
           </a:p>
@@ -2449,7 +2534,7 @@
           <a:p>
             <a:fld id="{38DC3FF6-C206-4596-A28C-C063AEE62E89}" type="datetimeFigureOut">
               <a:rPr lang="en-US" smtClean="0"/>
-              <a:t>4/14/2021</a:t>
+              <a:t>4/15/2021</a:t>
             </a:fld>
             <a:endParaRPr lang="en-US"/>
           </a:p>
@@ -2701,7 +2786,7 @@
           <a:p>
             <a:fld id="{38DC3FF6-C206-4596-A28C-C063AEE62E89}" type="datetimeFigureOut">
               <a:rPr lang="en-US" smtClean="0"/>
-              <a:t>4/14/2021</a:t>
+              <a:t>4/15/2021</a:t>
             </a:fld>
             <a:endParaRPr lang="en-US"/>
           </a:p>
@@ -2929,7 +3014,7 @@
           <a:p>
             <a:fld id="{38DC3FF6-C206-4596-A28C-C063AEE62E89}" type="datetimeFigureOut">
               <a:rPr lang="en-US" smtClean="0"/>
-              <a:t>4/14/2021</a:t>
+              <a:t>4/15/2021</a:t>
             </a:fld>
             <a:endParaRPr lang="en-US"/>
           </a:p>
@@ -3441,7 +3526,7 @@
             </a:solidFill>
             <a:extLst>
               <a:ext uri="{C807C97D-BFC1-408E-A445-0C87EB9F89A2}">
-                <ask:lineSketchStyleProps xmlns:ask="http://schemas.microsoft.com/office/drawing/2018/sketchyshapes" xmlns="" sd="1131949855">
+                <ask:lineSketchStyleProps xmlns="" xmlns:ask="http://schemas.microsoft.com/office/drawing/2018/sketchyshapes" sd="1131949855">
                   <a:prstGeom prst="rect">
                     <a:avLst/>
                   </a:prstGeom>
@@ -3756,13 +3841,6 @@
               </a:rPr>
               <a:t>collar) type of occupations and Non-Administrative type of occupations (more field like type of jobs).</a:t>
             </a:r>
-            <a:endParaRPr lang="en-US" sz="2000" dirty="0">
-              <a:solidFill>
-                <a:srgbClr val="FF0000"/>
-              </a:solidFill>
-              <a:latin typeface="Arial" panose="020B0604020202020204" pitchFamily="34" charset="0"/>
-              <a:cs typeface="Arial" panose="020B0604020202020204" pitchFamily="34" charset="0"/>
-            </a:endParaRPr>
           </a:p>
         </p:txBody>
       </p:sp>
@@ -3840,10 +3918,10 @@
         </p:nvGrpSpPr>
         <p:grpSpPr>
           <a:xfrm>
-            <a:off x="6381136" y="853436"/>
-            <a:ext cx="5350618" cy="3944705"/>
-            <a:chOff x="7182596" y="1312696"/>
-            <a:chExt cx="3385297" cy="2588568"/>
+            <a:off x="6350659" y="853436"/>
+            <a:ext cx="5381098" cy="3865723"/>
+            <a:chOff x="7163312" y="1312696"/>
+            <a:chExt cx="3404581" cy="2536739"/>
           </a:xfrm>
         </p:grpSpPr>
         <p:pic>
@@ -3890,8 +3968,8 @@
           </p:nvSpPr>
           <p:spPr>
             <a:xfrm>
-              <a:off x="8453070" y="3624265"/>
-              <a:ext cx="1145250" cy="276999"/>
+              <a:off x="8888169" y="3627271"/>
+              <a:ext cx="334892" cy="222164"/>
             </a:xfrm>
             <a:prstGeom prst="rect">
               <a:avLst/>
@@ -3905,9 +3983,10 @@
             <a:lstStyle/>
             <a:p>
               <a:r>
-                <a:rPr lang="en-US" sz="1200" dirty="0"/>
-                <a:t>Risk Perception</a:t>
+                <a:rPr lang="en-US" sz="1600" b="1" dirty="0" smtClean="0"/>
+                <a:t>Risk</a:t>
               </a:r>
+              <a:endParaRPr lang="en-US" sz="1600" b="1" dirty="0"/>
             </a:p>
           </p:txBody>
         </p:sp>
@@ -3925,8 +4004,8 @@
           </p:nvSpPr>
           <p:spPr>
             <a:xfrm>
-              <a:off x="7182596" y="2043259"/>
-              <a:ext cx="233674" cy="953116"/>
+              <a:off x="7163312" y="1875857"/>
+              <a:ext cx="428401" cy="1287919"/>
             </a:xfrm>
             <a:prstGeom prst="rect">
               <a:avLst/>
@@ -3939,11 +4018,23 @@
             </a:bodyPr>
             <a:lstStyle/>
             <a:p>
+              <a:pPr algn="ctr"/>
               <a:r>
-                <a:rPr lang="en-US" sz="1200" dirty="0" smtClean="0"/>
-                <a:t>Relative Fatality Index</a:t>
+                <a:rPr lang="en-US" sz="1600" b="1" dirty="0" smtClean="0"/>
+                <a:t>Relative Fatality </a:t>
               </a:r>
-              <a:endParaRPr lang="en-US" sz="1200" dirty="0"/>
+              <a:r>
+                <a:rPr lang="en-US" sz="1600" b="1" dirty="0" smtClean="0"/>
+                <a:t>Index</a:t>
+              </a:r>
+            </a:p>
+            <a:p>
+              <a:pPr algn="ctr"/>
+              <a:r>
+                <a:rPr lang="en-US" sz="1600" b="1" dirty="0" smtClean="0"/>
+                <a:t>Risk perception</a:t>
+              </a:r>
+              <a:endParaRPr lang="en-US" sz="1600" b="1" dirty="0"/>
             </a:p>
           </p:txBody>
         </p:sp>
@@ -4046,6 +4137,89 @@
 </file>
 
 <file path=ppt/slides/slide10.xml><?xml version="1.0" encoding="utf-8"?>
+<p:sld xmlns:a="http://schemas.openxmlformats.org/drawingml/2006/main" xmlns:r="http://schemas.openxmlformats.org/officeDocument/2006/relationships" xmlns:p="http://schemas.openxmlformats.org/presentationml/2006/main">
+  <p:cSld>
+    <p:spTree>
+      <p:nvGrpSpPr>
+        <p:cNvPr id="1" name=""/>
+        <p:cNvGrpSpPr/>
+        <p:nvPr/>
+      </p:nvGrpSpPr>
+      <p:grpSpPr>
+        <a:xfrm>
+          <a:off x="0" y="0"/>
+          <a:ext cx="0" cy="0"/>
+          <a:chOff x="0" y="0"/>
+          <a:chExt cx="0" cy="0"/>
+        </a:xfrm>
+      </p:grpSpPr>
+      <p:sp>
+        <p:nvSpPr>
+          <p:cNvPr id="2" name="Content Placeholder 1"/>
+          <p:cNvSpPr>
+            <a:spLocks noGrp="1"/>
+          </p:cNvSpPr>
+          <p:nvPr>
+            <p:ph idx="1"/>
+          </p:nvPr>
+        </p:nvSpPr>
+        <p:spPr>
+          <a:xfrm>
+            <a:off x="916169" y="1121356"/>
+            <a:ext cx="10515600" cy="4351338"/>
+          </a:xfrm>
+        </p:spPr>
+        <p:txBody>
+          <a:bodyPr/>
+          <a:lstStyle/>
+          <a:p>
+            <a:endParaRPr lang="en-US" dirty="0" smtClean="0"/>
+          </a:p>
+          <a:p>
+            <a:endParaRPr lang="en-US" dirty="0"/>
+          </a:p>
+          <a:p>
+            <a:endParaRPr lang="en-US" dirty="0" smtClean="0"/>
+          </a:p>
+          <a:p>
+            <a:pPr marL="0" indent="0" algn="ctr">
+              <a:buNone/>
+            </a:pPr>
+            <a:r>
+              <a:rPr lang="en-US" sz="4800" dirty="0" smtClean="0">
+                <a:latin typeface="Arial" panose="020B0604020202020204" pitchFamily="34" charset="0"/>
+                <a:cs typeface="Arial" panose="020B0604020202020204" pitchFamily="34" charset="0"/>
+              </a:rPr>
+              <a:t>DATA STORAGE</a:t>
+            </a:r>
+            <a:endParaRPr lang="en-US" sz="4800" dirty="0">
+              <a:latin typeface="Arial" panose="020B0604020202020204" pitchFamily="34" charset="0"/>
+              <a:cs typeface="Arial" panose="020B0604020202020204" pitchFamily="34" charset="0"/>
+            </a:endParaRPr>
+          </a:p>
+        </p:txBody>
+      </p:sp>
+    </p:spTree>
+    <p:extLst>
+      <p:ext uri="{BB962C8B-B14F-4D97-AF65-F5344CB8AC3E}">
+        <p14:creationId xmlns:p14="http://schemas.microsoft.com/office/powerpoint/2010/main" val="2244037764"/>
+      </p:ext>
+    </p:extLst>
+  </p:cSld>
+  <p:clrMapOvr>
+    <a:masterClrMapping/>
+  </p:clrMapOvr>
+  <p:timing>
+    <p:tnLst>
+      <p:par>
+        <p:cTn id="1" dur="indefinite" restart="never" nodeType="tmRoot"/>
+      </p:par>
+    </p:tnLst>
+  </p:timing>
+</p:sld>
+</file>
+
+<file path=ppt/slides/slide11.xml><?xml version="1.0" encoding="utf-8"?>
 <p:sld xmlns:a="http://schemas.openxmlformats.org/drawingml/2006/main" xmlns:r="http://schemas.openxmlformats.org/officeDocument/2006/relationships" xmlns:p="http://schemas.openxmlformats.org/presentationml/2006/main">
   <p:cSld>
     <p:spTree>
@@ -4508,7 +4682,7 @@
 </p:sld>
 </file>
 
-<file path=ppt/slides/slide11.xml><?xml version="1.0" encoding="utf-8"?>
+<file path=ppt/slides/slide12.xml><?xml version="1.0" encoding="utf-8"?>
 <p:sld xmlns:a="http://schemas.openxmlformats.org/drawingml/2006/main" xmlns:r="http://schemas.openxmlformats.org/officeDocument/2006/relationships" xmlns:p="http://schemas.openxmlformats.org/presentationml/2006/main">
   <p:cSld>
     <p:spTree>
@@ -4907,10 +5081,6 @@
               </a:rPr>
               <a:t> and injury count. </a:t>
             </a:r>
-            <a:endParaRPr lang="en-US" sz="1400" dirty="0" smtClean="0">
-              <a:latin typeface="Arial" panose="020B0604020202020204" pitchFamily="34" charset="0"/>
-              <a:cs typeface="Arial" panose="020B0604020202020204" pitchFamily="34" charset="0"/>
-            </a:endParaRPr>
           </a:p>
           <a:p>
             <a:pPr marL="342900" indent="-342900">
@@ -4921,42 +5091,7 @@
                 <a:latin typeface="Arial" panose="020B0604020202020204" pitchFamily="34" charset="0"/>
                 <a:cs typeface="Arial" panose="020B0604020202020204" pitchFamily="34" charset="0"/>
               </a:rPr>
-              <a:t>Any </a:t>
-            </a:r>
-            <a:r>
-              <a:rPr lang="en-US" sz="1400" dirty="0" smtClean="0">
-                <a:latin typeface="Arial" panose="020B0604020202020204" pitchFamily="34" charset="0"/>
-                <a:cs typeface="Arial" panose="020B0604020202020204" pitchFamily="34" charset="0"/>
-              </a:rPr>
-              <a:t>other suggestions as to what other </a:t>
-            </a:r>
-            <a:r>
-              <a:rPr lang="en-US" sz="1400" dirty="0" smtClean="0">
-                <a:latin typeface="Arial" panose="020B0604020202020204" pitchFamily="34" charset="0"/>
-                <a:cs typeface="Arial" panose="020B0604020202020204" pitchFamily="34" charset="0"/>
-              </a:rPr>
-              <a:t>potential statistical </a:t>
-            </a:r>
-            <a:r>
-              <a:rPr lang="en-US" sz="1400" dirty="0" smtClean="0">
-                <a:latin typeface="Arial" panose="020B0604020202020204" pitchFamily="34" charset="0"/>
-                <a:cs typeface="Arial" panose="020B0604020202020204" pitchFamily="34" charset="0"/>
-              </a:rPr>
-              <a:t>measurements we can </a:t>
-            </a:r>
-            <a:r>
-              <a:rPr lang="en-US" sz="1400" dirty="0" smtClean="0">
-                <a:latin typeface="Arial" panose="020B0604020202020204" pitchFamily="34" charset="0"/>
-                <a:cs typeface="Arial" panose="020B0604020202020204" pitchFamily="34" charset="0"/>
-              </a:rPr>
-              <a:t>perform, </a:t>
-            </a:r>
-            <a:r>
-              <a:rPr lang="en-US" sz="1400" dirty="0" smtClean="0">
-                <a:latin typeface="Arial" panose="020B0604020202020204" pitchFamily="34" charset="0"/>
-                <a:cs typeface="Arial" panose="020B0604020202020204" pitchFamily="34" charset="0"/>
-              </a:rPr>
-              <a:t>would be appreciated?</a:t>
+              <a:t>Any other suggestions as to what other potential statistical measurements we can perform, would be appreciated?</a:t>
             </a:r>
           </a:p>
           <a:p>
@@ -5134,7 +5269,7 @@
 </p:sld>
 </file>
 
-<file path=ppt/slides/slide12.xml><?xml version="1.0" encoding="utf-8"?>
+<file path=ppt/slides/slide13.xml><?xml version="1.0" encoding="utf-8"?>
 <p:sld xmlns:a="http://schemas.openxmlformats.org/drawingml/2006/main" xmlns:r="http://schemas.openxmlformats.org/officeDocument/2006/relationships" xmlns:p="http://schemas.openxmlformats.org/presentationml/2006/main">
   <p:cSld>
     <p:spTree>
@@ -5207,10 +5342,17 @@
   <p:clrMapOvr>
     <a:masterClrMapping/>
   </p:clrMapOvr>
+  <p:timing>
+    <p:tnLst>
+      <p:par>
+        <p:cTn id="1" dur="indefinite" restart="never" nodeType="tmRoot"/>
+      </p:par>
+    </p:tnLst>
+  </p:timing>
 </p:sld>
 </file>
 
-<file path=ppt/slides/slide13.xml><?xml version="1.0" encoding="utf-8"?>
+<file path=ppt/slides/slide14.xml><?xml version="1.0" encoding="utf-8"?>
 <p:sld xmlns:a="http://schemas.openxmlformats.org/drawingml/2006/main" xmlns:r="http://schemas.openxmlformats.org/officeDocument/2006/relationships" xmlns:p="http://schemas.openxmlformats.org/presentationml/2006/main">
   <p:cSld>
     <p:spTree>
@@ -5236,7 +5378,7 @@
           <p:nvPr/>
         </p:nvPicPr>
         <p:blipFill>
-          <a:blip r:embed="rId2"/>
+          <a:blip r:embed="rId3"/>
           <a:stretch>
             <a:fillRect/>
           </a:stretch>
@@ -5260,7 +5402,7 @@
           <p:nvPr/>
         </p:nvPicPr>
         <p:blipFill>
-          <a:blip r:embed="rId3"/>
+          <a:blip r:embed="rId4"/>
           <a:stretch>
             <a:fillRect/>
           </a:stretch>
@@ -5284,7 +5426,7 @@
           <p:nvPr/>
         </p:nvPicPr>
         <p:blipFill>
-          <a:blip r:embed="rId4"/>
+          <a:blip r:embed="rId5"/>
           <a:stretch>
             <a:fillRect/>
           </a:stretch>
@@ -5375,7 +5517,7 @@
           <p:nvPr/>
         </p:nvPicPr>
         <p:blipFill>
-          <a:blip r:embed="rId5"/>
+          <a:blip r:embed="rId6"/>
           <a:stretch>
             <a:fillRect/>
           </a:stretch>
@@ -5514,35 +5656,7 @@
                 <a:latin typeface="Arial" panose="020B0604020202020204" pitchFamily="34" charset="0"/>
                 <a:cs typeface="Arial" panose="020B0604020202020204" pitchFamily="34" charset="0"/>
               </a:rPr>
-              <a:t>hen a higher relative log </a:t>
-            </a:r>
-            <a:r>
-              <a:rPr lang="en-US" sz="1400" dirty="0" smtClean="0">
-                <a:latin typeface="Arial" panose="020B0604020202020204" pitchFamily="34" charset="0"/>
-                <a:cs typeface="Arial" panose="020B0604020202020204" pitchFamily="34" charset="0"/>
-              </a:rPr>
-              <a:t>index value, </a:t>
-            </a:r>
-            <a:r>
-              <a:rPr lang="en-US" sz="1400" dirty="0" smtClean="0">
-                <a:latin typeface="Arial" panose="020B0604020202020204" pitchFamily="34" charset="0"/>
-                <a:cs typeface="Arial" panose="020B0604020202020204" pitchFamily="34" charset="0"/>
-              </a:rPr>
-              <a:t>correlates to a </a:t>
-            </a:r>
-            <a:r>
-              <a:rPr lang="en-US" sz="1400" dirty="0" smtClean="0">
-                <a:latin typeface="Arial" panose="020B0604020202020204" pitchFamily="34" charset="0"/>
-                <a:cs typeface="Arial" panose="020B0604020202020204" pitchFamily="34" charset="0"/>
-              </a:rPr>
-              <a:t>smaller </a:t>
-            </a:r>
-            <a:r>
-              <a:rPr lang="en-US" sz="1400" dirty="0" smtClean="0">
-                <a:latin typeface="Arial" panose="020B0604020202020204" pitchFamily="34" charset="0"/>
-                <a:cs typeface="Arial" panose="020B0604020202020204" pitchFamily="34" charset="0"/>
-              </a:rPr>
-              <a:t>fatality/injury rate.</a:t>
+              <a:t>hen a higher relative log index value, correlates to a smaller fatality/injury rate.</a:t>
             </a:r>
           </a:p>
           <a:p>
@@ -5584,7 +5698,7 @@
           </a:prstGeom>
           <a:ln w="25400">
             <a:solidFill>
-              <a:schemeClr val="tx1"/>
+              <a:srgbClr val="FF0000"/>
             </a:solidFill>
             <a:prstDash val="dash"/>
             <a:tailEnd type="triangle" w="lg" len="lg"/>
@@ -5614,7 +5728,7 @@
         <p:spPr>
           <a:xfrm>
             <a:off x="4502858" y="6478953"/>
-            <a:ext cx="463588" cy="307777"/>
+            <a:ext cx="503664" cy="307777"/>
           </a:xfrm>
           <a:prstGeom prst="rect">
             <a:avLst/>
@@ -5628,13 +5742,118 @@
           <a:lstStyle/>
           <a:p>
             <a:r>
-              <a:rPr lang="en-US" sz="1400" dirty="0" smtClean="0">
+              <a:rPr lang="en-US" sz="1400" b="1" dirty="0" smtClean="0">
+                <a:solidFill>
+                  <a:srgbClr val="FF0000"/>
+                </a:solidFill>
                 <a:latin typeface="Arial" panose="020B0604020202020204" pitchFamily="34" charset="0"/>
                 <a:cs typeface="Arial" panose="020B0604020202020204" pitchFamily="34" charset="0"/>
               </a:rPr>
               <a:t>risk</a:t>
             </a:r>
-            <a:endParaRPr lang="en-US" sz="1400" dirty="0">
+            <a:endParaRPr lang="en-US" sz="1400" b="1" dirty="0">
+              <a:solidFill>
+                <a:srgbClr val="FF0000"/>
+              </a:solidFill>
+              <a:latin typeface="Arial" panose="020B0604020202020204" pitchFamily="34" charset="0"/>
+              <a:cs typeface="Arial" panose="020B0604020202020204" pitchFamily="34" charset="0"/>
+            </a:endParaRPr>
+          </a:p>
+        </p:txBody>
+      </p:sp>
+      <p:cxnSp>
+        <p:nvCxnSpPr>
+          <p:cNvPr id="10" name="Straight Arrow Connector 9"/>
+          <p:cNvCxnSpPr/>
+          <p:nvPr/>
+        </p:nvCxnSpPr>
+        <p:spPr>
+          <a:xfrm flipV="1">
+            <a:off x="4117750" y="3735176"/>
+            <a:ext cx="10399" cy="1783161"/>
+          </a:xfrm>
+          <a:prstGeom prst="straightConnector1">
+            <a:avLst/>
+          </a:prstGeom>
+          <a:ln w="25400">
+            <a:solidFill>
+              <a:srgbClr val="00B050"/>
+            </a:solidFill>
+            <a:prstDash val="dash"/>
+            <a:tailEnd type="triangle" w="lg" len="lg"/>
+          </a:ln>
+        </p:spPr>
+        <p:style>
+          <a:lnRef idx="1">
+            <a:schemeClr val="accent1"/>
+          </a:lnRef>
+          <a:fillRef idx="0">
+            <a:schemeClr val="accent1"/>
+          </a:fillRef>
+          <a:effectRef idx="0">
+            <a:schemeClr val="accent1"/>
+          </a:effectRef>
+          <a:fontRef idx="minor">
+            <a:schemeClr val="tx1"/>
+          </a:fontRef>
+        </p:style>
+      </p:cxnSp>
+      <p:sp>
+        <p:nvSpPr>
+          <p:cNvPr id="13" name="TextBox 12"/>
+          <p:cNvSpPr txBox="1"/>
+          <p:nvPr/>
+        </p:nvSpPr>
+        <p:spPr>
+          <a:xfrm rot="16200000">
+            <a:off x="3263942" y="5916518"/>
+            <a:ext cx="1707615" cy="307777"/>
+          </a:xfrm>
+          <a:prstGeom prst="rect">
+            <a:avLst/>
+          </a:prstGeom>
+          <a:noFill/>
+        </p:spPr>
+        <p:txBody>
+          <a:bodyPr wrap="square" rtlCol="0">
+            <a:spAutoFit/>
+          </a:bodyPr>
+          <a:lstStyle/>
+          <a:p>
+            <a:r>
+              <a:rPr lang="en-US" sz="1400" b="1" dirty="0">
+                <a:solidFill>
+                  <a:srgbClr val="00B050"/>
+                </a:solidFill>
+                <a:latin typeface="Arial" panose="020B0604020202020204" pitchFamily="34" charset="0"/>
+                <a:cs typeface="Arial" panose="020B0604020202020204" pitchFamily="34" charset="0"/>
+              </a:rPr>
+              <a:t>r</a:t>
+            </a:r>
+            <a:r>
+              <a:rPr lang="en-US" sz="1400" b="1" dirty="0" smtClean="0">
+                <a:solidFill>
+                  <a:srgbClr val="00B050"/>
+                </a:solidFill>
+                <a:latin typeface="Arial" panose="020B0604020202020204" pitchFamily="34" charset="0"/>
+                <a:cs typeface="Arial" panose="020B0604020202020204" pitchFamily="34" charset="0"/>
+              </a:rPr>
+              <a:t>isk perce</a:t>
+            </a:r>
+            <a:r>
+              <a:rPr lang="en-US" sz="1400" b="1" dirty="0" smtClean="0">
+                <a:solidFill>
+                  <a:srgbClr val="00B050"/>
+                </a:solidFill>
+                <a:latin typeface="Arial" panose="020B0604020202020204" pitchFamily="34" charset="0"/>
+                <a:cs typeface="Arial" panose="020B0604020202020204" pitchFamily="34" charset="0"/>
+              </a:rPr>
+              <a:t>ption</a:t>
+            </a:r>
+            <a:endParaRPr lang="en-US" sz="1400" b="1" dirty="0">
+              <a:solidFill>
+                <a:srgbClr val="00B050"/>
+              </a:solidFill>
               <a:latin typeface="Arial" panose="020B0604020202020204" pitchFamily="34" charset="0"/>
               <a:cs typeface="Arial" panose="020B0604020202020204" pitchFamily="34" charset="0"/>
             </a:endParaRPr>
@@ -5651,10 +5870,17 @@
   <p:clrMapOvr>
     <a:masterClrMapping/>
   </p:clrMapOvr>
+  <p:timing>
+    <p:tnLst>
+      <p:par>
+        <p:cTn id="1" dur="indefinite" restart="never" nodeType="tmRoot"/>
+      </p:par>
+    </p:tnLst>
+  </p:timing>
 </p:sld>
 </file>
 
-<file path=ppt/slides/slide14.xml><?xml version="1.0" encoding="utf-8"?>
+<file path=ppt/slides/slide15.xml><?xml version="1.0" encoding="utf-8"?>
 <p:sld xmlns:a="http://schemas.openxmlformats.org/drawingml/2006/main" xmlns:r="http://schemas.openxmlformats.org/officeDocument/2006/relationships" xmlns:p="http://schemas.openxmlformats.org/presentationml/2006/main">
   <p:cSld>
     <p:spTree>
@@ -5687,7 +5913,7 @@
         </p:blipFill>
         <p:spPr>
           <a:xfrm>
-            <a:off x="5040855" y="288046"/>
+            <a:off x="5569175" y="288046"/>
             <a:ext cx="6561208" cy="6561208"/>
           </a:xfrm>
           <a:prstGeom prst="rect">
@@ -5750,21 +5976,7 @@
                 <a:latin typeface="Arial" panose="020B0604020202020204" pitchFamily="34" charset="0"/>
                 <a:cs typeface="Arial" panose="020B0604020202020204" pitchFamily="34" charset="0"/>
               </a:rPr>
-              <a:t>Example Data:  </a:t>
-            </a:r>
-            <a:r>
-              <a:rPr lang="en-US" sz="2000" b="1" dirty="0" smtClean="0">
-                <a:latin typeface="Arial" panose="020B0604020202020204" pitchFamily="34" charset="0"/>
-                <a:cs typeface="Arial" panose="020B0604020202020204" pitchFamily="34" charset="0"/>
-              </a:rPr>
-              <a:t>Cumulative Averaged values for GENDER/AGE/LOS,  SOC </a:t>
-            </a:r>
-            <a:r>
-              <a:rPr lang="en-US" sz="2000" b="1" dirty="0" smtClean="0">
-                <a:latin typeface="Arial" panose="020B0604020202020204" pitchFamily="34" charset="0"/>
-                <a:cs typeface="Arial" panose="020B0604020202020204" pitchFamily="34" charset="0"/>
-              </a:rPr>
-              <a:t>level 1</a:t>
+              <a:t>Example Data:  Cumulative Averaged values for GENDER/AGE/LOS,  SOC level 1</a:t>
             </a:r>
             <a:endParaRPr lang="en-US" sz="2000" b="1" dirty="0">
               <a:solidFill>
@@ -5814,34 +6026,23 @@
                 <a:latin typeface="Arial" panose="020B0604020202020204" pitchFamily="34" charset="0"/>
                 <a:cs typeface="Arial" panose="020B0604020202020204" pitchFamily="34" charset="0"/>
               </a:rPr>
-              <a:t>The graph to the right </a:t>
-            </a:r>
+              <a:t>The graph to the right was created by averaging all of the occupational categorical fatality log values. This was done for GENDER, AGE, and LOS (length of service). </a:t>
+            </a:r>
+          </a:p>
+          <a:p>
+            <a:endParaRPr lang="en-US" sz="1400" dirty="0">
+              <a:latin typeface="Arial" panose="020B0604020202020204" pitchFamily="34" charset="0"/>
+              <a:cs typeface="Arial" panose="020B0604020202020204" pitchFamily="34" charset="0"/>
+            </a:endParaRPr>
+          </a:p>
+          <a:p>
             <a:r>
               <a:rPr lang="en-US" sz="1400" dirty="0" smtClean="0">
                 <a:latin typeface="Arial" panose="020B0604020202020204" pitchFamily="34" charset="0"/>
                 <a:cs typeface="Arial" panose="020B0604020202020204" pitchFamily="34" charset="0"/>
               </a:rPr>
-              <a:t>was created by averaging all of the occupational categorical fatality log values. This was done for GENDER, AGE, and LOS (length of service). </a:t>
-            </a:r>
-          </a:p>
-          <a:p>
-            <a:endParaRPr lang="en-US" sz="1400" dirty="0">
-              <a:latin typeface="Arial" panose="020B0604020202020204" pitchFamily="34" charset="0"/>
-              <a:cs typeface="Arial" panose="020B0604020202020204" pitchFamily="34" charset="0"/>
-            </a:endParaRPr>
-          </a:p>
-          <a:p>
-            <a:r>
-              <a:rPr lang="en-US" sz="1400" dirty="0" smtClean="0">
-                <a:latin typeface="Arial" panose="020B0604020202020204" pitchFamily="34" charset="0"/>
-                <a:cs typeface="Arial" panose="020B0604020202020204" pitchFamily="34" charset="0"/>
-              </a:rPr>
               <a:t>RACE also produces a positive slope, however, the correlation of the values to the linear regression, was a better match (better r) when RACE data was not averaged.  </a:t>
             </a:r>
-            <a:endParaRPr lang="en-US" sz="1400" dirty="0" smtClean="0">
-              <a:latin typeface="Arial" panose="020B0604020202020204" pitchFamily="34" charset="0"/>
-              <a:cs typeface="Arial" panose="020B0604020202020204" pitchFamily="34" charset="0"/>
-            </a:endParaRPr>
           </a:p>
           <a:p>
             <a:endParaRPr lang="en-US" sz="1400" dirty="0" smtClean="0">
@@ -5859,7 +6060,7 @@
         </p:nvGrpSpPr>
         <p:grpSpPr>
           <a:xfrm>
-            <a:off x="5772764" y="6464447"/>
+            <a:off x="6199484" y="6464447"/>
             <a:ext cx="5179716" cy="289911"/>
             <a:chOff x="4502858" y="6478953"/>
             <a:chExt cx="3130761" cy="307777"/>
@@ -5968,6 +6169,105 @@
           </a:ln>
         </p:spPr>
       </p:pic>
+      <p:cxnSp>
+        <p:nvCxnSpPr>
+          <p:cNvPr id="9" name="Straight Arrow Connector 8"/>
+          <p:cNvCxnSpPr/>
+          <p:nvPr/>
+        </p:nvCxnSpPr>
+        <p:spPr>
+          <a:xfrm flipV="1">
+            <a:off x="5699760" y="1036176"/>
+            <a:ext cx="23509" cy="3698384"/>
+          </a:xfrm>
+          <a:prstGeom prst="straightConnector1">
+            <a:avLst/>
+          </a:prstGeom>
+          <a:ln w="25400">
+            <a:solidFill>
+              <a:srgbClr val="00B050"/>
+            </a:solidFill>
+            <a:prstDash val="dash"/>
+            <a:tailEnd type="triangle" w="lg" len="lg"/>
+          </a:ln>
+        </p:spPr>
+        <p:style>
+          <a:lnRef idx="1">
+            <a:schemeClr val="accent1"/>
+          </a:lnRef>
+          <a:fillRef idx="0">
+            <a:schemeClr val="accent1"/>
+          </a:fillRef>
+          <a:effectRef idx="0">
+            <a:schemeClr val="accent1"/>
+          </a:effectRef>
+          <a:fontRef idx="minor">
+            <a:schemeClr val="tx1"/>
+          </a:fontRef>
+        </p:style>
+      </p:cxnSp>
+      <p:sp>
+        <p:nvSpPr>
+          <p:cNvPr id="10" name="TextBox 9"/>
+          <p:cNvSpPr txBox="1"/>
+          <p:nvPr/>
+        </p:nvSpPr>
+        <p:spPr>
+          <a:xfrm rot="16200000">
+            <a:off x="4859062" y="5208877"/>
+            <a:ext cx="1707615" cy="307777"/>
+          </a:xfrm>
+          <a:prstGeom prst="rect">
+            <a:avLst/>
+          </a:prstGeom>
+          <a:noFill/>
+        </p:spPr>
+        <p:txBody>
+          <a:bodyPr wrap="square" rtlCol="0">
+            <a:spAutoFit/>
+          </a:bodyPr>
+          <a:lstStyle/>
+          <a:p>
+            <a:r>
+              <a:rPr lang="en-US" sz="1400" b="1" dirty="0">
+                <a:solidFill>
+                  <a:srgbClr val="00B050"/>
+                </a:solidFill>
+                <a:latin typeface="Arial" panose="020B0604020202020204" pitchFamily="34" charset="0"/>
+                <a:cs typeface="Arial" panose="020B0604020202020204" pitchFamily="34" charset="0"/>
+              </a:rPr>
+              <a:t>r</a:t>
+            </a:r>
+            <a:r>
+              <a:rPr lang="en-US" sz="1400" b="1" dirty="0" smtClean="0">
+                <a:solidFill>
+                  <a:srgbClr val="00B050"/>
+                </a:solidFill>
+                <a:latin typeface="Arial" panose="020B0604020202020204" pitchFamily="34" charset="0"/>
+                <a:cs typeface="Arial" panose="020B0604020202020204" pitchFamily="34" charset="0"/>
+              </a:rPr>
+              <a:t>isk perce</a:t>
+            </a:r>
+            <a:r>
+              <a:rPr lang="en-US" sz="1400" b="1" dirty="0" smtClean="0">
+                <a:solidFill>
+                  <a:srgbClr val="00B050"/>
+                </a:solidFill>
+                <a:latin typeface="Arial" panose="020B0604020202020204" pitchFamily="34" charset="0"/>
+                <a:cs typeface="Arial" panose="020B0604020202020204" pitchFamily="34" charset="0"/>
+              </a:rPr>
+              <a:t>ption</a:t>
+            </a:r>
+            <a:endParaRPr lang="en-US" sz="1400" b="1" dirty="0">
+              <a:solidFill>
+                <a:srgbClr val="00B050"/>
+              </a:solidFill>
+              <a:latin typeface="Arial" panose="020B0604020202020204" pitchFamily="34" charset="0"/>
+              <a:cs typeface="Arial" panose="020B0604020202020204" pitchFamily="34" charset="0"/>
+            </a:endParaRPr>
+          </a:p>
+        </p:txBody>
+      </p:sp>
     </p:spTree>
     <p:extLst>
       <p:ext uri="{BB962C8B-B14F-4D97-AF65-F5344CB8AC3E}">
@@ -5978,10 +6278,17 @@
   <p:clrMapOvr>
     <a:masterClrMapping/>
   </p:clrMapOvr>
+  <p:timing>
+    <p:tnLst>
+      <p:par>
+        <p:cTn id="1" dur="indefinite" restart="never" nodeType="tmRoot"/>
+      </p:par>
+    </p:tnLst>
+  </p:timing>
 </p:sld>
 </file>
 
-<file path=ppt/slides/slide15.xml><?xml version="1.0" encoding="utf-8"?>
+<file path=ppt/slides/slide16.xml><?xml version="1.0" encoding="utf-8"?>
 <p:sld xmlns:a="http://schemas.openxmlformats.org/drawingml/2006/main" xmlns:r="http://schemas.openxmlformats.org/officeDocument/2006/relationships" xmlns:p="http://schemas.openxmlformats.org/presentationml/2006/main">
   <p:cSld>
     <p:spTree>
@@ -6014,7 +6321,7 @@
         </p:blipFill>
         <p:spPr>
           <a:xfrm>
-            <a:off x="5040855" y="288046"/>
+            <a:off x="5528535" y="288046"/>
             <a:ext cx="6561208" cy="6561208"/>
           </a:xfrm>
           <a:prstGeom prst="rect">
@@ -6077,14 +6384,7 @@
                 <a:latin typeface="Arial" panose="020B0604020202020204" pitchFamily="34" charset="0"/>
                 <a:cs typeface="Arial" panose="020B0604020202020204" pitchFamily="34" charset="0"/>
               </a:rPr>
-              <a:t>Example Data:  </a:t>
-            </a:r>
-            <a:r>
-              <a:rPr lang="en-US" sz="2000" b="1" dirty="0" smtClean="0">
-                <a:latin typeface="Arial" panose="020B0604020202020204" pitchFamily="34" charset="0"/>
-                <a:cs typeface="Arial" panose="020B0604020202020204" pitchFamily="34" charset="0"/>
-              </a:rPr>
-              <a:t>Conclusion Summary</a:t>
+              <a:t>Example Data:  Conclusion Summary</a:t>
             </a:r>
             <a:endParaRPr lang="en-US" sz="2000" b="1" dirty="0">
               <a:solidFill>
@@ -6104,7 +6404,7 @@
         </p:nvSpPr>
         <p:spPr>
           <a:xfrm>
-            <a:off x="537028" y="645070"/>
+            <a:off x="557348" y="645070"/>
             <a:ext cx="4882760" cy="6124754"/>
           </a:xfrm>
           <a:prstGeom prst="rect">
@@ -6128,14 +6428,7 @@
                 <a:latin typeface="Arial" panose="020B0604020202020204" pitchFamily="34" charset="0"/>
                 <a:cs typeface="Arial" panose="020B0604020202020204" pitchFamily="34" charset="0"/>
               </a:rPr>
-              <a:t>Since</a:t>
-            </a:r>
-            <a:r>
-              <a:rPr lang="en-US" sz="1400" dirty="0" smtClean="0">
-                <a:latin typeface="Arial" panose="020B0604020202020204" pitchFamily="34" charset="0"/>
-                <a:cs typeface="Arial" panose="020B0604020202020204" pitchFamily="34" charset="0"/>
-              </a:rPr>
-              <a:t>, the relative index is a function of:</a:t>
+              <a:t>Since, the relative index is a function of:</a:t>
             </a:r>
           </a:p>
           <a:p>
@@ -6216,57 +6509,22 @@
                 <a:latin typeface="Arial" panose="020B0604020202020204" pitchFamily="34" charset="0"/>
                 <a:cs typeface="Arial" panose="020B0604020202020204" pitchFamily="34" charset="0"/>
               </a:rPr>
-              <a:t>hen a higher relative log </a:t>
-            </a:r>
+              <a:t>hen a higher relative log index value, correlates to a smaller fatality/injury rate.</a:t>
+            </a:r>
+          </a:p>
+          <a:p>
+            <a:endParaRPr lang="en-US" sz="1400" dirty="0">
+              <a:latin typeface="Arial" panose="020B0604020202020204" pitchFamily="34" charset="0"/>
+              <a:cs typeface="Arial" panose="020B0604020202020204" pitchFamily="34" charset="0"/>
+            </a:endParaRPr>
+          </a:p>
+          <a:p>
             <a:r>
               <a:rPr lang="en-US" sz="1400" dirty="0" smtClean="0">
                 <a:latin typeface="Arial" panose="020B0604020202020204" pitchFamily="34" charset="0"/>
                 <a:cs typeface="Arial" panose="020B0604020202020204" pitchFamily="34" charset="0"/>
               </a:rPr>
-              <a:t>index value, </a:t>
-            </a:r>
-            <a:r>
-              <a:rPr lang="en-US" sz="1400" dirty="0" smtClean="0">
-                <a:latin typeface="Arial" panose="020B0604020202020204" pitchFamily="34" charset="0"/>
-                <a:cs typeface="Arial" panose="020B0604020202020204" pitchFamily="34" charset="0"/>
-              </a:rPr>
-              <a:t>correlates to a </a:t>
-            </a:r>
-            <a:r>
-              <a:rPr lang="en-US" sz="1400" dirty="0" smtClean="0">
-                <a:latin typeface="Arial" panose="020B0604020202020204" pitchFamily="34" charset="0"/>
-                <a:cs typeface="Arial" panose="020B0604020202020204" pitchFamily="34" charset="0"/>
-              </a:rPr>
-              <a:t>smaller </a:t>
-            </a:r>
-            <a:r>
-              <a:rPr lang="en-US" sz="1400" dirty="0" smtClean="0">
-                <a:latin typeface="Arial" panose="020B0604020202020204" pitchFamily="34" charset="0"/>
-                <a:cs typeface="Arial" panose="020B0604020202020204" pitchFamily="34" charset="0"/>
-              </a:rPr>
-              <a:t>fatality/injury rate.</a:t>
-            </a:r>
-          </a:p>
-          <a:p>
-            <a:endParaRPr lang="en-US" sz="1400" dirty="0">
-              <a:latin typeface="Arial" panose="020B0604020202020204" pitchFamily="34" charset="0"/>
-              <a:cs typeface="Arial" panose="020B0604020202020204" pitchFamily="34" charset="0"/>
-            </a:endParaRPr>
-          </a:p>
-          <a:p>
-            <a:r>
-              <a:rPr lang="en-US" sz="1400" dirty="0" smtClean="0">
-                <a:latin typeface="Arial" panose="020B0604020202020204" pitchFamily="34" charset="0"/>
-                <a:cs typeface="Arial" panose="020B0604020202020204" pitchFamily="34" charset="0"/>
-              </a:rPr>
-              <a:t>Since the categories on the x axis are ranked from left to right with increasing job risk. We can see a positive slope, that indicates that people with a higher perception of risk have a lower fatality rate</a:t>
-            </a:r>
-            <a:r>
-              <a:rPr lang="en-US" sz="1400" dirty="0" smtClean="0">
-                <a:latin typeface="Arial" panose="020B0604020202020204" pitchFamily="34" charset="0"/>
-                <a:cs typeface="Arial" panose="020B0604020202020204" pitchFamily="34" charset="0"/>
-              </a:rPr>
-              <a:t>.</a:t>
+              <a:t>Since the categories on the x axis are ranked from left to right with increasing job risk. We can see a positive slope, that indicates that people with a higher perception of risk have a lower fatality rate.</a:t>
             </a:r>
           </a:p>
           <a:p>
@@ -6481,7 +6739,7 @@
         </p:nvGrpSpPr>
         <p:grpSpPr>
           <a:xfrm>
-            <a:off x="5772764" y="6464447"/>
+            <a:off x="6362044" y="6464447"/>
             <a:ext cx="5179716" cy="289911"/>
             <a:chOff x="4502858" y="6478953"/>
             <a:chExt cx="3130761" cy="307777"/>
@@ -6561,6 +6819,105 @@
           </p:txBody>
         </p:sp>
       </p:grpSp>
+      <p:cxnSp>
+        <p:nvCxnSpPr>
+          <p:cNvPr id="8" name="Straight Arrow Connector 7"/>
+          <p:cNvCxnSpPr/>
+          <p:nvPr/>
+        </p:nvCxnSpPr>
+        <p:spPr>
+          <a:xfrm flipV="1">
+            <a:off x="5882640" y="1036176"/>
+            <a:ext cx="23509" cy="3698384"/>
+          </a:xfrm>
+          <a:prstGeom prst="straightConnector1">
+            <a:avLst/>
+          </a:prstGeom>
+          <a:ln w="25400">
+            <a:solidFill>
+              <a:srgbClr val="00B050"/>
+            </a:solidFill>
+            <a:prstDash val="dash"/>
+            <a:tailEnd type="triangle" w="lg" len="lg"/>
+          </a:ln>
+        </p:spPr>
+        <p:style>
+          <a:lnRef idx="1">
+            <a:schemeClr val="accent1"/>
+          </a:lnRef>
+          <a:fillRef idx="0">
+            <a:schemeClr val="accent1"/>
+          </a:fillRef>
+          <a:effectRef idx="0">
+            <a:schemeClr val="accent1"/>
+          </a:effectRef>
+          <a:fontRef idx="minor">
+            <a:schemeClr val="tx1"/>
+          </a:fontRef>
+        </p:style>
+      </p:cxnSp>
+      <p:sp>
+        <p:nvSpPr>
+          <p:cNvPr id="9" name="TextBox 8"/>
+          <p:cNvSpPr txBox="1"/>
+          <p:nvPr/>
+        </p:nvSpPr>
+        <p:spPr>
+          <a:xfrm rot="16200000">
+            <a:off x="5041942" y="5208877"/>
+            <a:ext cx="1707615" cy="307777"/>
+          </a:xfrm>
+          <a:prstGeom prst="rect">
+            <a:avLst/>
+          </a:prstGeom>
+          <a:noFill/>
+        </p:spPr>
+        <p:txBody>
+          <a:bodyPr wrap="square" rtlCol="0">
+            <a:spAutoFit/>
+          </a:bodyPr>
+          <a:lstStyle/>
+          <a:p>
+            <a:r>
+              <a:rPr lang="en-US" sz="1400" b="1" dirty="0">
+                <a:solidFill>
+                  <a:srgbClr val="00B050"/>
+                </a:solidFill>
+                <a:latin typeface="Arial" panose="020B0604020202020204" pitchFamily="34" charset="0"/>
+                <a:cs typeface="Arial" panose="020B0604020202020204" pitchFamily="34" charset="0"/>
+              </a:rPr>
+              <a:t>r</a:t>
+            </a:r>
+            <a:r>
+              <a:rPr lang="en-US" sz="1400" b="1" dirty="0" smtClean="0">
+                <a:solidFill>
+                  <a:srgbClr val="00B050"/>
+                </a:solidFill>
+                <a:latin typeface="Arial" panose="020B0604020202020204" pitchFamily="34" charset="0"/>
+                <a:cs typeface="Arial" panose="020B0604020202020204" pitchFamily="34" charset="0"/>
+              </a:rPr>
+              <a:t>isk perce</a:t>
+            </a:r>
+            <a:r>
+              <a:rPr lang="en-US" sz="1400" b="1" dirty="0" smtClean="0">
+                <a:solidFill>
+                  <a:srgbClr val="00B050"/>
+                </a:solidFill>
+                <a:latin typeface="Arial" panose="020B0604020202020204" pitchFamily="34" charset="0"/>
+                <a:cs typeface="Arial" panose="020B0604020202020204" pitchFamily="34" charset="0"/>
+              </a:rPr>
+              <a:t>ption</a:t>
+            </a:r>
+            <a:endParaRPr lang="en-US" sz="1400" b="1" dirty="0">
+              <a:solidFill>
+                <a:srgbClr val="00B050"/>
+              </a:solidFill>
+              <a:latin typeface="Arial" panose="020B0604020202020204" pitchFamily="34" charset="0"/>
+              <a:cs typeface="Arial" panose="020B0604020202020204" pitchFamily="34" charset="0"/>
+            </a:endParaRPr>
+          </a:p>
+        </p:txBody>
+      </p:sp>
     </p:spTree>
     <p:extLst>
       <p:ext uri="{BB962C8B-B14F-4D97-AF65-F5344CB8AC3E}">
@@ -6571,6 +6928,13 @@
   <p:clrMapOvr>
     <a:masterClrMapping/>
   </p:clrMapOvr>
+  <p:timing>
+    <p:tnLst>
+      <p:par>
+        <p:cTn id="1" dur="indefinite" restart="never" nodeType="tmRoot"/>
+      </p:par>
+    </p:tnLst>
+  </p:timing>
 </p:sld>
 </file>
 
@@ -6647,6 +7011,13 @@
   <p:clrMapOvr>
     <a:masterClrMapping/>
   </p:clrMapOvr>
+  <p:timing>
+    <p:tnLst>
+      <p:par>
+        <p:cTn id="1" dur="indefinite" restart="never" nodeType="tmRoot"/>
+      </p:par>
+    </p:tnLst>
+  </p:timing>
 </p:sld>
 </file>
 
@@ -7068,6 +7439,13 @@
   <p:clrMapOvr>
     <a:masterClrMapping/>
   </p:clrMapOvr>
+  <p:timing>
+    <p:tnLst>
+      <p:par>
+        <p:cTn id="1" dur="indefinite" restart="never" nodeType="tmRoot"/>
+      </p:par>
+    </p:tnLst>
+  </p:timing>
 </p:sld>
 </file>
 
@@ -8188,6 +8566,13 @@
   <p:clrMapOvr>
     <a:masterClrMapping/>
   </p:clrMapOvr>
+  <p:timing>
+    <p:tnLst>
+      <p:par>
+        <p:cTn id="1" dur="indefinite" restart="never" nodeType="tmRoot"/>
+      </p:par>
+    </p:tnLst>
+  </p:timing>
 </p:sld>
 </file>
 
@@ -9584,6 +9969,13 @@
   <p:clrMapOvr>
     <a:masterClrMapping/>
   </p:clrMapOvr>
+  <p:timing>
+    <p:tnLst>
+      <p:par>
+        <p:cTn id="1" dur="indefinite" restart="never" nodeType="tmRoot"/>
+      </p:par>
+    </p:tnLst>
+  </p:timing>
 </p:sld>
 </file>
 
@@ -9659,14 +10051,7 @@
                 <a:latin typeface="Arial" panose="020B0604020202020204" pitchFamily="34" charset="0"/>
                 <a:cs typeface="Arial" panose="020B0604020202020204" pitchFamily="34" charset="0"/>
               </a:rPr>
-              <a:t>Mathematical Summary</a:t>
-            </a:r>
-            <a:r>
-              <a:rPr lang="en-US" sz="2000" b="1" dirty="0" smtClean="0">
-                <a:latin typeface="Arial" panose="020B0604020202020204" pitchFamily="34" charset="0"/>
-                <a:cs typeface="Arial" panose="020B0604020202020204" pitchFamily="34" charset="0"/>
-              </a:rPr>
-              <a:t>:</a:t>
+              <a:t>Mathematical Summary:</a:t>
             </a:r>
             <a:endParaRPr lang="en-US" sz="2000" b="1" dirty="0">
               <a:solidFill>
@@ -10128,7 +10513,81 @@
       </p:grpSpPr>
       <p:sp>
         <p:nvSpPr>
-          <p:cNvPr id="2" name="Content Placeholder 1"/>
+          <p:cNvPr id="4" name="Title 1">
+            <a:extLst>
+              <a:ext uri="{FF2B5EF4-FFF2-40B4-BE49-F238E27FC236}">
+                <a16:creationId xmlns:a16="http://schemas.microsoft.com/office/drawing/2014/main" id="{E316B5D4-4FE6-49C6-BD43-0BB822385B6D}"/>
+              </a:ext>
+            </a:extLst>
+          </p:cNvPr>
+          <p:cNvSpPr txBox="1">
+            <a:spLocks/>
+          </p:cNvSpPr>
+          <p:nvPr/>
+        </p:nvSpPr>
+        <p:spPr>
+          <a:xfrm>
+            <a:off x="537028" y="211016"/>
+            <a:ext cx="11065035" cy="369087"/>
+          </a:xfrm>
+          <a:prstGeom prst="rect">
+            <a:avLst/>
+          </a:prstGeom>
+          <a:solidFill>
+            <a:srgbClr val="00B0F0"/>
+          </a:solidFill>
+        </p:spPr>
+        <p:txBody>
+          <a:bodyPr vert="horz" lIns="91440" tIns="45720" rIns="91440" bIns="45720" rtlCol="0" anchor="ctr">
+            <a:normAutofit/>
+          </a:bodyPr>
+          <a:lstStyle>
+            <a:lvl1pPr algn="l" defTabSz="914400" rtl="0" eaLnBrk="1" latinLnBrk="0" hangingPunct="1">
+              <a:lnSpc>
+                <a:spcPct val="90000"/>
+              </a:lnSpc>
+              <a:spcBef>
+                <a:spcPct val="0"/>
+              </a:spcBef>
+              <a:buNone/>
+              <a:defRPr sz="4400" kern="1200">
+                <a:solidFill>
+                  <a:schemeClr val="tx1"/>
+                </a:solidFill>
+                <a:latin typeface="+mj-lt"/>
+                <a:ea typeface="+mj-ea"/>
+                <a:cs typeface="+mj-cs"/>
+              </a:defRPr>
+            </a:lvl1pPr>
+          </a:lstStyle>
+          <a:p>
+            <a:r>
+              <a:rPr lang="en-US" sz="2000" b="1" dirty="0" smtClean="0">
+                <a:latin typeface="Arial" panose="020B0604020202020204" pitchFamily="34" charset="0"/>
+                <a:cs typeface="Arial" panose="020B0604020202020204" pitchFamily="34" charset="0"/>
+              </a:rPr>
+              <a:t>Mathematical Summary</a:t>
+            </a:r>
+            <a:r>
+              <a:rPr lang="en-US" sz="2000" b="1" dirty="0" smtClean="0">
+                <a:latin typeface="Arial" panose="020B0604020202020204" pitchFamily="34" charset="0"/>
+                <a:cs typeface="Arial" panose="020B0604020202020204" pitchFamily="34" charset="0"/>
+              </a:rPr>
+              <a:t>:  Risk Perception Defined</a:t>
+            </a:r>
+            <a:endParaRPr lang="en-US" sz="2000" b="1" dirty="0">
+              <a:solidFill>
+                <a:schemeClr val="bg1"/>
+              </a:solidFill>
+              <a:latin typeface="Arial" panose="020B0604020202020204" pitchFamily="34" charset="0"/>
+              <a:cs typeface="Arial" panose="020B0604020202020204" pitchFamily="34" charset="0"/>
+            </a:endParaRPr>
+          </a:p>
+        </p:txBody>
+      </p:sp>
+      <p:sp>
+        <p:nvSpPr>
+          <p:cNvPr id="5" name="Content Placeholder 2"/>
           <p:cNvSpPr>
             <a:spLocks noGrp="1"/>
           </p:cNvSpPr>
@@ -10138,34 +10597,651 @@
         </p:nvSpPr>
         <p:spPr>
           <a:xfrm>
-            <a:off x="916169" y="1121356"/>
-            <a:ext cx="10515600" cy="4351338"/>
+            <a:off x="555896" y="751517"/>
+            <a:ext cx="11212148" cy="5619413"/>
           </a:xfrm>
         </p:spPr>
         <p:txBody>
-          <a:bodyPr/>
+          <a:bodyPr>
+            <a:noAutofit/>
+          </a:bodyPr>
           <a:lstStyle/>
           <a:p>
-            <a:endParaRPr lang="en-US" dirty="0" smtClean="0"/>
-          </a:p>
-          <a:p>
-            <a:endParaRPr lang="en-US" dirty="0"/>
-          </a:p>
-          <a:p>
-            <a:endParaRPr lang="en-US" dirty="0" smtClean="0"/>
+            <a:pPr marL="0" indent="0">
+              <a:buNone/>
+            </a:pPr>
+            <a:endParaRPr lang="en-US" sz="1400" dirty="0">
+              <a:latin typeface="Arial" panose="020B0604020202020204" pitchFamily="34" charset="0"/>
+              <a:cs typeface="Arial" panose="020B0604020202020204" pitchFamily="34" charset="0"/>
+            </a:endParaRPr>
           </a:p>
           <a:p>
             <a:pPr marL="0" indent="0" algn="ctr">
               <a:buNone/>
             </a:pPr>
             <a:r>
-              <a:rPr lang="en-US" sz="4800" dirty="0" smtClean="0">
-                <a:latin typeface="Arial" panose="020B0604020202020204" pitchFamily="34" charset="0"/>
-                <a:cs typeface="Arial" panose="020B0604020202020204" pitchFamily="34" charset="0"/>
-              </a:rPr>
-              <a:t>DATA STORAGE</a:t>
-            </a:r>
-            <a:endParaRPr lang="en-US" sz="4800" dirty="0">
+              <a:rPr lang="en-US" sz="1400" b="1" dirty="0" smtClean="0">
+                <a:latin typeface="Arial" panose="020B0604020202020204" pitchFamily="34" charset="0"/>
+                <a:cs typeface="Arial" panose="020B0604020202020204" pitchFamily="34" charset="0"/>
+              </a:rPr>
+              <a:t>Fatal risk log </a:t>
+            </a:r>
+            <a:r>
+              <a:rPr lang="en-US" sz="1400" b="1" dirty="0" smtClean="0">
+                <a:latin typeface="Arial" panose="020B0604020202020204" pitchFamily="34" charset="0"/>
+                <a:cs typeface="Arial" panose="020B0604020202020204" pitchFamily="34" charset="0"/>
+              </a:rPr>
+              <a:t>factor (</a:t>
+            </a:r>
+            <a:r>
+              <a:rPr lang="en-US" sz="1400" b="1" dirty="0" smtClean="0">
+                <a:solidFill>
+                  <a:srgbClr val="00B050"/>
+                </a:solidFill>
+                <a:latin typeface="Arial" panose="020B0604020202020204" pitchFamily="34" charset="0"/>
+                <a:cs typeface="Arial" panose="020B0604020202020204" pitchFamily="34" charset="0"/>
+              </a:rPr>
+              <a:t>risk perception</a:t>
+            </a:r>
+            <a:r>
+              <a:rPr lang="en-US" sz="1400" b="1" dirty="0" smtClean="0">
+                <a:latin typeface="Arial" panose="020B0604020202020204" pitchFamily="34" charset="0"/>
+                <a:cs typeface="Arial" panose="020B0604020202020204" pitchFamily="34" charset="0"/>
+              </a:rPr>
+              <a:t>) </a:t>
+            </a:r>
+            <a:r>
+              <a:rPr lang="en-US" sz="1400" b="1" dirty="0" smtClean="0">
+                <a:latin typeface="Arial" panose="020B0604020202020204" pitchFamily="34" charset="0"/>
+                <a:cs typeface="Arial" panose="020B0604020202020204" pitchFamily="34" charset="0"/>
+              </a:rPr>
+              <a:t>=  -1 * LOG10 [ AVG(FATAL_COUNT / INJURY_COUNT) </a:t>
+            </a:r>
+            <a:r>
+              <a:rPr lang="en-US" sz="1400" b="1" dirty="0" smtClean="0">
+                <a:latin typeface="Arial" panose="020B0604020202020204" pitchFamily="34" charset="0"/>
+                <a:cs typeface="Arial" panose="020B0604020202020204" pitchFamily="34" charset="0"/>
+              </a:rPr>
+              <a:t>]</a:t>
+            </a:r>
+          </a:p>
+          <a:p>
+            <a:pPr marL="0" indent="0" algn="ctr">
+              <a:buNone/>
+            </a:pPr>
+            <a:endParaRPr lang="en-US" sz="1400" b="1" dirty="0">
+              <a:latin typeface="Arial" panose="020B0604020202020204" pitchFamily="34" charset="0"/>
+              <a:cs typeface="Arial" panose="020B0604020202020204" pitchFamily="34" charset="0"/>
+            </a:endParaRPr>
+          </a:p>
+          <a:p>
+            <a:pPr marL="0" indent="0">
+              <a:buNone/>
+            </a:pPr>
+            <a:r>
+              <a:rPr lang="en-US" sz="1400" dirty="0" smtClean="0">
+                <a:latin typeface="Arial" panose="020B0604020202020204" pitchFamily="34" charset="0"/>
+                <a:cs typeface="Arial" panose="020B0604020202020204" pitchFamily="34" charset="0"/>
+              </a:rPr>
+              <a:t>The “Fatal risk log factor”, is not only the log of fatalities count divided by injuries count, it is also a measure of risk perception.</a:t>
+            </a:r>
+          </a:p>
+          <a:p>
+            <a:pPr marL="0" indent="0">
+              <a:buNone/>
+            </a:pPr>
+            <a:endParaRPr lang="en-US" sz="1400" dirty="0">
+              <a:latin typeface="Arial" panose="020B0604020202020204" pitchFamily="34" charset="0"/>
+              <a:cs typeface="Arial" panose="020B0604020202020204" pitchFamily="34" charset="0"/>
+            </a:endParaRPr>
+          </a:p>
+          <a:p>
+            <a:pPr marL="0" indent="0">
+              <a:buNone/>
+            </a:pPr>
+            <a:r>
+              <a:rPr lang="en-US" sz="1400" dirty="0" smtClean="0">
+                <a:latin typeface="Arial" panose="020B0604020202020204" pitchFamily="34" charset="0"/>
+                <a:cs typeface="Arial" panose="020B0604020202020204" pitchFamily="34" charset="0"/>
+              </a:rPr>
+              <a:t>In our analysis we will end up with a graph that represents risk perception vs a measure of risk. We will use this graph to analyze the overall response of the data.</a:t>
+            </a:r>
+            <a:endParaRPr lang="en-US" sz="1400" dirty="0" smtClean="0">
+              <a:latin typeface="Arial" panose="020B0604020202020204" pitchFamily="34" charset="0"/>
+              <a:cs typeface="Arial" panose="020B0604020202020204" pitchFamily="34" charset="0"/>
+            </a:endParaRPr>
+          </a:p>
+          <a:p>
+            <a:pPr marL="0" indent="0">
+              <a:buNone/>
+            </a:pPr>
+            <a:endParaRPr lang="en-US" sz="1400" dirty="0">
+              <a:latin typeface="Arial" panose="020B0604020202020204" pitchFamily="34" charset="0"/>
+              <a:cs typeface="Arial" panose="020B0604020202020204" pitchFamily="34" charset="0"/>
+            </a:endParaRPr>
+          </a:p>
+          <a:p>
+            <a:pPr marL="0" indent="0">
+              <a:buNone/>
+            </a:pPr>
+            <a:endParaRPr lang="en-US" sz="1400" dirty="0" smtClean="0">
+              <a:latin typeface="Arial" panose="020B0604020202020204" pitchFamily="34" charset="0"/>
+              <a:cs typeface="Arial" panose="020B0604020202020204" pitchFamily="34" charset="0"/>
+            </a:endParaRPr>
+          </a:p>
+          <a:p>
+            <a:pPr marL="0" indent="0">
+              <a:buNone/>
+            </a:pPr>
+            <a:endParaRPr lang="en-US" sz="1400" dirty="0">
+              <a:latin typeface="Arial" panose="020B0604020202020204" pitchFamily="34" charset="0"/>
+              <a:cs typeface="Arial" panose="020B0604020202020204" pitchFamily="34" charset="0"/>
+            </a:endParaRPr>
+          </a:p>
+          <a:p>
+            <a:pPr marL="0" indent="0">
+              <a:buNone/>
+            </a:pPr>
+            <a:endParaRPr lang="en-US" sz="1400" dirty="0" smtClean="0">
+              <a:latin typeface="Arial" panose="020B0604020202020204" pitchFamily="34" charset="0"/>
+              <a:cs typeface="Arial" panose="020B0604020202020204" pitchFamily="34" charset="0"/>
+            </a:endParaRPr>
+          </a:p>
+          <a:p>
+            <a:pPr marL="0" indent="0">
+              <a:buNone/>
+            </a:pPr>
+            <a:endParaRPr lang="en-US" sz="1400" dirty="0">
+              <a:latin typeface="Arial" panose="020B0604020202020204" pitchFamily="34" charset="0"/>
+              <a:cs typeface="Arial" panose="020B0604020202020204" pitchFamily="34" charset="0"/>
+            </a:endParaRPr>
+          </a:p>
+          <a:p>
+            <a:pPr marL="0" indent="0">
+              <a:buNone/>
+            </a:pPr>
+            <a:r>
+              <a:rPr lang="en-US" sz="1400" dirty="0" smtClean="0">
+                <a:latin typeface="Arial" panose="020B0604020202020204" pitchFamily="34" charset="0"/>
+                <a:cs typeface="Arial" panose="020B0604020202020204" pitchFamily="34" charset="0"/>
+              </a:rPr>
+              <a:t> </a:t>
+            </a:r>
+          </a:p>
+          <a:p>
+            <a:pPr marL="0" indent="0" algn="ctr">
+              <a:buNone/>
+            </a:pPr>
+            <a:endParaRPr lang="en-US" sz="1400" b="1" dirty="0" smtClean="0">
+              <a:latin typeface="Arial" panose="020B0604020202020204" pitchFamily="34" charset="0"/>
+              <a:cs typeface="Arial" panose="020B0604020202020204" pitchFamily="34" charset="0"/>
+            </a:endParaRPr>
+          </a:p>
+          <a:p>
+            <a:pPr marL="0" indent="0">
+              <a:buNone/>
+            </a:pPr>
+            <a:endParaRPr lang="en-US" sz="1400" dirty="0">
+              <a:latin typeface="Arial" panose="020B0604020202020204" pitchFamily="34" charset="0"/>
+              <a:cs typeface="Arial" panose="020B0604020202020204" pitchFamily="34" charset="0"/>
+            </a:endParaRPr>
+          </a:p>
+          <a:p>
+            <a:pPr marL="0" indent="0">
+              <a:buNone/>
+            </a:pPr>
+            <a:endParaRPr lang="en-US" sz="1400" dirty="0" smtClean="0">
+              <a:latin typeface="Arial" panose="020B0604020202020204" pitchFamily="34" charset="0"/>
+              <a:cs typeface="Arial" panose="020B0604020202020204" pitchFamily="34" charset="0"/>
+            </a:endParaRPr>
+          </a:p>
+          <a:p>
+            <a:pPr marL="0" indent="0">
+              <a:buNone/>
+            </a:pPr>
+            <a:endParaRPr lang="en-US" sz="1400" dirty="0">
+              <a:latin typeface="Arial" panose="020B0604020202020204" pitchFamily="34" charset="0"/>
+              <a:cs typeface="Arial" panose="020B0604020202020204" pitchFamily="34" charset="0"/>
+            </a:endParaRPr>
+          </a:p>
+          <a:p>
+            <a:pPr marL="0" indent="0">
+              <a:buNone/>
+            </a:pPr>
+            <a:endParaRPr lang="en-US" sz="1400" dirty="0" smtClean="0">
+              <a:latin typeface="Arial" panose="020B0604020202020204" pitchFamily="34" charset="0"/>
+              <a:cs typeface="Arial" panose="020B0604020202020204" pitchFamily="34" charset="0"/>
+            </a:endParaRPr>
+          </a:p>
+          <a:p>
+            <a:pPr marL="0" indent="0">
+              <a:buNone/>
+            </a:pPr>
+            <a:endParaRPr lang="en-US" sz="1400" dirty="0" smtClean="0">
+              <a:latin typeface="Arial" panose="020B0604020202020204" pitchFamily="34" charset="0"/>
+              <a:cs typeface="Arial" panose="020B0604020202020204" pitchFamily="34" charset="0"/>
+            </a:endParaRPr>
+          </a:p>
+          <a:p>
+            <a:pPr marL="0" indent="0">
+              <a:buNone/>
+            </a:pPr>
+            <a:endParaRPr lang="en-US" sz="1400" dirty="0">
+              <a:latin typeface="Arial" panose="020B0604020202020204" pitchFamily="34" charset="0"/>
+              <a:cs typeface="Arial" panose="020B0604020202020204" pitchFamily="34" charset="0"/>
+            </a:endParaRPr>
+          </a:p>
+          <a:p>
+            <a:pPr marL="0" indent="0">
+              <a:buNone/>
+            </a:pPr>
+            <a:endParaRPr lang="en-US" sz="1400" dirty="0">
+              <a:latin typeface="Arial" panose="020B0604020202020204" pitchFamily="34" charset="0"/>
+              <a:cs typeface="Arial" panose="020B0604020202020204" pitchFamily="34" charset="0"/>
+            </a:endParaRPr>
+          </a:p>
+          <a:p>
+            <a:pPr lvl="1"/>
+            <a:endParaRPr lang="en-US" sz="1400" dirty="0" smtClean="0">
+              <a:latin typeface="Arial" panose="020B0604020202020204" pitchFamily="34" charset="0"/>
+              <a:cs typeface="Arial" panose="020B0604020202020204" pitchFamily="34" charset="0"/>
+            </a:endParaRPr>
+          </a:p>
+          <a:p>
+            <a:pPr marL="0" indent="0">
+              <a:buNone/>
+            </a:pPr>
+            <a:endParaRPr lang="en-US" sz="1600" dirty="0">
+              <a:latin typeface="Arial" panose="020B0604020202020204" pitchFamily="34" charset="0"/>
+              <a:cs typeface="Arial" panose="020B0604020202020204" pitchFamily="34" charset="0"/>
+            </a:endParaRPr>
+          </a:p>
+        </p:txBody>
+      </p:sp>
+      <p:grpSp>
+        <p:nvGrpSpPr>
+          <p:cNvPr id="13" name="Group 12">
+            <a:extLst>
+              <a:ext uri="{FF2B5EF4-FFF2-40B4-BE49-F238E27FC236}">
+                <a16:creationId xmlns:a16="http://schemas.microsoft.com/office/drawing/2014/main" id="{18D1CD37-8CFB-4B53-B59A-33FF38E53C98}"/>
+              </a:ext>
+            </a:extLst>
+          </p:cNvPr>
+          <p:cNvGrpSpPr/>
+          <p:nvPr/>
+        </p:nvGrpSpPr>
+        <p:grpSpPr>
+          <a:xfrm>
+            <a:off x="3942079" y="2987040"/>
+            <a:ext cx="4802637" cy="3195159"/>
+            <a:chOff x="7163312" y="1312696"/>
+            <a:chExt cx="3404581" cy="2536739"/>
+          </a:xfrm>
+        </p:grpSpPr>
+        <p:pic>
+          <p:nvPicPr>
+            <p:cNvPr id="14" name="Picture 13">
+              <a:extLst>
+                <a:ext uri="{FF2B5EF4-FFF2-40B4-BE49-F238E27FC236}">
+                  <a16:creationId xmlns:a16="http://schemas.microsoft.com/office/drawing/2014/main" id="{857138F2-54EE-461A-AF01-F5B557EDA7CF}"/>
+                </a:ext>
+              </a:extLst>
+            </p:cNvPr>
+            <p:cNvPicPr>
+              <a:picLocks noChangeAspect="1"/>
+            </p:cNvPicPr>
+            <p:nvPr/>
+          </p:nvPicPr>
+          <p:blipFill>
+            <a:blip r:embed="rId2"/>
+            <a:stretch>
+              <a:fillRect/>
+            </a:stretch>
+          </p:blipFill>
+          <p:spPr>
+            <a:xfrm>
+              <a:off x="7483498" y="1312696"/>
+              <a:ext cx="3084395" cy="2405460"/>
+            </a:xfrm>
+            <a:prstGeom prst="rect">
+              <a:avLst/>
+            </a:prstGeom>
+          </p:spPr>
+        </p:pic>
+        <p:sp>
+          <p:nvSpPr>
+            <p:cNvPr id="15" name="TextBox 14">
+              <a:extLst>
+                <a:ext uri="{FF2B5EF4-FFF2-40B4-BE49-F238E27FC236}">
+                  <a16:creationId xmlns:a16="http://schemas.microsoft.com/office/drawing/2014/main" id="{38E521F6-9726-46B2-900F-D4EA8FC4E730}"/>
+                </a:ext>
+              </a:extLst>
+            </p:cNvPr>
+            <p:cNvSpPr txBox="1"/>
+            <p:nvPr/>
+          </p:nvSpPr>
+          <p:spPr>
+            <a:xfrm>
+              <a:off x="8888169" y="3627271"/>
+              <a:ext cx="334892" cy="222164"/>
+            </a:xfrm>
+            <a:prstGeom prst="rect">
+              <a:avLst/>
+            </a:prstGeom>
+            <a:noFill/>
+          </p:spPr>
+          <p:txBody>
+            <a:bodyPr wrap="none" rtlCol="0">
+              <a:spAutoFit/>
+            </a:bodyPr>
+            <a:lstStyle/>
+            <a:p>
+              <a:r>
+                <a:rPr lang="en-US" sz="1600" b="1" dirty="0" smtClean="0"/>
+                <a:t>Risk</a:t>
+              </a:r>
+              <a:endParaRPr lang="en-US" sz="1600" b="1" dirty="0"/>
+            </a:p>
+          </p:txBody>
+        </p:sp>
+        <p:sp>
+          <p:nvSpPr>
+            <p:cNvPr id="16" name="TextBox 15">
+              <a:extLst>
+                <a:ext uri="{FF2B5EF4-FFF2-40B4-BE49-F238E27FC236}">
+                  <a16:creationId xmlns:a16="http://schemas.microsoft.com/office/drawing/2014/main" id="{EE045E5E-F5D0-4BEE-A885-3875B38EE359}"/>
+                </a:ext>
+              </a:extLst>
+            </p:cNvPr>
+            <p:cNvSpPr txBox="1"/>
+            <p:nvPr/>
+          </p:nvSpPr>
+          <p:spPr>
+            <a:xfrm>
+              <a:off x="7163312" y="1875857"/>
+              <a:ext cx="428401" cy="1287919"/>
+            </a:xfrm>
+            <a:prstGeom prst="rect">
+              <a:avLst/>
+            </a:prstGeom>
+            <a:noFill/>
+          </p:spPr>
+          <p:txBody>
+            <a:bodyPr vert="vert270" wrap="none" rtlCol="0">
+              <a:spAutoFit/>
+            </a:bodyPr>
+            <a:lstStyle/>
+            <a:p>
+              <a:pPr algn="ctr"/>
+              <a:r>
+                <a:rPr lang="en-US" sz="1600" b="1" dirty="0" smtClean="0"/>
+                <a:t>Relative Fatality </a:t>
+              </a:r>
+              <a:r>
+                <a:rPr lang="en-US" sz="1600" b="1" dirty="0" smtClean="0"/>
+                <a:t>Index</a:t>
+              </a:r>
+            </a:p>
+            <a:p>
+              <a:pPr algn="ctr"/>
+              <a:r>
+                <a:rPr lang="en-US" sz="1600" b="1" dirty="0" smtClean="0"/>
+                <a:t>Risk perception</a:t>
+              </a:r>
+              <a:endParaRPr lang="en-US" sz="1600" b="1" dirty="0"/>
+            </a:p>
+          </p:txBody>
+        </p:sp>
+      </p:grpSp>
+      <p:sp>
+        <p:nvSpPr>
+          <p:cNvPr id="17" name="Rectangle 16">
+            <a:extLst>
+              <a:ext uri="{FF2B5EF4-FFF2-40B4-BE49-F238E27FC236}">
+                <a16:creationId xmlns:a16="http://schemas.microsoft.com/office/drawing/2014/main" id="{C3E4F717-B1FD-43B1-8303-3247F5E07D6D}"/>
+              </a:ext>
+            </a:extLst>
+          </p:cNvPr>
+          <p:cNvSpPr/>
+          <p:nvPr/>
+        </p:nvSpPr>
+        <p:spPr>
+          <a:xfrm>
+            <a:off x="4510921" y="6450467"/>
+            <a:ext cx="3717684" cy="286682"/>
+          </a:xfrm>
+          <a:prstGeom prst="rect">
+            <a:avLst/>
+          </a:prstGeom>
+        </p:spPr>
+        <p:txBody>
+          <a:bodyPr wrap="none">
+            <a:spAutoFit/>
+          </a:bodyPr>
+          <a:lstStyle/>
+          <a:p>
+            <a:pPr marL="457200" marR="0" indent="-457200">
+              <a:lnSpc>
+                <a:spcPct val="115000"/>
+              </a:lnSpc>
+              <a:spcBef>
+                <a:spcPts val="0"/>
+              </a:spcBef>
+              <a:spcAft>
+                <a:spcPts val="0"/>
+              </a:spcAft>
+            </a:pPr>
+            <a:r>
+              <a:rPr lang="en-US" sz="1200" i="1" dirty="0">
+                <a:solidFill>
+                  <a:srgbClr val="000000"/>
+                </a:solidFill>
+                <a:latin typeface="Arial" panose="020B0604020202020204" pitchFamily="34" charset="0"/>
+                <a:ea typeface="Times New Roman" panose="02020603050405020304" pitchFamily="18" charset="0"/>
+                <a:cs typeface="Arial" panose="020B0604020202020204" pitchFamily="34" charset="0"/>
+              </a:rPr>
+              <a:t>Figure 1</a:t>
+            </a:r>
+            <a:r>
+              <a:rPr lang="en-US" sz="1200" dirty="0">
+                <a:solidFill>
+                  <a:srgbClr val="000000"/>
+                </a:solidFill>
+                <a:latin typeface="Arial" panose="020B0604020202020204" pitchFamily="34" charset="0"/>
+                <a:ea typeface="Times New Roman" panose="02020603050405020304" pitchFamily="18" charset="0"/>
+                <a:cs typeface="Arial" panose="020B0604020202020204" pitchFamily="34" charset="0"/>
+              </a:rPr>
+              <a:t>:  </a:t>
+            </a:r>
+            <a:r>
+              <a:rPr lang="en-US" altLang="en-US" sz="1200" dirty="0">
+                <a:latin typeface="Arial" panose="020B0604020202020204" pitchFamily="34" charset="0"/>
+                <a:cs typeface="Arial" panose="020B0604020202020204" pitchFamily="34" charset="0"/>
+              </a:rPr>
+              <a:t>Graphical Representation of Hypothesis</a:t>
+            </a:r>
+            <a:r>
+              <a:rPr lang="en-US" sz="1200" dirty="0">
+                <a:latin typeface="Arial" panose="020B0604020202020204" pitchFamily="34" charset="0"/>
+                <a:cs typeface="Arial" panose="020B0604020202020204" pitchFamily="34" charset="0"/>
+              </a:rPr>
+              <a:t>.  </a:t>
+            </a:r>
+          </a:p>
+        </p:txBody>
+      </p:sp>
+      <p:cxnSp>
+        <p:nvCxnSpPr>
+          <p:cNvPr id="18" name="Straight Arrow Connector 17"/>
+          <p:cNvCxnSpPr/>
+          <p:nvPr/>
+        </p:nvCxnSpPr>
+        <p:spPr>
+          <a:xfrm flipV="1">
+            <a:off x="4968240" y="6248917"/>
+            <a:ext cx="3616960" cy="30136"/>
+          </a:xfrm>
+          <a:prstGeom prst="straightConnector1">
+            <a:avLst/>
+          </a:prstGeom>
+          <a:ln w="25400">
+            <a:solidFill>
+              <a:srgbClr val="FF0000"/>
+            </a:solidFill>
+            <a:prstDash val="dash"/>
+            <a:tailEnd type="triangle" w="lg" len="lg"/>
+          </a:ln>
+        </p:spPr>
+        <p:style>
+          <a:lnRef idx="1">
+            <a:schemeClr val="accent1"/>
+          </a:lnRef>
+          <a:fillRef idx="0">
+            <a:schemeClr val="accent1"/>
+          </a:fillRef>
+          <a:effectRef idx="0">
+            <a:schemeClr val="accent1"/>
+          </a:effectRef>
+          <a:fontRef idx="minor">
+            <a:schemeClr val="tx1"/>
+          </a:fontRef>
+        </p:style>
+      </p:cxnSp>
+      <p:sp>
+        <p:nvSpPr>
+          <p:cNvPr id="19" name="TextBox 18"/>
+          <p:cNvSpPr txBox="1"/>
+          <p:nvPr/>
+        </p:nvSpPr>
+        <p:spPr>
+          <a:xfrm>
+            <a:off x="4248858" y="6104297"/>
+            <a:ext cx="503664" cy="307777"/>
+          </a:xfrm>
+          <a:prstGeom prst="rect">
+            <a:avLst/>
+          </a:prstGeom>
+          <a:noFill/>
+        </p:spPr>
+        <p:txBody>
+          <a:bodyPr wrap="square" rtlCol="0">
+            <a:spAutoFit/>
+          </a:bodyPr>
+          <a:lstStyle/>
+          <a:p>
+            <a:r>
+              <a:rPr lang="en-US" sz="1400" b="1" dirty="0" smtClean="0">
+                <a:solidFill>
+                  <a:srgbClr val="FF0000"/>
+                </a:solidFill>
+                <a:latin typeface="Arial" panose="020B0604020202020204" pitchFamily="34" charset="0"/>
+                <a:cs typeface="Arial" panose="020B0604020202020204" pitchFamily="34" charset="0"/>
+              </a:rPr>
+              <a:t>risk</a:t>
+            </a:r>
+            <a:endParaRPr lang="en-US" sz="1400" b="1" dirty="0">
+              <a:solidFill>
+                <a:srgbClr val="FF0000"/>
+              </a:solidFill>
+              <a:latin typeface="Arial" panose="020B0604020202020204" pitchFamily="34" charset="0"/>
+              <a:cs typeface="Arial" panose="020B0604020202020204" pitchFamily="34" charset="0"/>
+            </a:endParaRPr>
+          </a:p>
+        </p:txBody>
+      </p:sp>
+      <p:cxnSp>
+        <p:nvCxnSpPr>
+          <p:cNvPr id="20" name="Straight Arrow Connector 19"/>
+          <p:cNvCxnSpPr/>
+          <p:nvPr/>
+        </p:nvCxnSpPr>
+        <p:spPr>
+          <a:xfrm flipV="1">
+            <a:off x="3545678" y="3261429"/>
+            <a:ext cx="10399" cy="1783161"/>
+          </a:xfrm>
+          <a:prstGeom prst="straightConnector1">
+            <a:avLst/>
+          </a:prstGeom>
+          <a:ln w="25400">
+            <a:solidFill>
+              <a:srgbClr val="00B050"/>
+            </a:solidFill>
+            <a:prstDash val="dash"/>
+            <a:tailEnd type="triangle" w="lg" len="lg"/>
+          </a:ln>
+        </p:spPr>
+        <p:style>
+          <a:lnRef idx="1">
+            <a:schemeClr val="accent1"/>
+          </a:lnRef>
+          <a:fillRef idx="0">
+            <a:schemeClr val="accent1"/>
+          </a:fillRef>
+          <a:effectRef idx="0">
+            <a:schemeClr val="accent1"/>
+          </a:effectRef>
+          <a:fontRef idx="minor">
+            <a:schemeClr val="tx1"/>
+          </a:fontRef>
+        </p:style>
+      </p:cxnSp>
+      <p:sp>
+        <p:nvSpPr>
+          <p:cNvPr id="21" name="TextBox 20"/>
+          <p:cNvSpPr txBox="1"/>
+          <p:nvPr/>
+        </p:nvSpPr>
+        <p:spPr>
+          <a:xfrm rot="16200000">
+            <a:off x="2691870" y="5442771"/>
+            <a:ext cx="1707615" cy="307777"/>
+          </a:xfrm>
+          <a:prstGeom prst="rect">
+            <a:avLst/>
+          </a:prstGeom>
+          <a:noFill/>
+        </p:spPr>
+        <p:txBody>
+          <a:bodyPr wrap="square" rtlCol="0">
+            <a:spAutoFit/>
+          </a:bodyPr>
+          <a:lstStyle/>
+          <a:p>
+            <a:r>
+              <a:rPr lang="en-US" sz="1400" b="1" dirty="0">
+                <a:solidFill>
+                  <a:srgbClr val="00B050"/>
+                </a:solidFill>
+                <a:latin typeface="Arial" panose="020B0604020202020204" pitchFamily="34" charset="0"/>
+                <a:cs typeface="Arial" panose="020B0604020202020204" pitchFamily="34" charset="0"/>
+              </a:rPr>
+              <a:t>r</a:t>
+            </a:r>
+            <a:r>
+              <a:rPr lang="en-US" sz="1400" b="1" dirty="0" smtClean="0">
+                <a:solidFill>
+                  <a:srgbClr val="00B050"/>
+                </a:solidFill>
+                <a:latin typeface="Arial" panose="020B0604020202020204" pitchFamily="34" charset="0"/>
+                <a:cs typeface="Arial" panose="020B0604020202020204" pitchFamily="34" charset="0"/>
+              </a:rPr>
+              <a:t>isk perce</a:t>
+            </a:r>
+            <a:r>
+              <a:rPr lang="en-US" sz="1400" b="1" dirty="0" smtClean="0">
+                <a:solidFill>
+                  <a:srgbClr val="00B050"/>
+                </a:solidFill>
+                <a:latin typeface="Arial" panose="020B0604020202020204" pitchFamily="34" charset="0"/>
+                <a:cs typeface="Arial" panose="020B0604020202020204" pitchFamily="34" charset="0"/>
+              </a:rPr>
+              <a:t>ption</a:t>
+            </a:r>
+            <a:endParaRPr lang="en-US" sz="1400" b="1" dirty="0">
+              <a:solidFill>
+                <a:srgbClr val="00B050"/>
+              </a:solidFill>
               <a:latin typeface="Arial" panose="020B0604020202020204" pitchFamily="34" charset="0"/>
               <a:cs typeface="Arial" panose="020B0604020202020204" pitchFamily="34" charset="0"/>
             </a:endParaRPr>
@@ -10175,13 +11251,20 @@
     </p:spTree>
     <p:extLst>
       <p:ext uri="{BB962C8B-B14F-4D97-AF65-F5344CB8AC3E}">
-        <p14:creationId xmlns:p14="http://schemas.microsoft.com/office/powerpoint/2010/main" val="2244037764"/>
+        <p14:creationId xmlns:p14="http://schemas.microsoft.com/office/powerpoint/2010/main" val="1558803807"/>
       </p:ext>
     </p:extLst>
   </p:cSld>
   <p:clrMapOvr>
     <a:masterClrMapping/>
   </p:clrMapOvr>
+  <p:timing>
+    <p:tnLst>
+      <p:par>
+        <p:cTn id="1" dur="indefinite" restart="never" nodeType="tmRoot"/>
+      </p:par>
+    </p:tnLst>
+  </p:timing>
 </p:sld>
 </file>
 

</xml_diff>

<commit_message>
adding progress action plan and updating pptx
</commit_message>
<xml_diff>
--- a/D2-documentation/Data Analysis.pptx
+++ b/D2-documentation/Data Analysis.pptx
@@ -5,7 +5,7 @@
     <p:sldMasterId id="2147483648" r:id="rId1"/>
   </p:sldMasterIdLst>
   <p:notesMasterIdLst>
-    <p:notesMasterId r:id="rId19"/>
+    <p:notesMasterId r:id="rId20"/>
   </p:notesMasterIdLst>
   <p:sldIdLst>
     <p:sldId id="439" r:id="rId2"/>
@@ -21,10 +21,11 @@
     <p:sldId id="452" r:id="rId12"/>
     <p:sldId id="460" r:id="rId13"/>
     <p:sldId id="465" r:id="rId14"/>
-    <p:sldId id="457" r:id="rId15"/>
-    <p:sldId id="466" r:id="rId16"/>
-    <p:sldId id="467" r:id="rId17"/>
-    <p:sldId id="471" r:id="rId18"/>
+    <p:sldId id="472" r:id="rId15"/>
+    <p:sldId id="473" r:id="rId16"/>
+    <p:sldId id="474" r:id="rId17"/>
+    <p:sldId id="475" r:id="rId18"/>
+    <p:sldId id="476" r:id="rId19"/>
   </p:sldIdLst>
   <p:sldSz cx="12192000" cy="6858000"/>
   <p:notesSz cx="6858000" cy="9144000"/>
@@ -557,7 +558,313 @@
     </p:spTree>
     <p:extLst>
       <p:ext uri="{BB962C8B-B14F-4D97-AF65-F5344CB8AC3E}">
-        <p14:creationId xmlns:p14="http://schemas.microsoft.com/office/powerpoint/2010/main" val="4032170760"/>
+        <p14:creationId xmlns:p14="http://schemas.microsoft.com/office/powerpoint/2010/main" val="4143623801"/>
+      </p:ext>
+    </p:extLst>
+  </p:cSld>
+  <p:clrMapOvr>
+    <a:masterClrMapping/>
+  </p:clrMapOvr>
+</p:notes>
+</file>
+
+<file path=ppt/notesSlides/notesSlide2.xml><?xml version="1.0" encoding="utf-8"?>
+<p:notes xmlns:a="http://schemas.openxmlformats.org/drawingml/2006/main" xmlns:r="http://schemas.openxmlformats.org/officeDocument/2006/relationships" xmlns:p="http://schemas.openxmlformats.org/presentationml/2006/main">
+  <p:cSld>
+    <p:spTree>
+      <p:nvGrpSpPr>
+        <p:cNvPr id="1" name=""/>
+        <p:cNvGrpSpPr/>
+        <p:nvPr/>
+      </p:nvGrpSpPr>
+      <p:grpSpPr>
+        <a:xfrm>
+          <a:off x="0" y="0"/>
+          <a:ext cx="0" cy="0"/>
+          <a:chOff x="0" y="0"/>
+          <a:chExt cx="0" cy="0"/>
+        </a:xfrm>
+      </p:grpSpPr>
+      <p:sp>
+        <p:nvSpPr>
+          <p:cNvPr id="2" name="Slide Image Placeholder 1"/>
+          <p:cNvSpPr>
+            <a:spLocks noGrp="1" noRot="1" noChangeAspect="1"/>
+          </p:cNvSpPr>
+          <p:nvPr>
+            <p:ph type="sldImg"/>
+          </p:nvPr>
+        </p:nvSpPr>
+        <p:spPr/>
+      </p:sp>
+      <p:sp>
+        <p:nvSpPr>
+          <p:cNvPr id="3" name="Notes Placeholder 2"/>
+          <p:cNvSpPr>
+            <a:spLocks noGrp="1"/>
+          </p:cNvSpPr>
+          <p:nvPr>
+            <p:ph type="body" idx="1"/>
+          </p:nvPr>
+        </p:nvSpPr>
+        <p:spPr/>
+        <p:txBody>
+          <a:bodyPr/>
+          <a:lstStyle/>
+          <a:p>
+            <a:endParaRPr lang="en-US" dirty="0"/>
+          </a:p>
+        </p:txBody>
+      </p:sp>
+      <p:sp>
+        <p:nvSpPr>
+          <p:cNvPr id="4" name="Slide Number Placeholder 3"/>
+          <p:cNvSpPr>
+            <a:spLocks noGrp="1"/>
+          </p:cNvSpPr>
+          <p:nvPr>
+            <p:ph type="sldNum" sz="quarter" idx="10"/>
+          </p:nvPr>
+        </p:nvSpPr>
+        <p:spPr/>
+        <p:txBody>
+          <a:bodyPr/>
+          <a:lstStyle/>
+          <a:p>
+            <a:fld id="{F0E330A2-CD2B-45CA-AD44-A7A41C6AD554}" type="slidenum">
+              <a:rPr lang="en-US" smtClean="0"/>
+              <a:t>15</a:t>
+            </a:fld>
+            <a:endParaRPr lang="en-US"/>
+          </a:p>
+        </p:txBody>
+      </p:sp>
+    </p:spTree>
+    <p:extLst>
+      <p:ext uri="{BB962C8B-B14F-4D97-AF65-F5344CB8AC3E}">
+        <p14:creationId xmlns:p14="http://schemas.microsoft.com/office/powerpoint/2010/main" val="1777308965"/>
+      </p:ext>
+    </p:extLst>
+  </p:cSld>
+  <p:clrMapOvr>
+    <a:masterClrMapping/>
+  </p:clrMapOvr>
+</p:notes>
+</file>
+
+<file path=ppt/notesSlides/notesSlide3.xml><?xml version="1.0" encoding="utf-8"?>
+<p:notes xmlns:a="http://schemas.openxmlformats.org/drawingml/2006/main" xmlns:r="http://schemas.openxmlformats.org/officeDocument/2006/relationships" xmlns:p="http://schemas.openxmlformats.org/presentationml/2006/main">
+  <p:cSld>
+    <p:spTree>
+      <p:nvGrpSpPr>
+        <p:cNvPr id="1" name=""/>
+        <p:cNvGrpSpPr/>
+        <p:nvPr/>
+      </p:nvGrpSpPr>
+      <p:grpSpPr>
+        <a:xfrm>
+          <a:off x="0" y="0"/>
+          <a:ext cx="0" cy="0"/>
+          <a:chOff x="0" y="0"/>
+          <a:chExt cx="0" cy="0"/>
+        </a:xfrm>
+      </p:grpSpPr>
+      <p:sp>
+        <p:nvSpPr>
+          <p:cNvPr id="2" name="Slide Image Placeholder 1"/>
+          <p:cNvSpPr>
+            <a:spLocks noGrp="1" noRot="1" noChangeAspect="1"/>
+          </p:cNvSpPr>
+          <p:nvPr>
+            <p:ph type="sldImg"/>
+          </p:nvPr>
+        </p:nvSpPr>
+        <p:spPr/>
+      </p:sp>
+      <p:sp>
+        <p:nvSpPr>
+          <p:cNvPr id="3" name="Notes Placeholder 2"/>
+          <p:cNvSpPr>
+            <a:spLocks noGrp="1"/>
+          </p:cNvSpPr>
+          <p:nvPr>
+            <p:ph type="body" idx="1"/>
+          </p:nvPr>
+        </p:nvSpPr>
+        <p:spPr/>
+        <p:txBody>
+          <a:bodyPr/>
+          <a:lstStyle/>
+          <a:p>
+            <a:r>
+              <a:rPr lang="en-US" dirty="0"/>
+              <a:t>Greater Risk Perception = less fatalities</a:t>
+            </a:r>
+          </a:p>
+          <a:p>
+            <a:r>
+              <a:rPr lang="en-US" dirty="0"/>
+              <a:t>Fatalities divided by Injuries --</a:t>
+            </a:r>
+            <a:r>
+              <a:rPr lang="en-US" dirty="0">
+                <a:sym typeface="Wingdings" panose="05000000000000000000" pitchFamily="2" charset="2"/>
+              </a:rPr>
+              <a:t> Risk perception profile</a:t>
+            </a:r>
+          </a:p>
+          <a:p>
+            <a:r>
+              <a:rPr lang="en-US" dirty="0">
+                <a:sym typeface="Wingdings" panose="05000000000000000000" pitchFamily="2" charset="2"/>
+              </a:rPr>
+              <a:t>Higher RP, lower fatality rate</a:t>
+            </a:r>
+            <a:endParaRPr lang="en-AU" dirty="0"/>
+          </a:p>
+        </p:txBody>
+      </p:sp>
+      <p:sp>
+        <p:nvSpPr>
+          <p:cNvPr id="4" name="Slide Number Placeholder 3"/>
+          <p:cNvSpPr>
+            <a:spLocks noGrp="1"/>
+          </p:cNvSpPr>
+          <p:nvPr>
+            <p:ph type="sldNum" sz="quarter" idx="5"/>
+          </p:nvPr>
+        </p:nvSpPr>
+        <p:spPr/>
+        <p:txBody>
+          <a:bodyPr/>
+          <a:lstStyle/>
+          <a:p>
+            <a:fld id="{F0E330A2-CD2B-45CA-AD44-A7A41C6AD554}" type="slidenum">
+              <a:rPr lang="en-US" smtClean="0"/>
+              <a:t>16</a:t>
+            </a:fld>
+            <a:endParaRPr lang="en-US"/>
+          </a:p>
+        </p:txBody>
+      </p:sp>
+    </p:spTree>
+    <p:extLst>
+      <p:ext uri="{BB962C8B-B14F-4D97-AF65-F5344CB8AC3E}">
+        <p14:creationId xmlns:p14="http://schemas.microsoft.com/office/powerpoint/2010/main" val="2455590175"/>
+      </p:ext>
+    </p:extLst>
+  </p:cSld>
+  <p:clrMapOvr>
+    <a:masterClrMapping/>
+  </p:clrMapOvr>
+</p:notes>
+</file>
+
+<file path=ppt/notesSlides/notesSlide4.xml><?xml version="1.0" encoding="utf-8"?>
+<p:notes xmlns:a="http://schemas.openxmlformats.org/drawingml/2006/main" xmlns:r="http://schemas.openxmlformats.org/officeDocument/2006/relationships" xmlns:p="http://schemas.openxmlformats.org/presentationml/2006/main">
+  <p:cSld>
+    <p:spTree>
+      <p:nvGrpSpPr>
+        <p:cNvPr id="1" name=""/>
+        <p:cNvGrpSpPr/>
+        <p:nvPr/>
+      </p:nvGrpSpPr>
+      <p:grpSpPr>
+        <a:xfrm>
+          <a:off x="0" y="0"/>
+          <a:ext cx="0" cy="0"/>
+          <a:chOff x="0" y="0"/>
+          <a:chExt cx="0" cy="0"/>
+        </a:xfrm>
+      </p:grpSpPr>
+      <p:sp>
+        <p:nvSpPr>
+          <p:cNvPr id="2" name="Slide Image Placeholder 1"/>
+          <p:cNvSpPr>
+            <a:spLocks noGrp="1" noRot="1" noChangeAspect="1"/>
+          </p:cNvSpPr>
+          <p:nvPr>
+            <p:ph type="sldImg"/>
+          </p:nvPr>
+        </p:nvSpPr>
+        <p:spPr/>
+      </p:sp>
+      <p:sp>
+        <p:nvSpPr>
+          <p:cNvPr id="3" name="Notes Placeholder 2"/>
+          <p:cNvSpPr>
+            <a:spLocks noGrp="1"/>
+          </p:cNvSpPr>
+          <p:nvPr>
+            <p:ph type="body" idx="1"/>
+          </p:nvPr>
+        </p:nvSpPr>
+        <p:spPr/>
+        <p:txBody>
+          <a:bodyPr/>
+          <a:lstStyle/>
+          <a:p>
+            <a:r>
+              <a:rPr lang="en-US" dirty="0"/>
+              <a:t>Why selected the Log Equation used?</a:t>
+            </a:r>
+          </a:p>
+          <a:p>
+            <a:r>
+              <a:rPr lang="en-US" dirty="0"/>
+              <a:t>Because some data has large values and other small.  By taking the log it allows us to look at the data in as a linear distribution.  </a:t>
+            </a:r>
+          </a:p>
+          <a:p>
+            <a:endParaRPr lang="en-US" dirty="0"/>
+          </a:p>
+          <a:p>
+            <a:r>
+              <a:rPr lang="en-US" dirty="0"/>
+              <a:t>Then took the anti log in order to convert back to a true (numerical) fatality/injury rate (independent of occupation size).</a:t>
+            </a:r>
+          </a:p>
+          <a:p>
+            <a:endParaRPr lang="en-US" dirty="0"/>
+          </a:p>
+          <a:p>
+            <a:r>
+              <a:rPr lang="en-US" dirty="0"/>
+              <a:t>The X value is risk.</a:t>
+            </a:r>
+          </a:p>
+          <a:p>
+            <a:endParaRPr lang="en-AU" dirty="0"/>
+          </a:p>
+        </p:txBody>
+      </p:sp>
+      <p:sp>
+        <p:nvSpPr>
+          <p:cNvPr id="4" name="Slide Number Placeholder 3"/>
+          <p:cNvSpPr>
+            <a:spLocks noGrp="1"/>
+          </p:cNvSpPr>
+          <p:nvPr>
+            <p:ph type="sldNum" sz="quarter" idx="5"/>
+          </p:nvPr>
+        </p:nvSpPr>
+        <p:spPr/>
+        <p:txBody>
+          <a:bodyPr/>
+          <a:lstStyle/>
+          <a:p>
+            <a:fld id="{F0E330A2-CD2B-45CA-AD44-A7A41C6AD554}" type="slidenum">
+              <a:rPr lang="en-US" smtClean="0"/>
+              <a:t>18</a:t>
+            </a:fld>
+            <a:endParaRPr lang="en-US"/>
+          </a:p>
+        </p:txBody>
+      </p:sp>
+    </p:spTree>
+    <p:extLst>
+      <p:ext uri="{BB962C8B-B14F-4D97-AF65-F5344CB8AC3E}">
+        <p14:creationId xmlns:p14="http://schemas.microsoft.com/office/powerpoint/2010/main" val="875132715"/>
       </p:ext>
     </p:extLst>
   </p:cSld>
@@ -3527,7 +3834,7 @@
             </a:solidFill>
             <a:extLst>
               <a:ext uri="{C807C97D-BFC1-408E-A445-0C87EB9F89A2}">
-                <ask:lineSketchStyleProps xmlns:ask="http://schemas.microsoft.com/office/drawing/2018/sketchyshapes" xmlns="" sd="1131949855">
+                <ask:lineSketchStyleProps xmlns="" xmlns:ask="http://schemas.microsoft.com/office/drawing/2018/sketchyshapes" sd="1131949855">
                   <a:prstGeom prst="rect">
                     <a:avLst/>
                   </a:prstGeom>
@@ -5384,6 +5691,602 @@
       </p:grpSpPr>
       <p:pic>
         <p:nvPicPr>
+          <p:cNvPr id="32" name="Picture 31"/>
+          <p:cNvPicPr>
+            <a:picLocks noChangeAspect="1"/>
+          </p:cNvPicPr>
+          <p:nvPr/>
+        </p:nvPicPr>
+        <p:blipFill>
+          <a:blip r:embed="rId3"/>
+          <a:stretch>
+            <a:fillRect/>
+          </a:stretch>
+        </p:blipFill>
+        <p:spPr>
+          <a:xfrm>
+            <a:off x="4560882" y="1277736"/>
+            <a:ext cx="6557567" cy="4693396"/>
+          </a:xfrm>
+          <a:prstGeom prst="rect">
+            <a:avLst/>
+          </a:prstGeom>
+        </p:spPr>
+      </p:pic>
+      <p:sp>
+        <p:nvSpPr>
+          <p:cNvPr id="11" name="Title 1">
+            <a:extLst>
+              <a:ext uri="{FF2B5EF4-FFF2-40B4-BE49-F238E27FC236}">
+                <a16:creationId xmlns:a16="http://schemas.microsoft.com/office/drawing/2014/main" id="{E316B5D4-4FE6-49C6-BD43-0BB822385B6D}"/>
+              </a:ext>
+            </a:extLst>
+          </p:cNvPr>
+          <p:cNvSpPr txBox="1">
+            <a:spLocks/>
+          </p:cNvSpPr>
+          <p:nvPr/>
+        </p:nvSpPr>
+        <p:spPr>
+          <a:xfrm>
+            <a:off x="537028" y="211016"/>
+            <a:ext cx="11065035" cy="369087"/>
+          </a:xfrm>
+          <a:prstGeom prst="rect">
+            <a:avLst/>
+          </a:prstGeom>
+          <a:solidFill>
+            <a:srgbClr val="00B0F0"/>
+          </a:solidFill>
+        </p:spPr>
+        <p:txBody>
+          <a:bodyPr vert="horz" lIns="91440" tIns="45720" rIns="91440" bIns="45720" rtlCol="0" anchor="ctr">
+            <a:normAutofit/>
+          </a:bodyPr>
+          <a:lstStyle>
+            <a:lvl1pPr algn="l" defTabSz="914400" rtl="0" eaLnBrk="1" latinLnBrk="0" hangingPunct="1">
+              <a:lnSpc>
+                <a:spcPct val="90000"/>
+              </a:lnSpc>
+              <a:spcBef>
+                <a:spcPct val="0"/>
+              </a:spcBef>
+              <a:buNone/>
+              <a:defRPr sz="4400" kern="1200">
+                <a:solidFill>
+                  <a:schemeClr val="tx1"/>
+                </a:solidFill>
+                <a:latin typeface="+mj-lt"/>
+                <a:ea typeface="+mj-ea"/>
+                <a:cs typeface="+mj-cs"/>
+              </a:defRPr>
+            </a:lvl1pPr>
+          </a:lstStyle>
+          <a:p>
+            <a:r>
+              <a:rPr lang="en-US" sz="2000" b="1" dirty="0">
+                <a:latin typeface="Arial" panose="020B0604020202020204" pitchFamily="34" charset="0"/>
+                <a:cs typeface="Arial" panose="020B0604020202020204" pitchFamily="34" charset="0"/>
+              </a:rPr>
+              <a:t>Example Data:  </a:t>
+            </a:r>
+            <a:r>
+              <a:rPr lang="en-US" sz="2000" b="1" dirty="0" smtClean="0">
+                <a:latin typeface="Arial" panose="020B0604020202020204" pitchFamily="34" charset="0"/>
+                <a:cs typeface="Arial" panose="020B0604020202020204" pitchFamily="34" charset="0"/>
+              </a:rPr>
+              <a:t>Risk Perception Equation</a:t>
+            </a:r>
+            <a:endParaRPr lang="en-US" sz="2000" b="1" dirty="0">
+              <a:solidFill>
+                <a:schemeClr val="bg1"/>
+              </a:solidFill>
+              <a:latin typeface="Arial" panose="020B0604020202020204" pitchFamily="34" charset="0"/>
+              <a:cs typeface="Arial" panose="020B0604020202020204" pitchFamily="34" charset="0"/>
+            </a:endParaRPr>
+          </a:p>
+        </p:txBody>
+      </p:sp>
+      <p:sp>
+        <p:nvSpPr>
+          <p:cNvPr id="14" name="TextBox 13"/>
+          <p:cNvSpPr txBox="1"/>
+          <p:nvPr/>
+        </p:nvSpPr>
+        <p:spPr>
+          <a:xfrm>
+            <a:off x="537028" y="711509"/>
+            <a:ext cx="3387700" cy="3539430"/>
+          </a:xfrm>
+          <a:prstGeom prst="rect">
+            <a:avLst/>
+          </a:prstGeom>
+          <a:noFill/>
+          <a:ln>
+            <a:solidFill>
+              <a:schemeClr val="tx1"/>
+            </a:solidFill>
+          </a:ln>
+        </p:spPr>
+        <p:txBody>
+          <a:bodyPr wrap="square" rtlCol="0">
+            <a:spAutoFit/>
+          </a:bodyPr>
+          <a:lstStyle/>
+          <a:p>
+            <a:endParaRPr lang="en-US" sz="1400" dirty="0">
+              <a:latin typeface="Arial" panose="020B0604020202020204" pitchFamily="34" charset="0"/>
+              <a:cs typeface="Arial" panose="020B0604020202020204" pitchFamily="34" charset="0"/>
+            </a:endParaRPr>
+          </a:p>
+          <a:p>
+            <a:r>
+              <a:rPr lang="en-US" sz="1400" dirty="0" smtClean="0">
+                <a:latin typeface="Arial" panose="020B0604020202020204" pitchFamily="34" charset="0"/>
+                <a:cs typeface="Arial" panose="020B0604020202020204" pitchFamily="34" charset="0"/>
+              </a:rPr>
+              <a:t>Risk perception index function:</a:t>
+            </a:r>
+            <a:endParaRPr lang="en-US" sz="1400" dirty="0">
+              <a:latin typeface="Arial" panose="020B0604020202020204" pitchFamily="34" charset="0"/>
+              <a:cs typeface="Arial" panose="020B0604020202020204" pitchFamily="34" charset="0"/>
+            </a:endParaRPr>
+          </a:p>
+          <a:p>
+            <a:endParaRPr lang="en-US" sz="1400" dirty="0">
+              <a:latin typeface="Arial" panose="020B0604020202020204" pitchFamily="34" charset="0"/>
+              <a:cs typeface="Arial" panose="020B0604020202020204" pitchFamily="34" charset="0"/>
+            </a:endParaRPr>
+          </a:p>
+          <a:p>
+            <a:pPr algn="ctr"/>
+            <a:r>
+              <a:rPr lang="en-US" sz="1400" dirty="0">
+                <a:latin typeface="Arial" panose="020B0604020202020204" pitchFamily="34" charset="0"/>
+                <a:cs typeface="Arial" panose="020B0604020202020204" pitchFamily="34" charset="0"/>
+              </a:rPr>
+              <a:t> </a:t>
+            </a:r>
+            <a:r>
+              <a:rPr lang="en-US" sz="1400" dirty="0" err="1">
+                <a:latin typeface="Arial" panose="020B0604020202020204" pitchFamily="34" charset="0"/>
+                <a:cs typeface="Arial" panose="020B0604020202020204" pitchFamily="34" charset="0"/>
+              </a:rPr>
+              <a:t>y</a:t>
+            </a:r>
+            <a:r>
+              <a:rPr lang="en-US" sz="1400" baseline="-25000" dirty="0" err="1">
+                <a:latin typeface="Arial" panose="020B0604020202020204" pitchFamily="34" charset="0"/>
+                <a:cs typeface="Arial" panose="020B0604020202020204" pitchFamily="34" charset="0"/>
+              </a:rPr>
+              <a:t>log</a:t>
+            </a:r>
+            <a:r>
+              <a:rPr lang="en-US" sz="1400" dirty="0">
+                <a:latin typeface="Arial" panose="020B0604020202020204" pitchFamily="34" charset="0"/>
+                <a:cs typeface="Arial" panose="020B0604020202020204" pitchFamily="34" charset="0"/>
+              </a:rPr>
+              <a:t>  =  [-1 * log10(</a:t>
+            </a:r>
+            <a:r>
+              <a:rPr lang="en-US" sz="1400" dirty="0" err="1">
+                <a:latin typeface="Arial" panose="020B0604020202020204" pitchFamily="34" charset="0"/>
+                <a:cs typeface="Arial" panose="020B0604020202020204" pitchFamily="34" charset="0"/>
+              </a:rPr>
+              <a:t>y</a:t>
+            </a:r>
+            <a:r>
+              <a:rPr lang="en-US" sz="1400" baseline="-25000" dirty="0" err="1">
+                <a:latin typeface="Arial" panose="020B0604020202020204" pitchFamily="34" charset="0"/>
+                <a:cs typeface="Arial" panose="020B0604020202020204" pitchFamily="34" charset="0"/>
+              </a:rPr>
+              <a:t>data</a:t>
+            </a:r>
+            <a:r>
+              <a:rPr lang="en-US" sz="1400" dirty="0" smtClean="0">
+                <a:latin typeface="Arial" panose="020B0604020202020204" pitchFamily="34" charset="0"/>
+                <a:cs typeface="Arial" panose="020B0604020202020204" pitchFamily="34" charset="0"/>
+              </a:rPr>
+              <a:t>)]</a:t>
+            </a:r>
+          </a:p>
+          <a:p>
+            <a:pPr algn="ctr"/>
+            <a:endParaRPr lang="en-US" sz="1400" dirty="0">
+              <a:latin typeface="Arial" panose="020B0604020202020204" pitchFamily="34" charset="0"/>
+              <a:cs typeface="Arial" panose="020B0604020202020204" pitchFamily="34" charset="0"/>
+            </a:endParaRPr>
+          </a:p>
+          <a:p>
+            <a:pPr algn="ctr"/>
+            <a:r>
+              <a:rPr lang="en-US" sz="1400" dirty="0">
+                <a:latin typeface="Arial" panose="020B0604020202020204" pitchFamily="34" charset="0"/>
+                <a:cs typeface="Arial" panose="020B0604020202020204" pitchFamily="34" charset="0"/>
+              </a:rPr>
+              <a:t> </a:t>
+            </a:r>
+            <a:r>
+              <a:rPr lang="en-US" sz="1400" dirty="0" err="1" smtClean="0">
+                <a:latin typeface="Arial" panose="020B0604020202020204" pitchFamily="34" charset="0"/>
+                <a:cs typeface="Arial" panose="020B0604020202020204" pitchFamily="34" charset="0"/>
+              </a:rPr>
+              <a:t>RP</a:t>
+            </a:r>
+            <a:r>
+              <a:rPr lang="en-US" sz="1400" baseline="-25000" dirty="0" err="1" smtClean="0">
+                <a:latin typeface="Arial" panose="020B0604020202020204" pitchFamily="34" charset="0"/>
+                <a:cs typeface="Arial" panose="020B0604020202020204" pitchFamily="34" charset="0"/>
+              </a:rPr>
+              <a:t>log</a:t>
+            </a:r>
+            <a:r>
+              <a:rPr lang="en-US" sz="1400" dirty="0" smtClean="0">
+                <a:latin typeface="Arial" panose="020B0604020202020204" pitchFamily="34" charset="0"/>
+                <a:cs typeface="Arial" panose="020B0604020202020204" pitchFamily="34" charset="0"/>
+              </a:rPr>
+              <a:t>  </a:t>
+            </a:r>
+            <a:r>
+              <a:rPr lang="en-US" sz="1400" dirty="0">
+                <a:latin typeface="Arial" panose="020B0604020202020204" pitchFamily="34" charset="0"/>
+                <a:cs typeface="Arial" panose="020B0604020202020204" pitchFamily="34" charset="0"/>
+              </a:rPr>
+              <a:t>=  [-1 * </a:t>
+            </a:r>
+            <a:r>
+              <a:rPr lang="en-US" sz="1400" dirty="0" smtClean="0">
+                <a:latin typeface="Arial" panose="020B0604020202020204" pitchFamily="34" charset="0"/>
+                <a:cs typeface="Arial" panose="020B0604020202020204" pitchFamily="34" charset="0"/>
+              </a:rPr>
+              <a:t>log10(</a:t>
+            </a:r>
+            <a:r>
+              <a:rPr lang="en-US" sz="1400" dirty="0" err="1" smtClean="0">
+                <a:latin typeface="Arial" panose="020B0604020202020204" pitchFamily="34" charset="0"/>
+                <a:cs typeface="Arial" panose="020B0604020202020204" pitchFamily="34" charset="0"/>
+              </a:rPr>
+              <a:t>FI</a:t>
+            </a:r>
+            <a:r>
+              <a:rPr lang="en-US" sz="1400" baseline="-25000" dirty="0" err="1" smtClean="0">
+                <a:latin typeface="Arial" panose="020B0604020202020204" pitchFamily="34" charset="0"/>
+                <a:cs typeface="Arial" panose="020B0604020202020204" pitchFamily="34" charset="0"/>
+              </a:rPr>
+              <a:t>data</a:t>
+            </a:r>
+            <a:r>
+              <a:rPr lang="en-US" sz="1400" dirty="0">
+                <a:latin typeface="Arial" panose="020B0604020202020204" pitchFamily="34" charset="0"/>
+                <a:cs typeface="Arial" panose="020B0604020202020204" pitchFamily="34" charset="0"/>
+              </a:rPr>
+              <a:t>)]</a:t>
+            </a:r>
+          </a:p>
+          <a:p>
+            <a:pPr algn="ctr"/>
+            <a:endParaRPr lang="en-US" sz="1400" dirty="0">
+              <a:latin typeface="Arial" panose="020B0604020202020204" pitchFamily="34" charset="0"/>
+              <a:cs typeface="Arial" panose="020B0604020202020204" pitchFamily="34" charset="0"/>
+            </a:endParaRPr>
+          </a:p>
+          <a:p>
+            <a:pPr algn="ctr"/>
+            <a:endParaRPr lang="en-US" sz="1400" dirty="0">
+              <a:latin typeface="Arial" panose="020B0604020202020204" pitchFamily="34" charset="0"/>
+              <a:cs typeface="Arial" panose="020B0604020202020204" pitchFamily="34" charset="0"/>
+            </a:endParaRPr>
+          </a:p>
+          <a:p>
+            <a:r>
+              <a:rPr lang="en-US" sz="1400" dirty="0" smtClean="0">
+                <a:latin typeface="Arial" panose="020B0604020202020204" pitchFamily="34" charset="0"/>
+                <a:cs typeface="Arial" panose="020B0604020202020204" pitchFamily="34" charset="0"/>
+              </a:rPr>
+              <a:t>The data is being converted to a semi-log plane, so that it forms a linear distribution that can be easily analyzed.</a:t>
+            </a:r>
+          </a:p>
+          <a:p>
+            <a:endParaRPr lang="en-US" sz="1400" dirty="0">
+              <a:latin typeface="Arial" panose="020B0604020202020204" pitchFamily="34" charset="0"/>
+              <a:cs typeface="Arial" panose="020B0604020202020204" pitchFamily="34" charset="0"/>
+            </a:endParaRPr>
+          </a:p>
+          <a:p>
+            <a:r>
+              <a:rPr lang="en-US" sz="1400" dirty="0" smtClean="0">
+                <a:latin typeface="Arial" panose="020B0604020202020204" pitchFamily="34" charset="0"/>
+                <a:cs typeface="Arial" panose="020B0604020202020204" pitchFamily="34" charset="0"/>
+              </a:rPr>
+              <a:t>The formula above is how we generate the risk perception index from the fatality/injury rate.</a:t>
+            </a:r>
+            <a:endParaRPr lang="en-US" sz="1400" dirty="0">
+              <a:latin typeface="Arial" panose="020B0604020202020204" pitchFamily="34" charset="0"/>
+              <a:cs typeface="Arial" panose="020B0604020202020204" pitchFamily="34" charset="0"/>
+            </a:endParaRPr>
+          </a:p>
+          <a:p>
+            <a:endParaRPr lang="en-US" sz="1400" dirty="0">
+              <a:latin typeface="Arial" panose="020B0604020202020204" pitchFamily="34" charset="0"/>
+              <a:cs typeface="Arial" panose="020B0604020202020204" pitchFamily="34" charset="0"/>
+            </a:endParaRPr>
+          </a:p>
+        </p:txBody>
+      </p:sp>
+      <p:cxnSp>
+        <p:nvCxnSpPr>
+          <p:cNvPr id="16" name="Straight Arrow Connector 15"/>
+          <p:cNvCxnSpPr/>
+          <p:nvPr/>
+        </p:nvCxnSpPr>
+        <p:spPr>
+          <a:xfrm flipV="1">
+            <a:off x="7108424" y="5325338"/>
+            <a:ext cx="755071" cy="6647"/>
+          </a:xfrm>
+          <a:prstGeom prst="straightConnector1">
+            <a:avLst/>
+          </a:prstGeom>
+          <a:ln w="25400">
+            <a:solidFill>
+              <a:schemeClr val="tx1"/>
+            </a:solidFill>
+            <a:prstDash val="dash"/>
+            <a:tailEnd type="triangle" w="lg" len="lg"/>
+          </a:ln>
+        </p:spPr>
+        <p:style>
+          <a:lnRef idx="1">
+            <a:schemeClr val="accent1"/>
+          </a:lnRef>
+          <a:fillRef idx="0">
+            <a:schemeClr val="accent1"/>
+          </a:fillRef>
+          <a:effectRef idx="0">
+            <a:schemeClr val="accent1"/>
+          </a:effectRef>
+          <a:fontRef idx="minor">
+            <a:schemeClr val="tx1"/>
+          </a:fontRef>
+        </p:style>
+      </p:cxnSp>
+      <p:sp>
+        <p:nvSpPr>
+          <p:cNvPr id="17" name="TextBox 16"/>
+          <p:cNvSpPr txBox="1"/>
+          <p:nvPr/>
+        </p:nvSpPr>
+        <p:spPr>
+          <a:xfrm>
+            <a:off x="7175035" y="5403229"/>
+            <a:ext cx="642781" cy="461665"/>
+          </a:xfrm>
+          <a:prstGeom prst="rect">
+            <a:avLst/>
+          </a:prstGeom>
+          <a:noFill/>
+          <a:ln>
+            <a:noFill/>
+          </a:ln>
+        </p:spPr>
+        <p:txBody>
+          <a:bodyPr wrap="square" rtlCol="0">
+            <a:spAutoFit/>
+          </a:bodyPr>
+          <a:lstStyle/>
+          <a:p>
+            <a:r>
+              <a:rPr lang="en-US" sz="1200" dirty="0" smtClean="0">
+                <a:latin typeface="Arial" panose="020B0604020202020204" pitchFamily="34" charset="0"/>
+                <a:cs typeface="Arial" panose="020B0604020202020204" pitchFamily="34" charset="0"/>
+              </a:rPr>
+              <a:t>F / I</a:t>
+            </a:r>
+          </a:p>
+          <a:p>
+            <a:r>
+              <a:rPr lang="en-US" sz="1200" dirty="0" smtClean="0">
+                <a:latin typeface="Arial" panose="020B0604020202020204" pitchFamily="34" charset="0"/>
+                <a:cs typeface="Arial" panose="020B0604020202020204" pitchFamily="34" charset="0"/>
+              </a:rPr>
+              <a:t>(rate)</a:t>
+            </a:r>
+            <a:endParaRPr lang="en-US" sz="1200" dirty="0">
+              <a:latin typeface="Arial" panose="020B0604020202020204" pitchFamily="34" charset="0"/>
+              <a:cs typeface="Arial" panose="020B0604020202020204" pitchFamily="34" charset="0"/>
+            </a:endParaRPr>
+          </a:p>
+        </p:txBody>
+      </p:sp>
+      <p:cxnSp>
+        <p:nvCxnSpPr>
+          <p:cNvPr id="18" name="Straight Arrow Connector 17"/>
+          <p:cNvCxnSpPr/>
+          <p:nvPr/>
+        </p:nvCxnSpPr>
+        <p:spPr>
+          <a:xfrm flipV="1">
+            <a:off x="6625505" y="2991481"/>
+            <a:ext cx="11465" cy="2013919"/>
+          </a:xfrm>
+          <a:prstGeom prst="straightConnector1">
+            <a:avLst/>
+          </a:prstGeom>
+          <a:ln w="25400">
+            <a:solidFill>
+              <a:srgbClr val="7030A0"/>
+            </a:solidFill>
+            <a:prstDash val="dash"/>
+            <a:tailEnd type="triangle" w="lg" len="lg"/>
+          </a:ln>
+        </p:spPr>
+        <p:style>
+          <a:lnRef idx="1">
+            <a:schemeClr val="accent1"/>
+          </a:lnRef>
+          <a:fillRef idx="0">
+            <a:schemeClr val="accent1"/>
+          </a:fillRef>
+          <a:effectRef idx="0">
+            <a:schemeClr val="accent1"/>
+          </a:effectRef>
+          <a:fontRef idx="minor">
+            <a:schemeClr val="tx1"/>
+          </a:fontRef>
+        </p:style>
+      </p:cxnSp>
+      <p:sp>
+        <p:nvSpPr>
+          <p:cNvPr id="20" name="TextBox 19"/>
+          <p:cNvSpPr txBox="1"/>
+          <p:nvPr/>
+        </p:nvSpPr>
+        <p:spPr>
+          <a:xfrm rot="16200000">
+            <a:off x="5248254" y="3539310"/>
+            <a:ext cx="2218335" cy="461665"/>
+          </a:xfrm>
+          <a:prstGeom prst="rect">
+            <a:avLst/>
+          </a:prstGeom>
+          <a:noFill/>
+          <a:ln>
+            <a:noFill/>
+          </a:ln>
+        </p:spPr>
+        <p:txBody>
+          <a:bodyPr wrap="square" rtlCol="0">
+            <a:spAutoFit/>
+          </a:bodyPr>
+          <a:lstStyle/>
+          <a:p>
+            <a:r>
+              <a:rPr lang="en-US" sz="1200" dirty="0" smtClean="0">
+                <a:latin typeface="Arial" panose="020B0604020202020204" pitchFamily="34" charset="0"/>
+                <a:cs typeface="Arial" panose="020B0604020202020204" pitchFamily="34" charset="0"/>
+              </a:rPr>
+              <a:t>RP</a:t>
+            </a:r>
+            <a:endParaRPr lang="en-US" sz="1200" dirty="0">
+              <a:latin typeface="Arial" panose="020B0604020202020204" pitchFamily="34" charset="0"/>
+              <a:cs typeface="Arial" panose="020B0604020202020204" pitchFamily="34" charset="0"/>
+            </a:endParaRPr>
+          </a:p>
+          <a:p>
+            <a:r>
+              <a:rPr lang="en-US" sz="1200" dirty="0" smtClean="0">
+                <a:latin typeface="Arial" panose="020B0604020202020204" pitchFamily="34" charset="0"/>
+                <a:cs typeface="Arial" panose="020B0604020202020204" pitchFamily="34" charset="0"/>
+              </a:rPr>
+              <a:t>(risk perception index)</a:t>
+            </a:r>
+          </a:p>
+        </p:txBody>
+      </p:sp>
+      <p:cxnSp>
+        <p:nvCxnSpPr>
+          <p:cNvPr id="21" name="Straight Connector 20"/>
+          <p:cNvCxnSpPr/>
+          <p:nvPr/>
+        </p:nvCxnSpPr>
+        <p:spPr>
+          <a:xfrm flipH="1" flipV="1">
+            <a:off x="7254644" y="3942216"/>
+            <a:ext cx="24222" cy="1071845"/>
+          </a:xfrm>
+          <a:prstGeom prst="line">
+            <a:avLst/>
+          </a:prstGeom>
+          <a:ln w="12700">
+            <a:solidFill>
+              <a:srgbClr val="FF0000"/>
+            </a:solidFill>
+            <a:prstDash val="dash"/>
+          </a:ln>
+        </p:spPr>
+        <p:style>
+          <a:lnRef idx="1">
+            <a:schemeClr val="accent1"/>
+          </a:lnRef>
+          <a:fillRef idx="0">
+            <a:schemeClr val="accent1"/>
+          </a:fillRef>
+          <a:effectRef idx="0">
+            <a:schemeClr val="accent1"/>
+          </a:effectRef>
+          <a:fontRef idx="minor">
+            <a:schemeClr val="tx1"/>
+          </a:fontRef>
+        </p:style>
+      </p:cxnSp>
+      <p:cxnSp>
+        <p:nvCxnSpPr>
+          <p:cNvPr id="25" name="Straight Connector 24"/>
+          <p:cNvCxnSpPr/>
+          <p:nvPr/>
+        </p:nvCxnSpPr>
+        <p:spPr>
+          <a:xfrm>
+            <a:off x="7125468" y="3942215"/>
+            <a:ext cx="153398" cy="0"/>
+          </a:xfrm>
+          <a:prstGeom prst="line">
+            <a:avLst/>
+          </a:prstGeom>
+          <a:ln w="12700">
+            <a:solidFill>
+              <a:srgbClr val="FF0000"/>
+            </a:solidFill>
+            <a:prstDash val="dash"/>
+          </a:ln>
+        </p:spPr>
+        <p:style>
+          <a:lnRef idx="1">
+            <a:schemeClr val="accent1"/>
+          </a:lnRef>
+          <a:fillRef idx="0">
+            <a:schemeClr val="accent1"/>
+          </a:fillRef>
+          <a:effectRef idx="0">
+            <a:schemeClr val="accent1"/>
+          </a:effectRef>
+          <a:fontRef idx="minor">
+            <a:schemeClr val="tx1"/>
+          </a:fontRef>
+        </p:style>
+      </p:cxnSp>
+    </p:spTree>
+    <p:extLst>
+      <p:ext uri="{BB962C8B-B14F-4D97-AF65-F5344CB8AC3E}">
+        <p14:creationId xmlns:p14="http://schemas.microsoft.com/office/powerpoint/2010/main" val="2600640692"/>
+      </p:ext>
+    </p:extLst>
+  </p:cSld>
+  <p:clrMapOvr>
+    <a:masterClrMapping/>
+  </p:clrMapOvr>
+</p:sld>
+</file>
+
+<file path=ppt/slides/slide15.xml><?xml version="1.0" encoding="utf-8"?>
+<p:sld xmlns:a="http://schemas.openxmlformats.org/drawingml/2006/main" xmlns:r="http://schemas.openxmlformats.org/officeDocument/2006/relationships" xmlns:p="http://schemas.openxmlformats.org/presentationml/2006/main">
+  <p:cSld>
+    <p:spTree>
+      <p:nvGrpSpPr>
+        <p:cNvPr id="1" name=""/>
+        <p:cNvGrpSpPr/>
+        <p:nvPr/>
+      </p:nvGrpSpPr>
+      <p:grpSpPr>
+        <a:xfrm>
+          <a:off x="0" y="0"/>
+          <a:ext cx="0" cy="0"/>
+          <a:chOff x="0" y="0"/>
+          <a:chExt cx="0" cy="0"/>
+        </a:xfrm>
+      </p:grpSpPr>
+      <p:pic>
+        <p:nvPicPr>
           <p:cNvPr id="6" name="Picture 5"/>
           <p:cNvPicPr>
             <a:picLocks noChangeAspect="1"/>
@@ -5505,11 +6408,18 @@
           </a:lstStyle>
           <a:p>
             <a:r>
+              <a:rPr lang="en-US" sz="2000" b="1" dirty="0">
+                <a:latin typeface="Arial" panose="020B0604020202020204" pitchFamily="34" charset="0"/>
+                <a:cs typeface="Arial" panose="020B0604020202020204" pitchFamily="34" charset="0"/>
+              </a:rPr>
+              <a:t>Example Data:  SOC level </a:t>
+            </a:r>
+            <a:r>
               <a:rPr lang="en-US" sz="2000" b="1" dirty="0" smtClean="0">
                 <a:latin typeface="Arial" panose="020B0604020202020204" pitchFamily="34" charset="0"/>
                 <a:cs typeface="Arial" panose="020B0604020202020204" pitchFamily="34" charset="0"/>
               </a:rPr>
-              <a:t>Example Data:  SOC level 1</a:t>
+              <a:t>1 Data for Gender</a:t>
             </a:r>
             <a:endParaRPr lang="en-US" sz="2000" b="1" dirty="0">
               <a:solidFill>
@@ -5584,74 +6494,88 @@
           </a:p>
           <a:p>
             <a:r>
+              <a:rPr lang="en-US" sz="1400" dirty="0">
+                <a:latin typeface="Arial" panose="020B0604020202020204" pitchFamily="34" charset="0"/>
+                <a:cs typeface="Arial" panose="020B0604020202020204" pitchFamily="34" charset="0"/>
+              </a:rPr>
+              <a:t>Since, the relative index is a function of:</a:t>
+            </a:r>
+          </a:p>
+          <a:p>
+            <a:endParaRPr lang="en-US" sz="1400" dirty="0">
+              <a:latin typeface="Arial" panose="020B0604020202020204" pitchFamily="34" charset="0"/>
+              <a:cs typeface="Arial" panose="020B0604020202020204" pitchFamily="34" charset="0"/>
+            </a:endParaRPr>
+          </a:p>
+          <a:p>
+            <a:pPr algn="ctr"/>
+            <a:r>
+              <a:rPr lang="en-US" sz="1400" dirty="0">
+                <a:latin typeface="Arial" panose="020B0604020202020204" pitchFamily="34" charset="0"/>
+                <a:cs typeface="Arial" panose="020B0604020202020204" pitchFamily="34" charset="0"/>
+              </a:rPr>
+              <a:t> </a:t>
+            </a:r>
+            <a:r>
+              <a:rPr lang="en-US" sz="1400" dirty="0" err="1" smtClean="0">
+                <a:latin typeface="Arial" panose="020B0604020202020204" pitchFamily="34" charset="0"/>
+                <a:cs typeface="Arial" panose="020B0604020202020204" pitchFamily="34" charset="0"/>
+              </a:rPr>
+              <a:t>RP</a:t>
+            </a:r>
+            <a:r>
+              <a:rPr lang="en-US" sz="1400" baseline="-25000" dirty="0" err="1" smtClean="0">
+                <a:latin typeface="Arial" panose="020B0604020202020204" pitchFamily="34" charset="0"/>
+                <a:cs typeface="Arial" panose="020B0604020202020204" pitchFamily="34" charset="0"/>
+              </a:rPr>
+              <a:t>log</a:t>
+            </a:r>
+            <a:r>
               <a:rPr lang="en-US" sz="1400" dirty="0" smtClean="0">
                 <a:latin typeface="Arial" panose="020B0604020202020204" pitchFamily="34" charset="0"/>
                 <a:cs typeface="Arial" panose="020B0604020202020204" pitchFamily="34" charset="0"/>
               </a:rPr>
-              <a:t>Since, the relative index is a function of:</a:t>
-            </a:r>
-          </a:p>
-          <a:p>
-            <a:endParaRPr lang="en-US" sz="1400" dirty="0" smtClean="0">
-              <a:latin typeface="Arial" panose="020B0604020202020204" pitchFamily="34" charset="0"/>
-              <a:cs typeface="Arial" panose="020B0604020202020204" pitchFamily="34" charset="0"/>
-            </a:endParaRPr>
+              <a:t>  </a:t>
+            </a:r>
+            <a:r>
+              <a:rPr lang="en-US" sz="1400" dirty="0">
+                <a:latin typeface="Arial" panose="020B0604020202020204" pitchFamily="34" charset="0"/>
+                <a:cs typeface="Arial" panose="020B0604020202020204" pitchFamily="34" charset="0"/>
+              </a:rPr>
+              <a:t>=  [-1 * </a:t>
+            </a:r>
+            <a:r>
+              <a:rPr lang="en-US" sz="1400" dirty="0" smtClean="0">
+                <a:latin typeface="Arial" panose="020B0604020202020204" pitchFamily="34" charset="0"/>
+                <a:cs typeface="Arial" panose="020B0604020202020204" pitchFamily="34" charset="0"/>
+              </a:rPr>
+              <a:t>log10(</a:t>
+            </a:r>
+            <a:r>
+              <a:rPr lang="en-US" sz="1400" dirty="0" err="1" smtClean="0">
+                <a:latin typeface="Arial" panose="020B0604020202020204" pitchFamily="34" charset="0"/>
+                <a:cs typeface="Arial" panose="020B0604020202020204" pitchFamily="34" charset="0"/>
+              </a:rPr>
+              <a:t>FI</a:t>
+            </a:r>
+            <a:r>
+              <a:rPr lang="en-US" sz="1400" baseline="-25000" dirty="0" err="1" smtClean="0">
+                <a:latin typeface="Arial" panose="020B0604020202020204" pitchFamily="34" charset="0"/>
+                <a:cs typeface="Arial" panose="020B0604020202020204" pitchFamily="34" charset="0"/>
+              </a:rPr>
+              <a:t>data</a:t>
+            </a:r>
+            <a:r>
+              <a:rPr lang="en-US" sz="1400" dirty="0">
+                <a:latin typeface="Arial" panose="020B0604020202020204" pitchFamily="34" charset="0"/>
+                <a:cs typeface="Arial" panose="020B0604020202020204" pitchFamily="34" charset="0"/>
+              </a:rPr>
+              <a:t>)],</a:t>
+            </a:r>
           </a:p>
           <a:p>
             <a:pPr algn="ctr"/>
-            <a:r>
-              <a:rPr lang="en-US" sz="1400" dirty="0" smtClean="0">
-                <a:latin typeface="Arial" panose="020B0604020202020204" pitchFamily="34" charset="0"/>
-                <a:cs typeface="Arial" panose="020B0604020202020204" pitchFamily="34" charset="0"/>
-              </a:rPr>
-              <a:t> </a:t>
-            </a:r>
-            <a:r>
-              <a:rPr lang="en-US" sz="1400" dirty="0" err="1" smtClean="0">
-                <a:latin typeface="Arial" panose="020B0604020202020204" pitchFamily="34" charset="0"/>
-                <a:cs typeface="Arial" panose="020B0604020202020204" pitchFamily="34" charset="0"/>
-              </a:rPr>
-              <a:t>y</a:t>
-            </a:r>
-            <a:r>
-              <a:rPr lang="en-US" sz="1400" baseline="-25000" dirty="0" err="1" smtClean="0">
-                <a:latin typeface="Arial" panose="020B0604020202020204" pitchFamily="34" charset="0"/>
-                <a:cs typeface="Arial" panose="020B0604020202020204" pitchFamily="34" charset="0"/>
-              </a:rPr>
-              <a:t>log</a:t>
-            </a:r>
-            <a:r>
-              <a:rPr lang="en-US" sz="1400" dirty="0" smtClean="0">
-                <a:latin typeface="Arial" panose="020B0604020202020204" pitchFamily="34" charset="0"/>
-                <a:cs typeface="Arial" panose="020B0604020202020204" pitchFamily="34" charset="0"/>
-              </a:rPr>
-              <a:t>  =  [-1 * log10(</a:t>
-            </a:r>
-            <a:r>
-              <a:rPr lang="en-US" sz="1400" dirty="0" err="1" smtClean="0">
-                <a:latin typeface="Arial" panose="020B0604020202020204" pitchFamily="34" charset="0"/>
-                <a:cs typeface="Arial" panose="020B0604020202020204" pitchFamily="34" charset="0"/>
-              </a:rPr>
-              <a:t>y</a:t>
-            </a:r>
-            <a:r>
-              <a:rPr lang="en-US" sz="1400" baseline="-25000" dirty="0" err="1" smtClean="0">
-                <a:latin typeface="Arial" panose="020B0604020202020204" pitchFamily="34" charset="0"/>
-                <a:cs typeface="Arial" panose="020B0604020202020204" pitchFamily="34" charset="0"/>
-              </a:rPr>
-              <a:t>data</a:t>
-            </a:r>
-            <a:r>
-              <a:rPr lang="en-US" sz="1400" dirty="0" smtClean="0">
-                <a:latin typeface="Arial" panose="020B0604020202020204" pitchFamily="34" charset="0"/>
-                <a:cs typeface="Arial" panose="020B0604020202020204" pitchFamily="34" charset="0"/>
-              </a:rPr>
-              <a:t>)],</a:t>
-            </a:r>
-          </a:p>
-          <a:p>
-            <a:pPr algn="ctr"/>
-            <a:endParaRPr lang="en-US" sz="1400" dirty="0" smtClean="0">
+            <a:endParaRPr lang="en-US" sz="1400" dirty="0">
               <a:latin typeface="Arial" panose="020B0604020202020204" pitchFamily="34" charset="0"/>
               <a:cs typeface="Arial" panose="020B0604020202020204" pitchFamily="34" charset="0"/>
             </a:endParaRPr>
@@ -5662,14 +6586,7 @@
                 <a:latin typeface="Arial" panose="020B0604020202020204" pitchFamily="34" charset="0"/>
                 <a:cs typeface="Arial" panose="020B0604020202020204" pitchFamily="34" charset="0"/>
               </a:rPr>
-              <a:t>t</a:t>
-            </a:r>
-            <a:r>
-              <a:rPr lang="en-US" sz="1400" dirty="0" smtClean="0">
-                <a:latin typeface="Arial" panose="020B0604020202020204" pitchFamily="34" charset="0"/>
-                <a:cs typeface="Arial" panose="020B0604020202020204" pitchFamily="34" charset="0"/>
-              </a:rPr>
-              <a:t>hen a higher relative log index value, correlates to a smaller fatality/injury rate.</a:t>
+              <a:t>then a higher relative log index value, correlates to a smaller fatality/injury rate.</a:t>
             </a:r>
           </a:p>
           <a:p>
@@ -5680,7 +6597,7 @@
           </a:p>
           <a:p>
             <a:r>
-              <a:rPr lang="en-US" sz="1400" dirty="0" smtClean="0">
+              <a:rPr lang="en-US" sz="1400" dirty="0">
                 <a:latin typeface="Arial" panose="020B0604020202020204" pitchFamily="34" charset="0"/>
                 <a:cs typeface="Arial" panose="020B0604020202020204" pitchFamily="34" charset="0"/>
               </a:rPr>
@@ -5688,7 +6605,7 @@
             </a:r>
           </a:p>
           <a:p>
-            <a:endParaRPr lang="en-US" sz="1400" dirty="0" smtClean="0">
+            <a:endParaRPr lang="en-US" sz="1400" dirty="0">
               <a:latin typeface="Arial" panose="020B0604020202020204" pitchFamily="34" charset="0"/>
               <a:cs typeface="Arial" panose="020B0604020202020204" pitchFamily="34" charset="0"/>
             </a:endParaRPr>
@@ -5740,7 +6657,7 @@
         </p:nvSpPr>
         <p:spPr>
           <a:xfrm>
-            <a:off x="4502858" y="6478953"/>
+            <a:off x="4479973" y="6477989"/>
             <a:ext cx="503664" cy="307777"/>
           </a:xfrm>
           <a:prstGeom prst="rect">
@@ -5755,7 +6672,7 @@
           <a:lstStyle/>
           <a:p>
             <a:r>
-              <a:rPr lang="en-US" sz="1400" b="1" dirty="0" smtClean="0">
+              <a:rPr lang="en-US" sz="1400" b="1" dirty="0">
                 <a:solidFill>
                   <a:srgbClr val="FF0000"/>
                 </a:solidFill>
@@ -5764,13 +6681,6 @@
               </a:rPr>
               <a:t>risk</a:t>
             </a:r>
-            <a:endParaRPr lang="en-US" sz="1400" b="1" dirty="0">
-              <a:solidFill>
-                <a:srgbClr val="FF0000"/>
-              </a:solidFill>
-              <a:latin typeface="Arial" panose="020B0604020202020204" pitchFamily="34" charset="0"/>
-              <a:cs typeface="Arial" panose="020B0604020202020204" pitchFamily="34" charset="0"/>
-            </a:endParaRPr>
           </a:p>
         </p:txBody>
       </p:sp>
@@ -5782,7 +6692,7 @@
         </p:nvCxnSpPr>
         <p:spPr>
           <a:xfrm flipV="1">
-            <a:off x="4117750" y="3735176"/>
+            <a:off x="4106792" y="3745450"/>
             <a:ext cx="10399" cy="1783161"/>
           </a:xfrm>
           <a:prstGeom prst="straightConnector1">
@@ -5819,7 +6729,7 @@
         </p:nvSpPr>
         <p:spPr>
           <a:xfrm rot="16200000">
-            <a:off x="3263942" y="5916518"/>
+            <a:off x="3232436" y="5916518"/>
             <a:ext cx="1707615" cy="307777"/>
           </a:xfrm>
           <a:prstGeom prst="rect">
@@ -5841,49 +6751,25 @@
                 <a:latin typeface="Arial" panose="020B0604020202020204" pitchFamily="34" charset="0"/>
                 <a:cs typeface="Arial" panose="020B0604020202020204" pitchFamily="34" charset="0"/>
               </a:rPr>
-              <a:t>r</a:t>
-            </a:r>
-            <a:r>
-              <a:rPr lang="en-US" sz="1400" b="1" dirty="0" smtClean="0">
-                <a:solidFill>
-                  <a:srgbClr val="00B050"/>
-                </a:solidFill>
-                <a:latin typeface="Arial" panose="020B0604020202020204" pitchFamily="34" charset="0"/>
-                <a:cs typeface="Arial" panose="020B0604020202020204" pitchFamily="34" charset="0"/>
-              </a:rPr>
-              <a:t>isk perception</a:t>
-            </a:r>
-            <a:endParaRPr lang="en-US" sz="1400" b="1" dirty="0">
-              <a:solidFill>
-                <a:srgbClr val="00B050"/>
-              </a:solidFill>
-              <a:latin typeface="Arial" panose="020B0604020202020204" pitchFamily="34" charset="0"/>
-              <a:cs typeface="Arial" panose="020B0604020202020204" pitchFamily="34" charset="0"/>
-            </a:endParaRPr>
+              <a:t>risk perception</a:t>
+            </a:r>
           </a:p>
         </p:txBody>
       </p:sp>
     </p:spTree>
     <p:extLst>
       <p:ext uri="{BB962C8B-B14F-4D97-AF65-F5344CB8AC3E}">
-        <p14:creationId xmlns:p14="http://schemas.microsoft.com/office/powerpoint/2010/main" val="2790798261"/>
+        <p14:creationId xmlns:p14="http://schemas.microsoft.com/office/powerpoint/2010/main" val="3379624071"/>
       </p:ext>
     </p:extLst>
   </p:cSld>
   <p:clrMapOvr>
     <a:masterClrMapping/>
   </p:clrMapOvr>
-  <p:timing>
-    <p:tnLst>
-      <p:par>
-        <p:cTn id="1" dur="indefinite" restart="never" nodeType="tmRoot"/>
-      </p:par>
-    </p:tnLst>
-  </p:timing>
 </p:sld>
 </file>
 
-<file path=ppt/slides/slide15.xml><?xml version="1.0" encoding="utf-8"?>
+<file path=ppt/slides/slide16.xml><?xml version="1.0" encoding="utf-8"?>
 <p:sld xmlns:a="http://schemas.openxmlformats.org/drawingml/2006/main" xmlns:r="http://schemas.openxmlformats.org/officeDocument/2006/relationships" xmlns:p="http://schemas.openxmlformats.org/presentationml/2006/main">
   <p:cSld>
     <p:spTree>
@@ -5909,7 +6795,7 @@
           <p:nvPr/>
         </p:nvPicPr>
         <p:blipFill>
-          <a:blip r:embed="rId2"/>
+          <a:blip r:embed="rId3"/>
           <a:stretch>
             <a:fillRect/>
           </a:stretch>
@@ -5975,11 +6861,25 @@
           </a:lstStyle>
           <a:p>
             <a:r>
+              <a:rPr lang="en-US" sz="2000" b="1" dirty="0">
+                <a:latin typeface="Arial" panose="020B0604020202020204" pitchFamily="34" charset="0"/>
+                <a:cs typeface="Arial" panose="020B0604020202020204" pitchFamily="34" charset="0"/>
+              </a:rPr>
+              <a:t>Example Data:  Cumulative Averaged </a:t>
+            </a:r>
+            <a:r>
               <a:rPr lang="en-US" sz="2000" b="1" dirty="0" smtClean="0">
                 <a:latin typeface="Arial" panose="020B0604020202020204" pitchFamily="34" charset="0"/>
                 <a:cs typeface="Arial" panose="020B0604020202020204" pitchFamily="34" charset="0"/>
               </a:rPr>
-              <a:t>Example Data:  Cumulative Averaged values for GENDER/AGE/LOS,  SOC level 1</a:t>
+              <a:t>Values </a:t>
+            </a:r>
+            <a:r>
+              <a:rPr lang="en-US" sz="2000" b="1" dirty="0">
+                <a:latin typeface="Arial" panose="020B0604020202020204" pitchFamily="34" charset="0"/>
+                <a:cs typeface="Arial" panose="020B0604020202020204" pitchFamily="34" charset="0"/>
+              </a:rPr>
+              <a:t>for GENDER/AGE/LOS,  SOC level 1</a:t>
             </a:r>
             <a:endParaRPr lang="en-US" sz="2000" b="1" dirty="0">
               <a:solidFill>
@@ -6025,11 +6925,11 @@
           </a:p>
           <a:p>
             <a:r>
-              <a:rPr lang="en-US" sz="1400" dirty="0" smtClean="0">
-                <a:latin typeface="Arial" panose="020B0604020202020204" pitchFamily="34" charset="0"/>
-                <a:cs typeface="Arial" panose="020B0604020202020204" pitchFamily="34" charset="0"/>
-              </a:rPr>
-              <a:t>The graph to the right was created by averaging all of the occupational categorical fatality log values. This was done for GENDER, AGE, and LOS (length of service). </a:t>
+              <a:rPr lang="en-US" sz="1400" dirty="0">
+                <a:latin typeface="Arial" panose="020B0604020202020204" pitchFamily="34" charset="0"/>
+                <a:cs typeface="Arial" panose="020B0604020202020204" pitchFamily="34" charset="0"/>
+              </a:rPr>
+              <a:t>The graph to the right was created by averaging all the occupational categorical fatality log values. This was done for GENDER, AGE, and LOS (length of service). </a:t>
             </a:r>
           </a:p>
           <a:p>
@@ -6040,7 +6940,7 @@
           </a:p>
           <a:p>
             <a:r>
-              <a:rPr lang="en-US" sz="1400" dirty="0" smtClean="0">
+              <a:rPr lang="en-US" sz="1400" dirty="0">
                 <a:latin typeface="Arial" panose="020B0604020202020204" pitchFamily="34" charset="0"/>
                 <a:cs typeface="Arial" panose="020B0604020202020204" pitchFamily="34" charset="0"/>
               </a:rPr>
@@ -6048,7 +6948,7 @@
             </a:r>
           </a:p>
           <a:p>
-            <a:endParaRPr lang="en-US" sz="1400" dirty="0" smtClean="0">
+            <a:endParaRPr lang="en-US" sz="1400" dirty="0">
               <a:latin typeface="Arial" panose="020B0604020202020204" pitchFamily="34" charset="0"/>
               <a:cs typeface="Arial" panose="020B0604020202020204" pitchFamily="34" charset="0"/>
             </a:endParaRPr>
@@ -6129,49 +7029,16 @@
             <a:lstStyle/>
             <a:p>
               <a:r>
-                <a:rPr lang="en-US" sz="1400" dirty="0" smtClean="0">
+                <a:rPr lang="en-US" sz="1400" dirty="0">
                   <a:latin typeface="Arial" panose="020B0604020202020204" pitchFamily="34" charset="0"/>
                   <a:cs typeface="Arial" panose="020B0604020202020204" pitchFamily="34" charset="0"/>
                 </a:rPr>
                 <a:t>risk</a:t>
               </a:r>
-              <a:endParaRPr lang="en-US" sz="1400" dirty="0">
-                <a:latin typeface="Arial" panose="020B0604020202020204" pitchFamily="34" charset="0"/>
-                <a:cs typeface="Arial" panose="020B0604020202020204" pitchFamily="34" charset="0"/>
-              </a:endParaRPr>
             </a:p>
           </p:txBody>
         </p:sp>
       </p:grpSp>
-      <p:pic>
-        <p:nvPicPr>
-          <p:cNvPr id="4" name="Picture 3"/>
-          <p:cNvPicPr>
-            <a:picLocks noChangeAspect="1"/>
-          </p:cNvPicPr>
-          <p:nvPr/>
-        </p:nvPicPr>
-        <p:blipFill>
-          <a:blip r:embed="rId3"/>
-          <a:stretch>
-            <a:fillRect/>
-          </a:stretch>
-        </p:blipFill>
-        <p:spPr>
-          <a:xfrm>
-            <a:off x="1222591" y="3664097"/>
-            <a:ext cx="2990850" cy="2800350"/>
-          </a:xfrm>
-          <a:prstGeom prst="rect">
-            <a:avLst/>
-          </a:prstGeom>
-          <a:ln w="25400">
-            <a:solidFill>
-              <a:schemeClr val="tx1"/>
-            </a:solidFill>
-          </a:ln>
-        </p:spPr>
-      </p:pic>
       <p:cxnSp>
         <p:nvCxnSpPr>
           <p:cNvPr id="9" name="Straight Arrow Connector 8"/>
@@ -6239,49 +7106,54 @@
                 <a:latin typeface="Arial" panose="020B0604020202020204" pitchFamily="34" charset="0"/>
                 <a:cs typeface="Arial" panose="020B0604020202020204" pitchFamily="34" charset="0"/>
               </a:rPr>
-              <a:t>r</a:t>
-            </a:r>
-            <a:r>
-              <a:rPr lang="en-US" sz="1400" b="1" dirty="0" smtClean="0">
-                <a:solidFill>
-                  <a:srgbClr val="00B050"/>
-                </a:solidFill>
-                <a:latin typeface="Arial" panose="020B0604020202020204" pitchFamily="34" charset="0"/>
-                <a:cs typeface="Arial" panose="020B0604020202020204" pitchFamily="34" charset="0"/>
-              </a:rPr>
-              <a:t>isk perception</a:t>
-            </a:r>
-            <a:endParaRPr lang="en-US" sz="1400" b="1" dirty="0">
-              <a:solidFill>
-                <a:srgbClr val="00B050"/>
-              </a:solidFill>
-              <a:latin typeface="Arial" panose="020B0604020202020204" pitchFamily="34" charset="0"/>
-              <a:cs typeface="Arial" panose="020B0604020202020204" pitchFamily="34" charset="0"/>
-            </a:endParaRPr>
+              <a:t>risk perception</a:t>
+            </a:r>
           </a:p>
         </p:txBody>
       </p:sp>
+      <p:pic>
+        <p:nvPicPr>
+          <p:cNvPr id="28" name="Picture 27"/>
+          <p:cNvPicPr>
+            <a:picLocks noChangeAspect="1"/>
+          </p:cNvPicPr>
+          <p:nvPr/>
+        </p:nvPicPr>
+        <p:blipFill>
+          <a:blip r:embed="rId4"/>
+          <a:stretch>
+            <a:fillRect/>
+          </a:stretch>
+        </p:blipFill>
+        <p:spPr>
+          <a:xfrm>
+            <a:off x="535848" y="3352068"/>
+            <a:ext cx="4348585" cy="3112379"/>
+          </a:xfrm>
+          <a:prstGeom prst="rect">
+            <a:avLst/>
+          </a:prstGeom>
+          <a:ln w="12700">
+            <a:solidFill>
+              <a:schemeClr val="tx1"/>
+            </a:solidFill>
+          </a:ln>
+        </p:spPr>
+      </p:pic>
     </p:spTree>
     <p:extLst>
       <p:ext uri="{BB962C8B-B14F-4D97-AF65-F5344CB8AC3E}">
-        <p14:creationId xmlns:p14="http://schemas.microsoft.com/office/powerpoint/2010/main" val="3229408811"/>
+        <p14:creationId xmlns:p14="http://schemas.microsoft.com/office/powerpoint/2010/main" val="209372544"/>
       </p:ext>
     </p:extLst>
   </p:cSld>
   <p:clrMapOvr>
     <a:masterClrMapping/>
   </p:clrMapOvr>
-  <p:timing>
-    <p:tnLst>
-      <p:par>
-        <p:cTn id="1" dur="indefinite" restart="never" nodeType="tmRoot"/>
-      </p:par>
-    </p:tnLst>
-  </p:timing>
 </p:sld>
 </file>
 
-<file path=ppt/slides/slide16.xml><?xml version="1.0" encoding="utf-8"?>
+<file path=ppt/slides/slide17.xml><?xml version="1.0" encoding="utf-8"?>
 <p:sld xmlns:a="http://schemas.openxmlformats.org/drawingml/2006/main" xmlns:r="http://schemas.openxmlformats.org/officeDocument/2006/relationships" xmlns:p="http://schemas.openxmlformats.org/presentationml/2006/main">
   <p:cSld>
     <p:spTree>
@@ -6298,30 +7170,6 @@
           <a:chExt cx="0" cy="0"/>
         </a:xfrm>
       </p:grpSpPr>
-      <p:pic>
-        <p:nvPicPr>
-          <p:cNvPr id="3" name="Picture 2"/>
-          <p:cNvPicPr>
-            <a:picLocks noChangeAspect="1"/>
-          </p:cNvPicPr>
-          <p:nvPr/>
-        </p:nvPicPr>
-        <p:blipFill>
-          <a:blip r:embed="rId2"/>
-          <a:stretch>
-            <a:fillRect/>
-          </a:stretch>
-        </p:blipFill>
-        <p:spPr>
-          <a:xfrm>
-            <a:off x="5528535" y="288046"/>
-            <a:ext cx="6561208" cy="6561208"/>
-          </a:xfrm>
-          <a:prstGeom prst="rect">
-            <a:avLst/>
-          </a:prstGeom>
-        </p:spPr>
-      </p:pic>
       <p:sp>
         <p:nvSpPr>
           <p:cNvPr id="11" name="Title 1">
@@ -6373,7 +7221,7 @@
           </a:lstStyle>
           <a:p>
             <a:r>
-              <a:rPr lang="en-US" sz="2000" b="1" dirty="0" smtClean="0">
+              <a:rPr lang="en-US" sz="2000" b="1" dirty="0">
                 <a:latin typeface="Arial" panose="020B0604020202020204" pitchFamily="34" charset="0"/>
                 <a:cs typeface="Arial" panose="020B0604020202020204" pitchFamily="34" charset="0"/>
               </a:rPr>
@@ -6398,7 +7246,7 @@
         <p:spPr>
           <a:xfrm>
             <a:off x="575386" y="1036176"/>
-            <a:ext cx="4882760" cy="5293757"/>
+            <a:ext cx="4882760" cy="5478423"/>
           </a:xfrm>
           <a:prstGeom prst="rect">
             <a:avLst/>
@@ -6417,92 +7265,330 @@
           <a:lstStyle/>
           <a:p>
             <a:r>
+              <a:rPr lang="en-US" sz="1200" dirty="0">
+                <a:latin typeface="Arial" panose="020B0604020202020204" pitchFamily="34" charset="0"/>
+                <a:cs typeface="Arial" panose="020B0604020202020204" pitchFamily="34" charset="0"/>
+              </a:rPr>
+              <a:t>Since, the relative index is a function of:</a:t>
+            </a:r>
+          </a:p>
+          <a:p>
+            <a:endParaRPr lang="en-US" sz="1200" dirty="0">
+              <a:latin typeface="Arial" panose="020B0604020202020204" pitchFamily="34" charset="0"/>
+              <a:cs typeface="Arial" panose="020B0604020202020204" pitchFamily="34" charset="0"/>
+            </a:endParaRPr>
+          </a:p>
+          <a:p>
+            <a:pPr algn="ctr"/>
+            <a:r>
+              <a:rPr lang="en-US" sz="1200" dirty="0">
+                <a:latin typeface="Arial" panose="020B0604020202020204" pitchFamily="34" charset="0"/>
+                <a:cs typeface="Arial" panose="020B0604020202020204" pitchFamily="34" charset="0"/>
+              </a:rPr>
+              <a:t> </a:t>
+            </a:r>
+            <a:r>
+              <a:rPr lang="en-US" sz="1200" dirty="0" err="1">
+                <a:latin typeface="Arial" panose="020B0604020202020204" pitchFamily="34" charset="0"/>
+                <a:cs typeface="Arial" panose="020B0604020202020204" pitchFamily="34" charset="0"/>
+              </a:rPr>
+              <a:t>y</a:t>
+            </a:r>
+            <a:r>
+              <a:rPr lang="en-US" sz="1200" baseline="-25000" dirty="0" err="1">
+                <a:latin typeface="Arial" panose="020B0604020202020204" pitchFamily="34" charset="0"/>
+                <a:cs typeface="Arial" panose="020B0604020202020204" pitchFamily="34" charset="0"/>
+              </a:rPr>
+              <a:t>log</a:t>
+            </a:r>
+            <a:r>
+              <a:rPr lang="en-US" sz="1200" dirty="0">
+                <a:latin typeface="Arial" panose="020B0604020202020204" pitchFamily="34" charset="0"/>
+                <a:cs typeface="Arial" panose="020B0604020202020204" pitchFamily="34" charset="0"/>
+              </a:rPr>
+              <a:t>  =  [-1 * log10(</a:t>
+            </a:r>
+            <a:r>
+              <a:rPr lang="en-US" sz="1200" dirty="0" err="1">
+                <a:latin typeface="Arial" panose="020B0604020202020204" pitchFamily="34" charset="0"/>
+                <a:cs typeface="Arial" panose="020B0604020202020204" pitchFamily="34" charset="0"/>
+              </a:rPr>
+              <a:t>y</a:t>
+            </a:r>
+            <a:r>
+              <a:rPr lang="en-US" sz="1200" baseline="-25000" dirty="0" err="1">
+                <a:latin typeface="Arial" panose="020B0604020202020204" pitchFamily="34" charset="0"/>
+                <a:cs typeface="Arial" panose="020B0604020202020204" pitchFamily="34" charset="0"/>
+              </a:rPr>
+              <a:t>data</a:t>
+            </a:r>
+            <a:r>
+              <a:rPr lang="en-US" sz="1200" dirty="0">
+                <a:latin typeface="Arial" panose="020B0604020202020204" pitchFamily="34" charset="0"/>
+                <a:cs typeface="Arial" panose="020B0604020202020204" pitchFamily="34" charset="0"/>
+              </a:rPr>
+              <a:t>)],</a:t>
+            </a:r>
+          </a:p>
+          <a:p>
+            <a:pPr algn="ctr"/>
+            <a:endParaRPr lang="en-US" sz="1200" dirty="0">
+              <a:latin typeface="Arial" panose="020B0604020202020204" pitchFamily="34" charset="0"/>
+              <a:cs typeface="Arial" panose="020B0604020202020204" pitchFamily="34" charset="0"/>
+            </a:endParaRPr>
+          </a:p>
+          <a:p>
+            <a:r>
+              <a:rPr lang="en-US" sz="1200" dirty="0">
+                <a:latin typeface="Arial" panose="020B0604020202020204" pitchFamily="34" charset="0"/>
+                <a:cs typeface="Arial" panose="020B0604020202020204" pitchFamily="34" charset="0"/>
+              </a:rPr>
+              <a:t>then a higher relative log index value, correlates to a smaller fatality/injury rate.</a:t>
+            </a:r>
+          </a:p>
+          <a:p>
+            <a:endParaRPr lang="en-US" sz="1200" dirty="0">
+              <a:latin typeface="Arial" panose="020B0604020202020204" pitchFamily="34" charset="0"/>
+              <a:cs typeface="Arial" panose="020B0604020202020204" pitchFamily="34" charset="0"/>
+            </a:endParaRPr>
+          </a:p>
+          <a:p>
+            <a:r>
+              <a:rPr lang="en-US" sz="1200" dirty="0">
+                <a:latin typeface="Arial" panose="020B0604020202020204" pitchFamily="34" charset="0"/>
+                <a:cs typeface="Arial" panose="020B0604020202020204" pitchFamily="34" charset="0"/>
+              </a:rPr>
+              <a:t>T</a:t>
+            </a:r>
+            <a:r>
               <a:rPr lang="en-US" sz="1200" dirty="0" smtClean="0">
                 <a:latin typeface="Arial" panose="020B0604020202020204" pitchFamily="34" charset="0"/>
                 <a:cs typeface="Arial" panose="020B0604020202020204" pitchFamily="34" charset="0"/>
               </a:rPr>
-              <a:t>Since, the relative index is a function of:</a:t>
-            </a:r>
-          </a:p>
-          <a:p>
-            <a:endParaRPr lang="en-US" sz="1200" dirty="0" smtClean="0">
-              <a:latin typeface="Arial" panose="020B0604020202020204" pitchFamily="34" charset="0"/>
-              <a:cs typeface="Arial" panose="020B0604020202020204" pitchFamily="34" charset="0"/>
-            </a:endParaRPr>
-          </a:p>
-          <a:p>
-            <a:pPr algn="ctr"/>
+              <a:t>he </a:t>
+            </a:r>
+            <a:r>
+              <a:rPr lang="en-US" sz="1200" dirty="0">
+                <a:latin typeface="Arial" panose="020B0604020202020204" pitchFamily="34" charset="0"/>
+                <a:cs typeface="Arial" panose="020B0604020202020204" pitchFamily="34" charset="0"/>
+              </a:rPr>
+              <a:t>categories on the x axis are ranked from left to right with increasing job risk. We can see a positive slope, that indicates that people with a higher perception of risk have a lower fatality rate.</a:t>
+            </a:r>
+          </a:p>
+          <a:p>
+            <a:endParaRPr lang="en-US" sz="1200" dirty="0">
+              <a:latin typeface="Arial" panose="020B0604020202020204" pitchFamily="34" charset="0"/>
+              <a:cs typeface="Arial" panose="020B0604020202020204" pitchFamily="34" charset="0"/>
+            </a:endParaRPr>
+          </a:p>
+          <a:p>
+            <a:r>
+              <a:rPr lang="en-US" sz="1200" dirty="0">
+                <a:latin typeface="Arial" panose="020B0604020202020204" pitchFamily="34" charset="0"/>
+                <a:cs typeface="Arial" panose="020B0604020202020204" pitchFamily="34" charset="0"/>
+              </a:rPr>
+              <a:t>The value for index 0 regression, is 8.73 (fatal log index)</a:t>
+            </a:r>
+          </a:p>
+          <a:p>
+            <a:r>
+              <a:rPr lang="en-US" sz="1200" dirty="0">
+                <a:latin typeface="Arial" panose="020B0604020202020204" pitchFamily="34" charset="0"/>
+                <a:cs typeface="Arial" panose="020B0604020202020204" pitchFamily="34" charset="0"/>
+              </a:rPr>
+              <a:t>The value for index 22 regression is 10.71 (fatal log index)</a:t>
+            </a:r>
+          </a:p>
+          <a:p>
+            <a:endParaRPr lang="en-US" sz="1200" dirty="0">
+              <a:latin typeface="Arial" panose="020B0604020202020204" pitchFamily="34" charset="0"/>
+              <a:cs typeface="Arial" panose="020B0604020202020204" pitchFamily="34" charset="0"/>
+            </a:endParaRPr>
+          </a:p>
+          <a:p>
+            <a:r>
+              <a:rPr lang="en-US" sz="1200" dirty="0">
+                <a:latin typeface="Arial" panose="020B0604020202020204" pitchFamily="34" charset="0"/>
+                <a:cs typeface="Arial" panose="020B0604020202020204" pitchFamily="34" charset="0"/>
+              </a:rPr>
+              <a:t>Since these are log values they are converted with</a:t>
+            </a:r>
             <a:r>
               <a:rPr lang="en-US" sz="1200" dirty="0" smtClean="0">
                 <a:latin typeface="Arial" panose="020B0604020202020204" pitchFamily="34" charset="0"/>
                 <a:cs typeface="Arial" panose="020B0604020202020204" pitchFamily="34" charset="0"/>
               </a:rPr>
+              <a:t>:</a:t>
+            </a:r>
+            <a:r>
+              <a:rPr lang="en-US" sz="1200" dirty="0" smtClean="0">
+                <a:latin typeface="Arial" panose="020B0604020202020204" pitchFamily="34" charset="0"/>
+                <a:cs typeface="Arial" panose="020B0604020202020204" pitchFamily="34" charset="0"/>
+              </a:rPr>
+              <a:t>:</a:t>
+            </a:r>
+            <a:endParaRPr lang="en-US" sz="1200" dirty="0">
+              <a:latin typeface="Arial" panose="020B0604020202020204" pitchFamily="34" charset="0"/>
+              <a:cs typeface="Arial" panose="020B0604020202020204" pitchFamily="34" charset="0"/>
+            </a:endParaRPr>
+          </a:p>
+          <a:p>
+            <a:endParaRPr lang="en-US" sz="1200" dirty="0">
+              <a:latin typeface="Arial" panose="020B0604020202020204" pitchFamily="34" charset="0"/>
+              <a:cs typeface="Arial" panose="020B0604020202020204" pitchFamily="34" charset="0"/>
+            </a:endParaRPr>
+          </a:p>
+          <a:p>
+            <a:r>
+              <a:rPr lang="en-US" sz="1200" dirty="0" err="1" smtClean="0">
+                <a:latin typeface="Arial" panose="020B0604020202020204" pitchFamily="34" charset="0"/>
+                <a:cs typeface="Arial" panose="020B0604020202020204" pitchFamily="34" charset="0"/>
+              </a:rPr>
+              <a:t>True_Fatal</a:t>
+            </a:r>
+            <a:r>
+              <a:rPr lang="en-US" sz="1200" dirty="0" smtClean="0">
+                <a:latin typeface="Arial" panose="020B0604020202020204" pitchFamily="34" charset="0"/>
+                <a:cs typeface="Arial" panose="020B0604020202020204" pitchFamily="34" charset="0"/>
+              </a:rPr>
+              <a:t>/</a:t>
+            </a:r>
+            <a:r>
+              <a:rPr lang="en-US" sz="1200" dirty="0" err="1" smtClean="0">
+                <a:latin typeface="Arial" panose="020B0604020202020204" pitchFamily="34" charset="0"/>
+                <a:cs typeface="Arial" panose="020B0604020202020204" pitchFamily="34" charset="0"/>
+              </a:rPr>
+              <a:t>Injury_Rate</a:t>
+            </a:r>
+            <a:r>
+              <a:rPr lang="en-US" sz="1200" dirty="0" smtClean="0">
+                <a:latin typeface="Arial" panose="020B0604020202020204" pitchFamily="34" charset="0"/>
+                <a:cs typeface="Arial" panose="020B0604020202020204" pitchFamily="34" charset="0"/>
+              </a:rPr>
               <a:t> </a:t>
             </a:r>
             <a:r>
+              <a:rPr lang="en-US" sz="1200" dirty="0">
+                <a:latin typeface="Arial" panose="020B0604020202020204" pitchFamily="34" charset="0"/>
+                <a:cs typeface="Arial" panose="020B0604020202020204" pitchFamily="34" charset="0"/>
+              </a:rPr>
+              <a:t>= 10 ^ (-1 * </a:t>
+            </a:r>
+            <a:r>
               <a:rPr lang="en-US" sz="1200" dirty="0" err="1" smtClean="0">
                 <a:latin typeface="Arial" panose="020B0604020202020204" pitchFamily="34" charset="0"/>
                 <a:cs typeface="Arial" panose="020B0604020202020204" pitchFamily="34" charset="0"/>
               </a:rPr>
-              <a:t>y</a:t>
+              <a:t>RP</a:t>
             </a:r>
             <a:r>
               <a:rPr lang="en-US" sz="1200" baseline="-25000" dirty="0" err="1" smtClean="0">
                 <a:latin typeface="Arial" panose="020B0604020202020204" pitchFamily="34" charset="0"/>
                 <a:cs typeface="Arial" panose="020B0604020202020204" pitchFamily="34" charset="0"/>
               </a:rPr>
-              <a:t>log</a:t>
+              <a:t>logvalue</a:t>
+            </a:r>
+            <a:r>
+              <a:rPr lang="en-US" sz="1200" dirty="0">
+                <a:latin typeface="Arial" panose="020B0604020202020204" pitchFamily="34" charset="0"/>
+                <a:cs typeface="Arial" panose="020B0604020202020204" pitchFamily="34" charset="0"/>
+              </a:rPr>
+              <a:t>)</a:t>
+            </a:r>
+          </a:p>
+          <a:p>
+            <a:endParaRPr lang="en-US" sz="1200" dirty="0">
+              <a:latin typeface="Arial" panose="020B0604020202020204" pitchFamily="34" charset="0"/>
+              <a:cs typeface="Arial" panose="020B0604020202020204" pitchFamily="34" charset="0"/>
+            </a:endParaRPr>
+          </a:p>
+          <a:p>
+            <a:r>
+              <a:rPr lang="en-US" sz="1200" dirty="0">
+                <a:latin typeface="Arial" panose="020B0604020202020204" pitchFamily="34" charset="0"/>
+                <a:cs typeface="Arial" panose="020B0604020202020204" pitchFamily="34" charset="0"/>
+              </a:rPr>
+              <a:t>Therefore:</a:t>
+            </a:r>
+          </a:p>
+          <a:p>
+            <a:endParaRPr lang="en-US" sz="1200" dirty="0">
+              <a:latin typeface="Arial" panose="020B0604020202020204" pitchFamily="34" charset="0"/>
+              <a:cs typeface="Arial" panose="020B0604020202020204" pitchFamily="34" charset="0"/>
+            </a:endParaRPr>
+          </a:p>
+          <a:p>
+            <a:r>
+              <a:rPr lang="en-US" sz="1200" dirty="0">
+                <a:latin typeface="Arial" panose="020B0604020202020204" pitchFamily="34" charset="0"/>
+                <a:cs typeface="Arial" panose="020B0604020202020204" pitchFamily="34" charset="0"/>
+              </a:rPr>
+              <a:t>The real </a:t>
             </a:r>
             <a:r>
               <a:rPr lang="en-US" sz="1200" dirty="0" smtClean="0">
                 <a:latin typeface="Arial" panose="020B0604020202020204" pitchFamily="34" charset="0"/>
                 <a:cs typeface="Arial" panose="020B0604020202020204" pitchFamily="34" charset="0"/>
               </a:rPr>
-              <a:t>  =  [-1 * log10(</a:t>
-            </a:r>
-            <a:r>
-              <a:rPr lang="en-US" sz="1200" dirty="0" err="1" smtClean="0">
-                <a:latin typeface="Arial" panose="020B0604020202020204" pitchFamily="34" charset="0"/>
-                <a:cs typeface="Arial" panose="020B0604020202020204" pitchFamily="34" charset="0"/>
-              </a:rPr>
-              <a:t>y</a:t>
-            </a:r>
-            <a:r>
-              <a:rPr lang="en-US" sz="1200" baseline="-25000" dirty="0" err="1" smtClean="0">
-                <a:latin typeface="Arial" panose="020B0604020202020204" pitchFamily="34" charset="0"/>
-                <a:cs typeface="Arial" panose="020B0604020202020204" pitchFamily="34" charset="0"/>
-              </a:rPr>
-              <a:t>data</a:t>
+              <a:t>FI rate</a:t>
             </a:r>
             <a:r>
               <a:rPr lang="en-US" sz="1200" dirty="0" smtClean="0">
                 <a:latin typeface="Arial" panose="020B0604020202020204" pitchFamily="34" charset="0"/>
                 <a:cs typeface="Arial" panose="020B0604020202020204" pitchFamily="34" charset="0"/>
               </a:rPr>
-              <a:t>)],</a:t>
-            </a:r>
-          </a:p>
-          <a:p>
-            <a:pPr algn="ctr"/>
-            <a:endParaRPr lang="en-US" sz="1200" dirty="0" smtClean="0">
-              <a:latin typeface="Arial" panose="020B0604020202020204" pitchFamily="34" charset="0"/>
-              <a:cs typeface="Arial" panose="020B0604020202020204" pitchFamily="34" charset="0"/>
-            </a:endParaRPr>
-          </a:p>
-          <a:p>
+              <a:t> for regression index </a:t>
+            </a:r>
             <a:r>
               <a:rPr lang="en-US" sz="1200" dirty="0">
                 <a:latin typeface="Arial" panose="020B0604020202020204" pitchFamily="34" charset="0"/>
                 <a:cs typeface="Arial" panose="020B0604020202020204" pitchFamily="34" charset="0"/>
               </a:rPr>
-              <a:t>t</a:t>
+              <a:t>0 </a:t>
             </a:r>
             <a:r>
               <a:rPr lang="en-US" sz="1200" dirty="0" smtClean="0">
                 <a:latin typeface="Arial" panose="020B0604020202020204" pitchFamily="34" charset="0"/>
                 <a:cs typeface="Arial" panose="020B0604020202020204" pitchFamily="34" charset="0"/>
               </a:rPr>
-              <a:t>hen a higher relative log index value, correlates to a smaller fatality/injury rate.</a:t>
+              <a:t>, </a:t>
+            </a:r>
+            <a:r>
+              <a:rPr lang="en-US" sz="1200" dirty="0">
+                <a:latin typeface="Arial" panose="020B0604020202020204" pitchFamily="34" charset="0"/>
+                <a:cs typeface="Arial" panose="020B0604020202020204" pitchFamily="34" charset="0"/>
+              </a:rPr>
+              <a:t>is 1.841e-09</a:t>
+            </a:r>
+          </a:p>
+          <a:p>
+            <a:r>
+              <a:rPr lang="en-US" sz="1200" dirty="0">
+                <a:latin typeface="Arial" panose="020B0604020202020204" pitchFamily="34" charset="0"/>
+                <a:cs typeface="Arial" panose="020B0604020202020204" pitchFamily="34" charset="0"/>
+              </a:rPr>
+              <a:t>The real </a:t>
+            </a:r>
+            <a:r>
+              <a:rPr lang="en-US" sz="1200" dirty="0" smtClean="0">
+                <a:latin typeface="Arial" panose="020B0604020202020204" pitchFamily="34" charset="0"/>
+                <a:cs typeface="Arial" panose="020B0604020202020204" pitchFamily="34" charset="0"/>
+              </a:rPr>
+              <a:t>FI rate</a:t>
+            </a:r>
+            <a:r>
+              <a:rPr lang="en-US" sz="1200" dirty="0" smtClean="0">
+                <a:latin typeface="Arial" panose="020B0604020202020204" pitchFamily="34" charset="0"/>
+                <a:cs typeface="Arial" panose="020B0604020202020204" pitchFamily="34" charset="0"/>
+              </a:rPr>
+              <a:t> for regression index 22, </a:t>
+            </a:r>
+            <a:r>
+              <a:rPr lang="en-US" sz="1200" dirty="0">
+                <a:latin typeface="Arial" panose="020B0604020202020204" pitchFamily="34" charset="0"/>
+                <a:cs typeface="Arial" panose="020B0604020202020204" pitchFamily="34" charset="0"/>
+              </a:rPr>
+              <a:t>is 1.94e-11 (smaller)</a:t>
             </a:r>
           </a:p>
           <a:p>
@@ -6513,270 +7599,53 @@
           </a:p>
           <a:p>
             <a:r>
-              <a:rPr lang="en-US" sz="1200" dirty="0" smtClean="0">
-                <a:latin typeface="Arial" panose="020B0604020202020204" pitchFamily="34" charset="0"/>
-                <a:cs typeface="Arial" panose="020B0604020202020204" pitchFamily="34" charset="0"/>
-              </a:rPr>
-              <a:t>Since the categories on the x axis are ranked from left to right with increasing job risk. We can see a positive slope, that indicates that people with a higher perception of risk have a lower fatality rate.</a:t>
-            </a:r>
-          </a:p>
-          <a:p>
-            <a:endParaRPr lang="en-US" sz="1200" dirty="0">
-              <a:latin typeface="Arial" panose="020B0604020202020204" pitchFamily="34" charset="0"/>
-              <a:cs typeface="Arial" panose="020B0604020202020204" pitchFamily="34" charset="0"/>
-            </a:endParaRPr>
-          </a:p>
-          <a:p>
-            <a:r>
-              <a:rPr lang="en-US" sz="1200" dirty="0" smtClean="0">
-                <a:latin typeface="Arial" panose="020B0604020202020204" pitchFamily="34" charset="0"/>
-                <a:cs typeface="Arial" panose="020B0604020202020204" pitchFamily="34" charset="0"/>
-              </a:rPr>
-              <a:t>The value for index 0 regression, is 8.73 (fatal log index)</a:t>
-            </a:r>
-          </a:p>
-          <a:p>
-            <a:r>
-              <a:rPr lang="en-US" sz="1200" dirty="0" smtClean="0">
-                <a:latin typeface="Arial" panose="020B0604020202020204" pitchFamily="34" charset="0"/>
-                <a:cs typeface="Arial" panose="020B0604020202020204" pitchFamily="34" charset="0"/>
-              </a:rPr>
-              <a:t>The value for index 22 regression is 10.71 (fatal log index)</a:t>
-            </a:r>
-          </a:p>
-          <a:p>
-            <a:endParaRPr lang="en-US" sz="1200" dirty="0">
-              <a:latin typeface="Arial" panose="020B0604020202020204" pitchFamily="34" charset="0"/>
-              <a:cs typeface="Arial" panose="020B0604020202020204" pitchFamily="34" charset="0"/>
-            </a:endParaRPr>
-          </a:p>
-          <a:p>
-            <a:r>
-              <a:rPr lang="en-US" sz="1200" dirty="0" smtClean="0">
-                <a:latin typeface="Arial" panose="020B0604020202020204" pitchFamily="34" charset="0"/>
-                <a:cs typeface="Arial" panose="020B0604020202020204" pitchFamily="34" charset="0"/>
-              </a:rPr>
-              <a:t>Since these are log values </a:t>
-            </a:r>
-            <a:r>
-              <a:rPr lang="en-US" sz="1200" dirty="0" smtClean="0">
-                <a:latin typeface="Arial" panose="020B0604020202020204" pitchFamily="34" charset="0"/>
-                <a:cs typeface="Arial" panose="020B0604020202020204" pitchFamily="34" charset="0"/>
-              </a:rPr>
-              <a:t>they </a:t>
-            </a:r>
-            <a:r>
-              <a:rPr lang="en-US" sz="1200" dirty="0" smtClean="0">
-                <a:latin typeface="Arial" panose="020B0604020202020204" pitchFamily="34" charset="0"/>
-                <a:cs typeface="Arial" panose="020B0604020202020204" pitchFamily="34" charset="0"/>
-              </a:rPr>
-              <a:t>correspond to:</a:t>
-            </a:r>
-          </a:p>
-          <a:p>
-            <a:endParaRPr lang="en-US" sz="1200" dirty="0">
-              <a:latin typeface="Arial" panose="020B0604020202020204" pitchFamily="34" charset="0"/>
-              <a:cs typeface="Arial" panose="020B0604020202020204" pitchFamily="34" charset="0"/>
-            </a:endParaRPr>
-          </a:p>
-          <a:p>
-            <a:r>
-              <a:rPr lang="en-US" sz="1200" dirty="0" smtClean="0">
-                <a:latin typeface="Arial" panose="020B0604020202020204" pitchFamily="34" charset="0"/>
-                <a:cs typeface="Arial" panose="020B0604020202020204" pitchFamily="34" charset="0"/>
-              </a:rPr>
-              <a:t>True Fatal Index = 10 ^ (-1 * </a:t>
-            </a:r>
-            <a:r>
-              <a:rPr lang="en-US" sz="1200" dirty="0" err="1" smtClean="0">
-                <a:latin typeface="Arial" panose="020B0604020202020204" pitchFamily="34" charset="0"/>
-                <a:cs typeface="Arial" panose="020B0604020202020204" pitchFamily="34" charset="0"/>
-              </a:rPr>
-              <a:t>logvalue</a:t>
-            </a:r>
-            <a:r>
-              <a:rPr lang="en-US" sz="1200" dirty="0" smtClean="0">
-                <a:latin typeface="Arial" panose="020B0604020202020204" pitchFamily="34" charset="0"/>
-                <a:cs typeface="Arial" panose="020B0604020202020204" pitchFamily="34" charset="0"/>
-              </a:rPr>
-              <a:t>)</a:t>
-            </a:r>
-          </a:p>
-          <a:p>
-            <a:endParaRPr lang="en-US" sz="1200" dirty="0">
-              <a:latin typeface="Arial" panose="020B0604020202020204" pitchFamily="34" charset="0"/>
-              <a:cs typeface="Arial" panose="020B0604020202020204" pitchFamily="34" charset="0"/>
-            </a:endParaRPr>
-          </a:p>
-          <a:p>
-            <a:r>
-              <a:rPr lang="en-US" sz="1200" dirty="0" smtClean="0">
-                <a:latin typeface="Arial" panose="020B0604020202020204" pitchFamily="34" charset="0"/>
-                <a:cs typeface="Arial" panose="020B0604020202020204" pitchFamily="34" charset="0"/>
-              </a:rPr>
-              <a:t>Therefore:</a:t>
-            </a:r>
-          </a:p>
-          <a:p>
-            <a:endParaRPr lang="en-US" sz="1200" dirty="0" smtClean="0">
-              <a:latin typeface="Arial" panose="020B0604020202020204" pitchFamily="34" charset="0"/>
-              <a:cs typeface="Arial" panose="020B0604020202020204" pitchFamily="34" charset="0"/>
-            </a:endParaRPr>
-          </a:p>
-          <a:p>
-            <a:r>
-              <a:rPr lang="en-US" sz="1200" dirty="0" smtClean="0">
-                <a:latin typeface="Arial" panose="020B0604020202020204" pitchFamily="34" charset="0"/>
-                <a:cs typeface="Arial" panose="020B0604020202020204" pitchFamily="34" charset="0"/>
-              </a:rPr>
-              <a:t>The real fatality index </a:t>
-            </a:r>
-            <a:r>
               <a:rPr lang="en-US" sz="1200" dirty="0">
                 <a:latin typeface="Arial" panose="020B0604020202020204" pitchFamily="34" charset="0"/>
                 <a:cs typeface="Arial" panose="020B0604020202020204" pitchFamily="34" charset="0"/>
               </a:rPr>
-              <a:t>0 regression, is </a:t>
-            </a:r>
-            <a:r>
-              <a:rPr lang="en-US" sz="1200" dirty="0" smtClean="0">
-                <a:latin typeface="Arial" panose="020B0604020202020204" pitchFamily="34" charset="0"/>
-                <a:cs typeface="Arial" panose="020B0604020202020204" pitchFamily="34" charset="0"/>
-              </a:rPr>
-              <a:t>1.841e-09</a:t>
-            </a:r>
-          </a:p>
-          <a:p>
-            <a:r>
-              <a:rPr lang="en-US" sz="1200" dirty="0" smtClean="0">
-                <a:latin typeface="Arial" panose="020B0604020202020204" pitchFamily="34" charset="0"/>
-                <a:cs typeface="Arial" panose="020B0604020202020204" pitchFamily="34" charset="0"/>
-              </a:rPr>
-              <a:t>The </a:t>
-            </a:r>
-            <a:r>
-              <a:rPr lang="en-US" sz="1200" dirty="0">
-                <a:latin typeface="Arial" panose="020B0604020202020204" pitchFamily="34" charset="0"/>
-                <a:cs typeface="Arial" panose="020B0604020202020204" pitchFamily="34" charset="0"/>
-              </a:rPr>
-              <a:t>real </a:t>
-            </a:r>
-            <a:r>
-              <a:rPr lang="en-US" sz="1200" dirty="0" smtClean="0">
-                <a:latin typeface="Arial" panose="020B0604020202020204" pitchFamily="34" charset="0"/>
-                <a:cs typeface="Arial" panose="020B0604020202020204" pitchFamily="34" charset="0"/>
-              </a:rPr>
-              <a:t>fatality index 22 regression, is 1.94e-11 (smaller)</a:t>
-            </a:r>
-          </a:p>
-          <a:p>
-            <a:endParaRPr lang="en-US" sz="1200" dirty="0">
-              <a:latin typeface="Arial" panose="020B0604020202020204" pitchFamily="34" charset="0"/>
-              <a:cs typeface="Arial" panose="020B0604020202020204" pitchFamily="34" charset="0"/>
-            </a:endParaRPr>
-          </a:p>
-          <a:p>
-            <a:r>
-              <a:rPr lang="en-US" sz="1200" dirty="0" smtClean="0">
-                <a:latin typeface="Arial" panose="020B0604020202020204" pitchFamily="34" charset="0"/>
-                <a:cs typeface="Arial" panose="020B0604020202020204" pitchFamily="34" charset="0"/>
-              </a:rPr>
               <a:t>This means that the occupation with the most risk for fatality being </a:t>
             </a:r>
             <a:r>
-              <a:rPr lang="en-US" sz="1200" b="1" dirty="0" smtClean="0">
+              <a:rPr lang="en-US" sz="1200" b="1" dirty="0">
                 <a:solidFill>
                   <a:srgbClr val="FF0000"/>
                 </a:solidFill>
                 <a:latin typeface="Arial" panose="020B0604020202020204" pitchFamily="34" charset="0"/>
                 <a:cs typeface="Arial" panose="020B0604020202020204" pitchFamily="34" charset="0"/>
               </a:rPr>
-              <a:t>Military Specific Operations</a:t>
-            </a:r>
-            <a:r>
-              <a:rPr lang="en-US" sz="1200" dirty="0" smtClean="0">
-                <a:latin typeface="Arial" panose="020B0604020202020204" pitchFamily="34" charset="0"/>
-                <a:cs typeface="Arial" panose="020B0604020202020204" pitchFamily="34" charset="0"/>
-              </a:rPr>
-              <a:t>, actually had the </a:t>
-            </a:r>
-            <a:r>
-              <a:rPr lang="en-US" sz="1200" dirty="0" smtClean="0">
-                <a:latin typeface="Arial" panose="020B0604020202020204" pitchFamily="34" charset="0"/>
-                <a:cs typeface="Arial" panose="020B0604020202020204" pitchFamily="34" charset="0"/>
-              </a:rPr>
-              <a:t>smallest</a:t>
-            </a:r>
-            <a:r>
-              <a:rPr lang="en-US" sz="1200" dirty="0" smtClean="0">
-                <a:latin typeface="Arial" panose="020B0604020202020204" pitchFamily="34" charset="0"/>
-                <a:cs typeface="Arial" panose="020B0604020202020204" pitchFamily="34" charset="0"/>
-              </a:rPr>
-              <a:t> real fatality </a:t>
-            </a:r>
-            <a:r>
-              <a:rPr lang="en-US" sz="1200" dirty="0" smtClean="0">
-                <a:latin typeface="Arial" panose="020B0604020202020204" pitchFamily="34" charset="0"/>
-                <a:cs typeface="Arial" panose="020B0604020202020204" pitchFamily="34" charset="0"/>
-              </a:rPr>
-              <a:t>value (highest perception index)</a:t>
-            </a:r>
-            <a:r>
-              <a:rPr lang="en-US" sz="1200" dirty="0" smtClean="0">
-                <a:latin typeface="Arial" panose="020B0604020202020204" pitchFamily="34" charset="0"/>
-                <a:cs typeface="Arial" panose="020B0604020202020204" pitchFamily="34" charset="0"/>
-              </a:rPr>
-              <a:t>. </a:t>
+              <a:t>Military Specific Occupations</a:t>
             </a:r>
             <a:r>
               <a:rPr lang="en-US" sz="1200" dirty="0">
                 <a:latin typeface="Arial" panose="020B0604020202020204" pitchFamily="34" charset="0"/>
                 <a:cs typeface="Arial" panose="020B0604020202020204" pitchFamily="34" charset="0"/>
               </a:rPr>
-              <a:t>T</a:t>
-            </a:r>
-            <a:r>
-              <a:rPr lang="en-US" sz="1200" dirty="0" smtClean="0">
-                <a:latin typeface="Arial" panose="020B0604020202020204" pitchFamily="34" charset="0"/>
-                <a:cs typeface="Arial" panose="020B0604020202020204" pitchFamily="34" charset="0"/>
-              </a:rPr>
-              <a:t>he occupation with the least perceived risk, </a:t>
-            </a:r>
-            <a:r>
-              <a:rPr lang="en-US" sz="1200" b="1" dirty="0" smtClean="0">
+              <a:t>, actually had the smallest real fatality value (highest perception index). The occupation with the least perceived risk, </a:t>
+            </a:r>
+            <a:r>
+              <a:rPr lang="en-US" sz="1200" b="1" dirty="0">
                 <a:solidFill>
                   <a:srgbClr val="FF0000"/>
                 </a:solidFill>
                 <a:latin typeface="Arial" panose="020B0604020202020204" pitchFamily="34" charset="0"/>
                 <a:cs typeface="Arial" panose="020B0604020202020204" pitchFamily="34" charset="0"/>
               </a:rPr>
-              <a:t>Management Operations</a:t>
-            </a:r>
-            <a:r>
-              <a:rPr lang="en-US" sz="1200" dirty="0" smtClean="0">
-                <a:latin typeface="Arial" panose="020B0604020202020204" pitchFamily="34" charset="0"/>
-                <a:cs typeface="Arial" panose="020B0604020202020204" pitchFamily="34" charset="0"/>
-              </a:rPr>
-              <a:t>, had the largest </a:t>
-            </a:r>
-            <a:r>
-              <a:rPr lang="en-US" sz="1200" dirty="0" smtClean="0">
-                <a:latin typeface="Arial" panose="020B0604020202020204" pitchFamily="34" charset="0"/>
-                <a:cs typeface="Arial" panose="020B0604020202020204" pitchFamily="34" charset="0"/>
-              </a:rPr>
-              <a:t>real fatality value (lowest perception index)</a:t>
-            </a:r>
-            <a:r>
-              <a:rPr lang="en-US" sz="1400" dirty="0" smtClean="0">
+              <a:t>Management Occupations</a:t>
+            </a:r>
+            <a:r>
+              <a:rPr lang="en-US" sz="1200" dirty="0">
+                <a:latin typeface="Arial" panose="020B0604020202020204" pitchFamily="34" charset="0"/>
+                <a:cs typeface="Arial" panose="020B0604020202020204" pitchFamily="34" charset="0"/>
+              </a:rPr>
+              <a:t>, had the largest real fatality value (lowest perception index)</a:t>
+            </a:r>
+            <a:r>
+              <a:rPr lang="en-US" sz="1400" dirty="0">
                 <a:latin typeface="Arial" panose="020B0604020202020204" pitchFamily="34" charset="0"/>
                 <a:cs typeface="Arial" panose="020B0604020202020204" pitchFamily="34" charset="0"/>
               </a:rPr>
               <a:t>.</a:t>
             </a:r>
-            <a:endParaRPr lang="en-US" sz="1400" dirty="0">
-              <a:latin typeface="Arial" panose="020B0604020202020204" pitchFamily="34" charset="0"/>
-              <a:cs typeface="Arial" panose="020B0604020202020204" pitchFamily="34" charset="0"/>
-            </a:endParaRPr>
           </a:p>
         </p:txBody>
       </p:sp>
@@ -6854,16 +7723,12 @@
             <a:lstStyle/>
             <a:p>
               <a:r>
-                <a:rPr lang="en-US" sz="1400" dirty="0" smtClean="0">
+                <a:rPr lang="en-US" sz="1400" dirty="0">
                   <a:latin typeface="Arial" panose="020B0604020202020204" pitchFamily="34" charset="0"/>
                   <a:cs typeface="Arial" panose="020B0604020202020204" pitchFamily="34" charset="0"/>
                 </a:rPr>
                 <a:t>risk</a:t>
               </a:r>
-              <a:endParaRPr lang="en-US" sz="1400" dirty="0">
-                <a:latin typeface="Arial" panose="020B0604020202020204" pitchFamily="34" charset="0"/>
-                <a:cs typeface="Arial" panose="020B0604020202020204" pitchFamily="34" charset="0"/>
-              </a:endParaRPr>
             </a:p>
           </p:txBody>
         </p:sp>
@@ -6935,49 +7800,232 @@
                 <a:latin typeface="Arial" panose="020B0604020202020204" pitchFamily="34" charset="0"/>
                 <a:cs typeface="Arial" panose="020B0604020202020204" pitchFamily="34" charset="0"/>
               </a:rPr>
-              <a:t>r</a:t>
-            </a:r>
-            <a:r>
-              <a:rPr lang="en-US" sz="1400" b="1" dirty="0" smtClean="0">
-                <a:solidFill>
-                  <a:srgbClr val="00B050"/>
-                </a:solidFill>
-                <a:latin typeface="Arial" panose="020B0604020202020204" pitchFamily="34" charset="0"/>
-                <a:cs typeface="Arial" panose="020B0604020202020204" pitchFamily="34" charset="0"/>
-              </a:rPr>
-              <a:t>isk perception</a:t>
-            </a:r>
-            <a:endParaRPr lang="en-US" sz="1400" b="1" dirty="0">
+              <a:t>risk perception</a:t>
+            </a:r>
+          </a:p>
+        </p:txBody>
+      </p:sp>
+      <p:grpSp>
+        <p:nvGrpSpPr>
+          <p:cNvPr id="2" name="Group 1">
+            <a:extLst>
+              <a:ext uri="{FF2B5EF4-FFF2-40B4-BE49-F238E27FC236}">
+                <a16:creationId xmlns:a16="http://schemas.microsoft.com/office/drawing/2014/main" id="{979609AA-230A-4CE4-999A-67099A7F0AF6}"/>
+              </a:ext>
+            </a:extLst>
+          </p:cNvPr>
+          <p:cNvGrpSpPr/>
+          <p:nvPr/>
+        </p:nvGrpSpPr>
+        <p:grpSpPr>
+          <a:xfrm>
+            <a:off x="5528535" y="288046"/>
+            <a:ext cx="6561208" cy="6561208"/>
+            <a:chOff x="5528535" y="288046"/>
+            <a:chExt cx="6561208" cy="6561208"/>
+          </a:xfrm>
+        </p:grpSpPr>
+        <p:pic>
+          <p:nvPicPr>
+            <p:cNvPr id="3" name="Picture 2"/>
+            <p:cNvPicPr>
+              <a:picLocks noChangeAspect="1"/>
+            </p:cNvPicPr>
+            <p:nvPr/>
+          </p:nvPicPr>
+          <p:blipFill>
+            <a:blip r:embed="rId2"/>
+            <a:stretch>
+              <a:fillRect/>
+            </a:stretch>
+          </p:blipFill>
+          <p:spPr>
+            <a:xfrm>
+              <a:off x="5528535" y="288046"/>
+              <a:ext cx="6561208" cy="6561208"/>
+            </a:xfrm>
+            <a:prstGeom prst="rect">
+              <a:avLst/>
+            </a:prstGeom>
+          </p:spPr>
+        </p:pic>
+        <p:sp>
+          <p:nvSpPr>
+            <p:cNvPr id="10" name="TextBox 9">
+              <a:extLst>
+                <a:ext uri="{FF2B5EF4-FFF2-40B4-BE49-F238E27FC236}">
+                  <a16:creationId xmlns:a16="http://schemas.microsoft.com/office/drawing/2014/main" id="{7A54DAF6-9526-45E3-BCE8-5FBC2B9C7781}"/>
+                </a:ext>
+              </a:extLst>
+            </p:cNvPr>
+            <p:cNvSpPr txBox="1"/>
+            <p:nvPr/>
+          </p:nvSpPr>
+          <p:spPr>
+            <a:xfrm>
+              <a:off x="10552050" y="2390641"/>
+              <a:ext cx="940988" cy="307777"/>
+            </a:xfrm>
+            <a:prstGeom prst="rect">
+              <a:avLst/>
+            </a:prstGeom>
+            <a:noFill/>
+          </p:spPr>
+          <p:txBody>
+            <a:bodyPr wrap="square" rtlCol="0">
+              <a:spAutoFit/>
+            </a:bodyPr>
+            <a:lstStyle/>
+            <a:p>
+              <a:r>
+                <a:rPr lang="en-US" sz="1400" b="1" dirty="0">
+                  <a:latin typeface="Arial" panose="020B0604020202020204" pitchFamily="34" charset="0"/>
+                  <a:cs typeface="Arial" panose="020B0604020202020204" pitchFamily="34" charset="0"/>
+                </a:rPr>
+                <a:t>Index 22</a:t>
+              </a:r>
+            </a:p>
+          </p:txBody>
+        </p:sp>
+        <p:sp>
+          <p:nvSpPr>
+            <p:cNvPr id="12" name="TextBox 11">
+              <a:extLst>
+                <a:ext uri="{FF2B5EF4-FFF2-40B4-BE49-F238E27FC236}">
+                  <a16:creationId xmlns:a16="http://schemas.microsoft.com/office/drawing/2014/main" id="{3A5CD74A-D92B-4AF0-B1CA-B17DB4945BB8}"/>
+                </a:ext>
+              </a:extLst>
+            </p:cNvPr>
+            <p:cNvSpPr txBox="1"/>
+            <p:nvPr/>
+          </p:nvSpPr>
+          <p:spPr>
+            <a:xfrm>
+              <a:off x="6369614" y="3214497"/>
+              <a:ext cx="940988" cy="307777"/>
+            </a:xfrm>
+            <a:prstGeom prst="rect">
+              <a:avLst/>
+            </a:prstGeom>
+            <a:noFill/>
+          </p:spPr>
+          <p:txBody>
+            <a:bodyPr wrap="square" rtlCol="0">
+              <a:spAutoFit/>
+            </a:bodyPr>
+            <a:lstStyle/>
+            <a:p>
+              <a:r>
+                <a:rPr lang="en-US" sz="1400" b="1" dirty="0">
+                  <a:latin typeface="Arial" panose="020B0604020202020204" pitchFamily="34" charset="0"/>
+                  <a:cs typeface="Arial" panose="020B0604020202020204" pitchFamily="34" charset="0"/>
+                </a:rPr>
+                <a:t>Index 0</a:t>
+              </a:r>
+            </a:p>
+          </p:txBody>
+        </p:sp>
+        <p:cxnSp>
+          <p:nvCxnSpPr>
+            <p:cNvPr id="13" name="Straight Arrow Connector 12">
+              <a:extLst>
+                <a:ext uri="{FF2B5EF4-FFF2-40B4-BE49-F238E27FC236}">
+                  <a16:creationId xmlns:a16="http://schemas.microsoft.com/office/drawing/2014/main" id="{3B175C50-D53F-4034-BA11-92204B37785C}"/>
+                </a:ext>
+              </a:extLst>
+            </p:cNvPr>
+            <p:cNvCxnSpPr/>
+            <p:nvPr/>
+          </p:nvCxnSpPr>
+          <p:spPr>
+            <a:xfrm flipH="1" flipV="1">
+              <a:off x="6617110" y="2544529"/>
+              <a:ext cx="128427" cy="642762"/>
+            </a:xfrm>
+            <a:prstGeom prst="straightConnector1">
+              <a:avLst/>
+            </a:prstGeom>
+            <a:ln w="12700">
               <a:solidFill>
-                <a:srgbClr val="00B050"/>
+                <a:schemeClr val="tx1"/>
               </a:solidFill>
-              <a:latin typeface="Arial" panose="020B0604020202020204" pitchFamily="34" charset="0"/>
-              <a:cs typeface="Arial" panose="020B0604020202020204" pitchFamily="34" charset="0"/>
-            </a:endParaRPr>
-          </a:p>
-        </p:txBody>
-      </p:sp>
+              <a:tailEnd type="triangle" w="lg" len="lg"/>
+            </a:ln>
+          </p:spPr>
+          <p:style>
+            <a:lnRef idx="1">
+              <a:schemeClr val="accent1"/>
+            </a:lnRef>
+            <a:fillRef idx="0">
+              <a:schemeClr val="accent1"/>
+            </a:fillRef>
+            <a:effectRef idx="0">
+              <a:schemeClr val="accent1"/>
+            </a:effectRef>
+            <a:fontRef idx="minor">
+              <a:schemeClr val="tx1"/>
+            </a:fontRef>
+          </p:style>
+        </p:cxnSp>
+        <p:cxnSp>
+          <p:nvCxnSpPr>
+            <p:cNvPr id="16" name="Straight Arrow Connector 15">
+              <a:extLst>
+                <a:ext uri="{FF2B5EF4-FFF2-40B4-BE49-F238E27FC236}">
+                  <a16:creationId xmlns:a16="http://schemas.microsoft.com/office/drawing/2014/main" id="{CE15C184-2913-4C04-A0F0-2E708E76AC14}"/>
+                </a:ext>
+              </a:extLst>
+            </p:cNvPr>
+            <p:cNvCxnSpPr>
+              <a:stCxn id="10" idx="0"/>
+            </p:cNvCxnSpPr>
+            <p:nvPr/>
+          </p:nvCxnSpPr>
+          <p:spPr>
+            <a:xfrm flipV="1">
+              <a:off x="11022544" y="1676402"/>
+              <a:ext cx="183936" cy="714239"/>
+            </a:xfrm>
+            <a:prstGeom prst="straightConnector1">
+              <a:avLst/>
+            </a:prstGeom>
+            <a:ln w="12700">
+              <a:solidFill>
+                <a:schemeClr val="tx1"/>
+              </a:solidFill>
+              <a:tailEnd type="triangle" w="lg" len="lg"/>
+            </a:ln>
+          </p:spPr>
+          <p:style>
+            <a:lnRef idx="1">
+              <a:schemeClr val="accent1"/>
+            </a:lnRef>
+            <a:fillRef idx="0">
+              <a:schemeClr val="accent1"/>
+            </a:fillRef>
+            <a:effectRef idx="0">
+              <a:schemeClr val="accent1"/>
+            </a:effectRef>
+            <a:fontRef idx="minor">
+              <a:schemeClr val="tx1"/>
+            </a:fontRef>
+          </p:style>
+        </p:cxnSp>
+      </p:grpSp>
     </p:spTree>
     <p:extLst>
       <p:ext uri="{BB962C8B-B14F-4D97-AF65-F5344CB8AC3E}">
-        <p14:creationId xmlns:p14="http://schemas.microsoft.com/office/powerpoint/2010/main" val="1166745943"/>
+        <p14:creationId xmlns:p14="http://schemas.microsoft.com/office/powerpoint/2010/main" val="1931420818"/>
       </p:ext>
     </p:extLst>
   </p:cSld>
   <p:clrMapOvr>
     <a:masterClrMapping/>
   </p:clrMapOvr>
-  <p:timing>
-    <p:tnLst>
-      <p:par>
-        <p:cTn id="1" dur="indefinite" restart="never" nodeType="tmRoot"/>
-      </p:par>
-    </p:tnLst>
-  </p:timing>
 </p:sld>
 </file>
 
-<file path=ppt/slides/slide17.xml><?xml version="1.0" encoding="utf-8"?>
+<file path=ppt/slides/slide18.xml><?xml version="1.0" encoding="utf-8"?>
 <p:sld xmlns:a="http://schemas.openxmlformats.org/drawingml/2006/main" xmlns:r="http://schemas.openxmlformats.org/officeDocument/2006/relationships" xmlns:p="http://schemas.openxmlformats.org/presentationml/2006/main">
   <p:cSld>
     <p:spTree>
@@ -6994,30 +8042,6 @@
           <a:chExt cx="0" cy="0"/>
         </a:xfrm>
       </p:grpSpPr>
-      <p:pic>
-        <p:nvPicPr>
-          <p:cNvPr id="3" name="Picture 2"/>
-          <p:cNvPicPr>
-            <a:picLocks noChangeAspect="1"/>
-          </p:cNvPicPr>
-          <p:nvPr/>
-        </p:nvPicPr>
-        <p:blipFill>
-          <a:blip r:embed="rId2"/>
-          <a:stretch>
-            <a:fillRect/>
-          </a:stretch>
-        </p:blipFill>
-        <p:spPr>
-          <a:xfrm>
-            <a:off x="5528535" y="288046"/>
-            <a:ext cx="6561208" cy="6561208"/>
-          </a:xfrm>
-          <a:prstGeom prst="rect">
-            <a:avLst/>
-          </a:prstGeom>
-        </p:spPr>
-      </p:pic>
       <p:sp>
         <p:nvSpPr>
           <p:cNvPr id="11" name="Title 1">
@@ -7069,7 +8093,7 @@
           </a:lstStyle>
           <a:p>
             <a:r>
-              <a:rPr lang="en-US" sz="2000" b="1" dirty="0" smtClean="0">
+              <a:rPr lang="en-US" sz="2000" b="1" dirty="0">
                 <a:latin typeface="Arial" panose="020B0604020202020204" pitchFamily="34" charset="0"/>
                 <a:cs typeface="Arial" panose="020B0604020202020204" pitchFamily="34" charset="0"/>
               </a:rPr>
@@ -7093,8 +8117,8 @@
         </p:nvSpPr>
         <p:spPr>
           <a:xfrm>
-            <a:off x="575386" y="1304852"/>
-            <a:ext cx="4882760" cy="5016758"/>
+            <a:off x="743642" y="1325366"/>
+            <a:ext cx="4706524" cy="4770537"/>
           </a:xfrm>
           <a:prstGeom prst="rect">
             <a:avLst/>
@@ -7112,7 +8136,7 @@
           </a:bodyPr>
           <a:lstStyle/>
           <a:p>
-            <a:endParaRPr lang="en-US" sz="1600" dirty="0" smtClean="0">
+            <a:endParaRPr lang="en-US" sz="1600" dirty="0">
               <a:latin typeface="Arial" panose="020B0604020202020204" pitchFamily="34" charset="0"/>
               <a:cs typeface="Arial" panose="020B0604020202020204" pitchFamily="34" charset="0"/>
             </a:endParaRPr>
@@ -7133,7 +8157,7 @@
                 <a:latin typeface="Arial" panose="020B0604020202020204" pitchFamily="34" charset="0"/>
                 <a:cs typeface="Arial" panose="020B0604020202020204" pitchFamily="34" charset="0"/>
               </a:rPr>
-              <a:t>Management Operations</a:t>
+              <a:t>Management Occupations</a:t>
             </a:r>
             <a:r>
               <a:rPr lang="en-US" sz="1600" dirty="0">
@@ -7144,42 +8168,28 @@
             </a:r>
           </a:p>
           <a:p>
-            <a:endParaRPr lang="en-US" sz="1600" dirty="0" smtClean="0">
-              <a:latin typeface="Arial" panose="020B0604020202020204" pitchFamily="34" charset="0"/>
-              <a:cs typeface="Arial" panose="020B0604020202020204" pitchFamily="34" charset="0"/>
-            </a:endParaRPr>
-          </a:p>
-          <a:p>
-            <a:r>
-              <a:rPr lang="en-US" sz="1600" dirty="0" smtClean="0">
-                <a:latin typeface="Arial" panose="020B0604020202020204" pitchFamily="34" charset="0"/>
-                <a:cs typeface="Arial" panose="020B0604020202020204" pitchFamily="34" charset="0"/>
-              </a:rPr>
-              <a:t>For</a:t>
-            </a:r>
-            <a:r>
-              <a:rPr lang="en-US" sz="1600" dirty="0" smtClean="0">
-                <a:latin typeface="Arial" panose="020B0604020202020204" pitchFamily="34" charset="0"/>
-                <a:cs typeface="Arial" panose="020B0604020202020204" pitchFamily="34" charset="0"/>
-              </a:rPr>
-              <a:t> </a:t>
-            </a:r>
-            <a:r>
-              <a:rPr lang="en-US" sz="1600" b="1" dirty="0" smtClean="0">
-                <a:latin typeface="Arial" panose="020B0604020202020204" pitchFamily="34" charset="0"/>
-                <a:cs typeface="Arial" panose="020B0604020202020204" pitchFamily="34" charset="0"/>
-              </a:rPr>
-              <a:t>index </a:t>
+            <a:endParaRPr lang="en-US" sz="1600" dirty="0">
+              <a:latin typeface="Arial" panose="020B0604020202020204" pitchFamily="34" charset="0"/>
+              <a:cs typeface="Arial" panose="020B0604020202020204" pitchFamily="34" charset="0"/>
+            </a:endParaRPr>
+          </a:p>
+          <a:p>
+            <a:r>
+              <a:rPr lang="en-US" sz="1600" dirty="0">
+                <a:latin typeface="Arial" panose="020B0604020202020204" pitchFamily="34" charset="0"/>
+                <a:cs typeface="Arial" panose="020B0604020202020204" pitchFamily="34" charset="0"/>
+              </a:rPr>
+              <a:t>For </a:t>
             </a:r>
             <a:r>
               <a:rPr lang="en-US" sz="1600" b="1" dirty="0">
                 <a:latin typeface="Arial" panose="020B0604020202020204" pitchFamily="34" charset="0"/>
                 <a:cs typeface="Arial" panose="020B0604020202020204" pitchFamily="34" charset="0"/>
               </a:rPr>
-              <a:t>0 </a:t>
-            </a:r>
-            <a:r>
-              <a:rPr lang="en-US" sz="1600" dirty="0" smtClean="0">
+              <a:t>index 0 </a:t>
+            </a:r>
+            <a:r>
+              <a:rPr lang="en-US" sz="1600" dirty="0">
                 <a:latin typeface="Arial" panose="020B0604020202020204" pitchFamily="34" charset="0"/>
                 <a:cs typeface="Arial" panose="020B0604020202020204" pitchFamily="34" charset="0"/>
               </a:rPr>
@@ -7187,7 +8197,7 @@
             </a:r>
           </a:p>
           <a:p>
-            <a:endParaRPr lang="en-US" sz="1600" dirty="0" smtClean="0">
+            <a:endParaRPr lang="en-US" sz="1600" dirty="0">
               <a:latin typeface="Arial" panose="020B0604020202020204" pitchFamily="34" charset="0"/>
               <a:cs typeface="Arial" panose="020B0604020202020204" pitchFamily="34" charset="0"/>
             </a:endParaRPr>
@@ -7195,21 +8205,17 @@
           <a:p>
             <a:pPr algn="ctr"/>
             <a:r>
-              <a:rPr lang="en-US" sz="1600" dirty="0" smtClean="0">
+              <a:rPr lang="en-US" sz="1600" dirty="0">
                 <a:latin typeface="Arial" panose="020B0604020202020204" pitchFamily="34" charset="0"/>
                 <a:cs typeface="Arial" panose="020B0604020202020204" pitchFamily="34" charset="0"/>
               </a:rPr>
               <a:t>8.73 (lower risk perception index)</a:t>
             </a:r>
-            <a:endParaRPr lang="en-US" sz="1600" dirty="0" smtClean="0">
-              <a:latin typeface="Arial" panose="020B0604020202020204" pitchFamily="34" charset="0"/>
-              <a:cs typeface="Arial" panose="020B0604020202020204" pitchFamily="34" charset="0"/>
-            </a:endParaRPr>
           </a:p>
           <a:p>
             <a:pPr algn="ctr"/>
             <a:r>
-              <a:rPr lang="en-US" sz="1600" b="1" dirty="0" smtClean="0">
+              <a:rPr lang="en-US" sz="1600" b="1" dirty="0">
                 <a:latin typeface="Arial" panose="020B0604020202020204" pitchFamily="34" charset="0"/>
                 <a:cs typeface="Arial" panose="020B0604020202020204" pitchFamily="34" charset="0"/>
               </a:rPr>
@@ -7224,63 +8230,28 @@
           </a:p>
           <a:p>
             <a:r>
-              <a:rPr lang="en-US" sz="1600" dirty="0" smtClean="0">
-                <a:latin typeface="Arial" panose="020B0604020202020204" pitchFamily="34" charset="0"/>
-                <a:cs typeface="Arial" panose="020B0604020202020204" pitchFamily="34" charset="0"/>
-              </a:rPr>
-              <a:t>The occupation </a:t>
-            </a:r>
-            <a:r>
-              <a:rPr lang="en-US" sz="1600" dirty="0" smtClean="0">
-                <a:latin typeface="Arial" panose="020B0604020202020204" pitchFamily="34" charset="0"/>
-                <a:cs typeface="Arial" panose="020B0604020202020204" pitchFamily="34" charset="0"/>
-              </a:rPr>
-              <a:t>with the most risk for fatality being </a:t>
-            </a:r>
-            <a:r>
-              <a:rPr lang="en-US" sz="1600" b="1" dirty="0" smtClean="0">
+              <a:rPr lang="en-US" sz="1600" dirty="0">
+                <a:latin typeface="Arial" panose="020B0604020202020204" pitchFamily="34" charset="0"/>
+                <a:cs typeface="Arial" panose="020B0604020202020204" pitchFamily="34" charset="0"/>
+              </a:rPr>
+              <a:t>The occupation with the most risk for fatality being </a:t>
+            </a:r>
+            <a:r>
+              <a:rPr lang="en-US" sz="1600" b="1" dirty="0">
                 <a:solidFill>
                   <a:srgbClr val="FF0000"/>
                 </a:solidFill>
                 <a:latin typeface="Arial" panose="020B0604020202020204" pitchFamily="34" charset="0"/>
                 <a:cs typeface="Arial" panose="020B0604020202020204" pitchFamily="34" charset="0"/>
               </a:rPr>
-              <a:t>Military Specific Operations</a:t>
-            </a:r>
-            <a:r>
-              <a:rPr lang="en-US" sz="1600" dirty="0" smtClean="0">
-                <a:latin typeface="Arial" panose="020B0604020202020204" pitchFamily="34" charset="0"/>
-                <a:cs typeface="Arial" panose="020B0604020202020204" pitchFamily="34" charset="0"/>
-              </a:rPr>
-              <a:t>, actually had the </a:t>
-            </a:r>
-            <a:r>
-              <a:rPr lang="en-US" sz="1600" dirty="0" smtClean="0">
-                <a:latin typeface="Arial" panose="020B0604020202020204" pitchFamily="34" charset="0"/>
-                <a:cs typeface="Arial" panose="020B0604020202020204" pitchFamily="34" charset="0"/>
-              </a:rPr>
-              <a:t>smallest</a:t>
-            </a:r>
-            <a:r>
-              <a:rPr lang="en-US" sz="1600" dirty="0" smtClean="0">
-                <a:latin typeface="Arial" panose="020B0604020202020204" pitchFamily="34" charset="0"/>
-                <a:cs typeface="Arial" panose="020B0604020202020204" pitchFamily="34" charset="0"/>
-              </a:rPr>
-              <a:t> real fatality </a:t>
-            </a:r>
-            <a:r>
-              <a:rPr lang="en-US" sz="1600" dirty="0" smtClean="0">
-                <a:latin typeface="Arial" panose="020B0604020202020204" pitchFamily="34" charset="0"/>
-                <a:cs typeface="Arial" panose="020B0604020202020204" pitchFamily="34" charset="0"/>
-              </a:rPr>
-              <a:t>value (highest perception index)</a:t>
-            </a:r>
-            <a:r>
-              <a:rPr lang="en-US" sz="1600" dirty="0" smtClean="0">
-                <a:latin typeface="Arial" panose="020B0604020202020204" pitchFamily="34" charset="0"/>
-                <a:cs typeface="Arial" panose="020B0604020202020204" pitchFamily="34" charset="0"/>
-              </a:rPr>
-              <a:t>. </a:t>
+              <a:t>Military Specific Occupations</a:t>
+            </a:r>
+            <a:r>
+              <a:rPr lang="en-US" sz="1600" dirty="0">
+                <a:latin typeface="Arial" panose="020B0604020202020204" pitchFamily="34" charset="0"/>
+                <a:cs typeface="Arial" panose="020B0604020202020204" pitchFamily="34" charset="0"/>
+              </a:rPr>
+              <a:t>, had the smallest real fatality value (highest perception index). </a:t>
             </a:r>
           </a:p>
           <a:p>
@@ -7291,28 +8262,21 @@
           </a:p>
           <a:p>
             <a:r>
-              <a:rPr lang="en-US" sz="1600" dirty="0" smtClean="0">
+              <a:rPr lang="en-US" sz="1600" dirty="0">
                 <a:latin typeface="Arial" panose="020B0604020202020204" pitchFamily="34" charset="0"/>
                 <a:cs typeface="Arial" panose="020B0604020202020204" pitchFamily="34" charset="0"/>
               </a:rPr>
               <a:t>For </a:t>
             </a:r>
             <a:r>
-              <a:rPr lang="en-US" sz="1600" b="1" dirty="0" smtClean="0">
-                <a:latin typeface="Arial" panose="020B0604020202020204" pitchFamily="34" charset="0"/>
-                <a:cs typeface="Arial" panose="020B0604020202020204" pitchFamily="34" charset="0"/>
-              </a:rPr>
-              <a:t>index </a:t>
-            </a:r>
-            <a:r>
               <a:rPr lang="en-US" sz="1600" b="1" dirty="0">
                 <a:latin typeface="Arial" panose="020B0604020202020204" pitchFamily="34" charset="0"/>
                 <a:cs typeface="Arial" panose="020B0604020202020204" pitchFamily="34" charset="0"/>
               </a:rPr>
-              <a:t>22 </a:t>
-            </a:r>
-            <a:r>
-              <a:rPr lang="en-US" sz="1600" dirty="0" smtClean="0">
+              <a:t>index 22 </a:t>
+            </a:r>
+            <a:r>
+              <a:rPr lang="en-US" sz="1600" dirty="0">
                 <a:latin typeface="Arial" panose="020B0604020202020204" pitchFamily="34" charset="0"/>
                 <a:cs typeface="Arial" panose="020B0604020202020204" pitchFamily="34" charset="0"/>
               </a:rPr>
@@ -7320,7 +8284,7 @@
             </a:r>
           </a:p>
           <a:p>
-            <a:endParaRPr lang="en-US" sz="1600" dirty="0" smtClean="0">
+            <a:endParaRPr lang="en-US" sz="1600" dirty="0">
               <a:latin typeface="Arial" panose="020B0604020202020204" pitchFamily="34" charset="0"/>
               <a:cs typeface="Arial" panose="020B0604020202020204" pitchFamily="34" charset="0"/>
             </a:endParaRPr>
@@ -7328,31 +8292,17 @@
           <a:p>
             <a:pPr algn="ctr"/>
             <a:r>
-              <a:rPr lang="en-US" sz="1600" dirty="0" smtClean="0">
-                <a:latin typeface="Arial" panose="020B0604020202020204" pitchFamily="34" charset="0"/>
-                <a:cs typeface="Arial" panose="020B0604020202020204" pitchFamily="34" charset="0"/>
-              </a:rPr>
-              <a:t>10.71 (higher </a:t>
-            </a:r>
-            <a:r>
               <a:rPr lang="en-US" sz="1600" dirty="0">
                 <a:latin typeface="Arial" panose="020B0604020202020204" pitchFamily="34" charset="0"/>
                 <a:cs typeface="Arial" panose="020B0604020202020204" pitchFamily="34" charset="0"/>
               </a:rPr>
-              <a:t>risk perception index</a:t>
-            </a:r>
-            <a:r>
-              <a:rPr lang="en-US" sz="1600" dirty="0" smtClean="0">
-                <a:latin typeface="Arial" panose="020B0604020202020204" pitchFamily="34" charset="0"/>
-                <a:cs typeface="Arial" panose="020B0604020202020204" pitchFamily="34" charset="0"/>
-              </a:rPr>
-              <a:t>)</a:t>
+              <a:t>10.71 (higher risk perception index)</a:t>
             </a:r>
           </a:p>
           <a:p>
             <a:pPr algn="ctr"/>
             <a:r>
-              <a:rPr lang="en-US" sz="1600" b="1" dirty="0" smtClean="0">
+              <a:rPr lang="en-US" sz="1600" b="1" dirty="0">
                 <a:solidFill>
                   <a:srgbClr val="00B0F0"/>
                 </a:solidFill>
@@ -7362,7 +8312,7 @@
               <a:t> </a:t>
             </a:r>
             <a:r>
-              <a:rPr lang="en-US" sz="1600" b="1" dirty="0" smtClean="0">
+              <a:rPr lang="en-US" sz="1600" b="1" dirty="0">
                 <a:latin typeface="Arial" panose="020B0604020202020204" pitchFamily="34" charset="0"/>
                 <a:cs typeface="Arial" panose="020B0604020202020204" pitchFamily="34" charset="0"/>
               </a:rPr>
@@ -7451,16 +8401,12 @@
             <a:lstStyle/>
             <a:p>
               <a:r>
-                <a:rPr lang="en-US" sz="1400" dirty="0" smtClean="0">
+                <a:rPr lang="en-US" sz="1400" dirty="0">
                   <a:latin typeface="Arial" panose="020B0604020202020204" pitchFamily="34" charset="0"/>
                   <a:cs typeface="Arial" panose="020B0604020202020204" pitchFamily="34" charset="0"/>
                 </a:rPr>
                 <a:t>risk</a:t>
               </a:r>
-              <a:endParaRPr lang="en-US" sz="1400" dirty="0">
-                <a:latin typeface="Arial" panose="020B0604020202020204" pitchFamily="34" charset="0"/>
-                <a:cs typeface="Arial" panose="020B0604020202020204" pitchFamily="34" charset="0"/>
-              </a:endParaRPr>
             </a:p>
           </p:txBody>
         </p:sp>
@@ -7532,174 +8478,194 @@
                 <a:latin typeface="Arial" panose="020B0604020202020204" pitchFamily="34" charset="0"/>
                 <a:cs typeface="Arial" panose="020B0604020202020204" pitchFamily="34" charset="0"/>
               </a:rPr>
-              <a:t>r</a:t>
-            </a:r>
-            <a:r>
-              <a:rPr lang="en-US" sz="1400" b="1" dirty="0" smtClean="0">
-                <a:solidFill>
-                  <a:srgbClr val="00B050"/>
-                </a:solidFill>
-                <a:latin typeface="Arial" panose="020B0604020202020204" pitchFamily="34" charset="0"/>
-                <a:cs typeface="Arial" panose="020B0604020202020204" pitchFamily="34" charset="0"/>
-              </a:rPr>
-              <a:t>isk perception</a:t>
-            </a:r>
-            <a:endParaRPr lang="en-US" sz="1400" b="1" dirty="0">
+              <a:t>risk perception</a:t>
+            </a:r>
+          </a:p>
+        </p:txBody>
+      </p:sp>
+      <p:grpSp>
+        <p:nvGrpSpPr>
+          <p:cNvPr id="6" name="Group 5">
+            <a:extLst>
+              <a:ext uri="{FF2B5EF4-FFF2-40B4-BE49-F238E27FC236}">
+                <a16:creationId xmlns:a16="http://schemas.microsoft.com/office/drawing/2014/main" id="{7CDFAE28-C5B2-4E1A-AB3F-FD8C6AA3FCAD}"/>
+              </a:ext>
+            </a:extLst>
+          </p:cNvPr>
+          <p:cNvGrpSpPr/>
+          <p:nvPr/>
+        </p:nvGrpSpPr>
+        <p:grpSpPr>
+          <a:xfrm>
+            <a:off x="5458146" y="0"/>
+            <a:ext cx="6561208" cy="6858000"/>
+            <a:chOff x="5528535" y="288046"/>
+            <a:chExt cx="6561208" cy="6561208"/>
+          </a:xfrm>
+        </p:grpSpPr>
+        <p:pic>
+          <p:nvPicPr>
+            <p:cNvPr id="3" name="Picture 2"/>
+            <p:cNvPicPr>
+              <a:picLocks noChangeAspect="1"/>
+            </p:cNvPicPr>
+            <p:nvPr/>
+          </p:nvPicPr>
+          <p:blipFill>
+            <a:blip r:embed="rId3"/>
+            <a:stretch>
+              <a:fillRect/>
+            </a:stretch>
+          </p:blipFill>
+          <p:spPr>
+            <a:xfrm>
+              <a:off x="5528535" y="288046"/>
+              <a:ext cx="6561208" cy="6561208"/>
+            </a:xfrm>
+            <a:prstGeom prst="rect">
+              <a:avLst/>
+            </a:prstGeom>
+          </p:spPr>
+        </p:pic>
+        <p:sp>
+          <p:nvSpPr>
+            <p:cNvPr id="10" name="TextBox 9"/>
+            <p:cNvSpPr txBox="1"/>
+            <p:nvPr/>
+          </p:nvSpPr>
+          <p:spPr>
+            <a:xfrm>
+              <a:off x="10552050" y="2390641"/>
+              <a:ext cx="940988" cy="307777"/>
+            </a:xfrm>
+            <a:prstGeom prst="rect">
+              <a:avLst/>
+            </a:prstGeom>
+            <a:noFill/>
+          </p:spPr>
+          <p:txBody>
+            <a:bodyPr wrap="square" rtlCol="0">
+              <a:spAutoFit/>
+            </a:bodyPr>
+            <a:lstStyle/>
+            <a:p>
+              <a:r>
+                <a:rPr lang="en-US" sz="1400" b="1" dirty="0">
+                  <a:latin typeface="Arial" panose="020B0604020202020204" pitchFamily="34" charset="0"/>
+                  <a:cs typeface="Arial" panose="020B0604020202020204" pitchFamily="34" charset="0"/>
+                </a:rPr>
+                <a:t>Index 22</a:t>
+              </a:r>
+            </a:p>
+          </p:txBody>
+        </p:sp>
+        <p:sp>
+          <p:nvSpPr>
+            <p:cNvPr id="12" name="TextBox 11"/>
+            <p:cNvSpPr txBox="1"/>
+            <p:nvPr/>
+          </p:nvSpPr>
+          <p:spPr>
+            <a:xfrm>
+              <a:off x="6369614" y="3214497"/>
+              <a:ext cx="940988" cy="307777"/>
+            </a:xfrm>
+            <a:prstGeom prst="rect">
+              <a:avLst/>
+            </a:prstGeom>
+            <a:noFill/>
+          </p:spPr>
+          <p:txBody>
+            <a:bodyPr wrap="square" rtlCol="0">
+              <a:spAutoFit/>
+            </a:bodyPr>
+            <a:lstStyle/>
+            <a:p>
+              <a:r>
+                <a:rPr lang="en-US" sz="1400" b="1" dirty="0">
+                  <a:latin typeface="Arial" panose="020B0604020202020204" pitchFamily="34" charset="0"/>
+                  <a:cs typeface="Arial" panose="020B0604020202020204" pitchFamily="34" charset="0"/>
+                </a:rPr>
+                <a:t>Index 0</a:t>
+              </a:r>
+            </a:p>
+          </p:txBody>
+        </p:sp>
+        <p:cxnSp>
+          <p:nvCxnSpPr>
+            <p:cNvPr id="4" name="Straight Arrow Connector 3"/>
+            <p:cNvCxnSpPr/>
+            <p:nvPr/>
+          </p:nvCxnSpPr>
+          <p:spPr>
+            <a:xfrm flipH="1" flipV="1">
+              <a:off x="6617110" y="2544529"/>
+              <a:ext cx="128427" cy="642762"/>
+            </a:xfrm>
+            <a:prstGeom prst="straightConnector1">
+              <a:avLst/>
+            </a:prstGeom>
+            <a:ln w="12700">
               <a:solidFill>
-                <a:srgbClr val="00B050"/>
+                <a:schemeClr val="tx1"/>
               </a:solidFill>
-              <a:latin typeface="Arial" panose="020B0604020202020204" pitchFamily="34" charset="0"/>
-              <a:cs typeface="Arial" panose="020B0604020202020204" pitchFamily="34" charset="0"/>
-            </a:endParaRPr>
-          </a:p>
-        </p:txBody>
-      </p:sp>
-      <p:sp>
-        <p:nvSpPr>
-          <p:cNvPr id="10" name="TextBox 9"/>
-          <p:cNvSpPr txBox="1"/>
-          <p:nvPr/>
-        </p:nvSpPr>
-        <p:spPr>
-          <a:xfrm>
-            <a:off x="10552050" y="2390641"/>
-            <a:ext cx="940988" cy="307777"/>
-          </a:xfrm>
-          <a:prstGeom prst="rect">
-            <a:avLst/>
-          </a:prstGeom>
-          <a:noFill/>
-        </p:spPr>
-        <p:txBody>
-          <a:bodyPr wrap="square" rtlCol="0">
-            <a:spAutoFit/>
-          </a:bodyPr>
-          <a:lstStyle/>
-          <a:p>
-            <a:r>
-              <a:rPr lang="en-US" sz="1400" b="1" dirty="0" smtClean="0">
-                <a:latin typeface="Arial" panose="020B0604020202020204" pitchFamily="34" charset="0"/>
-                <a:cs typeface="Arial" panose="020B0604020202020204" pitchFamily="34" charset="0"/>
-              </a:rPr>
-              <a:t>Index 22</a:t>
-            </a:r>
-            <a:endParaRPr lang="en-US" sz="1400" b="1" dirty="0">
-              <a:latin typeface="Arial" panose="020B0604020202020204" pitchFamily="34" charset="0"/>
-              <a:cs typeface="Arial" panose="020B0604020202020204" pitchFamily="34" charset="0"/>
-            </a:endParaRPr>
-          </a:p>
-        </p:txBody>
-      </p:sp>
-      <p:sp>
-        <p:nvSpPr>
-          <p:cNvPr id="12" name="TextBox 11"/>
-          <p:cNvSpPr txBox="1"/>
-          <p:nvPr/>
-        </p:nvSpPr>
-        <p:spPr>
-          <a:xfrm>
-            <a:off x="6369614" y="3214497"/>
-            <a:ext cx="940988" cy="307777"/>
-          </a:xfrm>
-          <a:prstGeom prst="rect">
-            <a:avLst/>
-          </a:prstGeom>
-          <a:noFill/>
-        </p:spPr>
-        <p:txBody>
-          <a:bodyPr wrap="square" rtlCol="0">
-            <a:spAutoFit/>
-          </a:bodyPr>
-          <a:lstStyle/>
-          <a:p>
-            <a:r>
-              <a:rPr lang="en-US" sz="1400" b="1" dirty="0" smtClean="0">
-                <a:latin typeface="Arial" panose="020B0604020202020204" pitchFamily="34" charset="0"/>
-                <a:cs typeface="Arial" panose="020B0604020202020204" pitchFamily="34" charset="0"/>
-              </a:rPr>
-              <a:t>Index 0</a:t>
-            </a:r>
-            <a:endParaRPr lang="en-US" sz="1400" b="1" dirty="0">
-              <a:latin typeface="Arial" panose="020B0604020202020204" pitchFamily="34" charset="0"/>
-              <a:cs typeface="Arial" panose="020B0604020202020204" pitchFamily="34" charset="0"/>
-            </a:endParaRPr>
-          </a:p>
-        </p:txBody>
-      </p:sp>
-      <p:cxnSp>
-        <p:nvCxnSpPr>
-          <p:cNvPr id="4" name="Straight Arrow Connector 3"/>
-          <p:cNvCxnSpPr/>
-          <p:nvPr/>
-        </p:nvCxnSpPr>
-        <p:spPr>
-          <a:xfrm flipH="1" flipV="1">
-            <a:off x="6617110" y="2544529"/>
-            <a:ext cx="128427" cy="642762"/>
-          </a:xfrm>
-          <a:prstGeom prst="straightConnector1">
-            <a:avLst/>
-          </a:prstGeom>
-          <a:ln w="12700">
-            <a:solidFill>
+              <a:tailEnd type="triangle" w="lg" len="lg"/>
+            </a:ln>
+          </p:spPr>
+          <p:style>
+            <a:lnRef idx="1">
+              <a:schemeClr val="accent1"/>
+            </a:lnRef>
+            <a:fillRef idx="0">
+              <a:schemeClr val="accent1"/>
+            </a:fillRef>
+            <a:effectRef idx="0">
+              <a:schemeClr val="accent1"/>
+            </a:effectRef>
+            <a:fontRef idx="minor">
               <a:schemeClr val="tx1"/>
-            </a:solidFill>
-            <a:tailEnd type="triangle" w="lg" len="lg"/>
-          </a:ln>
-        </p:spPr>
-        <p:style>
-          <a:lnRef idx="1">
-            <a:schemeClr val="accent1"/>
-          </a:lnRef>
-          <a:fillRef idx="0">
-            <a:schemeClr val="accent1"/>
-          </a:fillRef>
-          <a:effectRef idx="0">
-            <a:schemeClr val="accent1"/>
-          </a:effectRef>
-          <a:fontRef idx="minor">
-            <a:schemeClr val="tx1"/>
-          </a:fontRef>
-        </p:style>
-      </p:cxnSp>
-      <p:cxnSp>
-        <p:nvCxnSpPr>
-          <p:cNvPr id="16" name="Straight Arrow Connector 15"/>
-          <p:cNvCxnSpPr>
-            <a:stCxn id="10" idx="0"/>
-          </p:cNvCxnSpPr>
-          <p:nvPr/>
-        </p:nvCxnSpPr>
-        <p:spPr>
-          <a:xfrm flipV="1">
-            <a:off x="11022544" y="1676402"/>
-            <a:ext cx="183936" cy="714239"/>
-          </a:xfrm>
-          <a:prstGeom prst="straightConnector1">
-            <a:avLst/>
-          </a:prstGeom>
-          <a:ln w="12700">
-            <a:solidFill>
+            </a:fontRef>
+          </p:style>
+        </p:cxnSp>
+        <p:cxnSp>
+          <p:nvCxnSpPr>
+            <p:cNvPr id="16" name="Straight Arrow Connector 15"/>
+            <p:cNvCxnSpPr>
+              <a:stCxn id="10" idx="0"/>
+            </p:cNvCxnSpPr>
+            <p:nvPr/>
+          </p:nvCxnSpPr>
+          <p:spPr>
+            <a:xfrm flipV="1">
+              <a:off x="11022544" y="1676402"/>
+              <a:ext cx="183936" cy="714239"/>
+            </a:xfrm>
+            <a:prstGeom prst="straightConnector1">
+              <a:avLst/>
+            </a:prstGeom>
+            <a:ln w="12700">
+              <a:solidFill>
+                <a:schemeClr val="tx1"/>
+              </a:solidFill>
+              <a:tailEnd type="triangle" w="lg" len="lg"/>
+            </a:ln>
+          </p:spPr>
+          <p:style>
+            <a:lnRef idx="1">
+              <a:schemeClr val="accent1"/>
+            </a:lnRef>
+            <a:fillRef idx="0">
+              <a:schemeClr val="accent1"/>
+            </a:fillRef>
+            <a:effectRef idx="0">
+              <a:schemeClr val="accent1"/>
+            </a:effectRef>
+            <a:fontRef idx="minor">
               <a:schemeClr val="tx1"/>
-            </a:solidFill>
-            <a:tailEnd type="triangle" w="lg" len="lg"/>
-          </a:ln>
-        </p:spPr>
-        <p:style>
-          <a:lnRef idx="1">
-            <a:schemeClr val="accent1"/>
-          </a:lnRef>
-          <a:fillRef idx="0">
-            <a:schemeClr val="accent1"/>
-          </a:fillRef>
-          <a:effectRef idx="0">
-            <a:schemeClr val="accent1"/>
-          </a:effectRef>
-          <a:fontRef idx="minor">
-            <a:schemeClr val="tx1"/>
-          </a:fontRef>
-        </p:style>
-      </p:cxnSp>
+            </a:fontRef>
+          </p:style>
+        </p:cxnSp>
+      </p:grpSp>
       <p:sp>
         <p:nvSpPr>
           <p:cNvPr id="2" name="TextBox 1"/>
@@ -7723,42 +8689,35 @@
           <a:lstStyle/>
           <a:p>
             <a:r>
-              <a:rPr lang="en-US" sz="1400" dirty="0" err="1" smtClean="0">
+              <a:rPr lang="en-US" sz="1400" dirty="0" err="1">
                 <a:latin typeface="Arial" panose="020B0604020202020204" pitchFamily="34" charset="0"/>
                 <a:cs typeface="Arial" panose="020B0604020202020204" pitchFamily="34" charset="0"/>
               </a:rPr>
               <a:t>FI_Rate</a:t>
             </a:r>
             <a:r>
-              <a:rPr lang="en-US" sz="1400" baseline="-25000" dirty="0" err="1" smtClean="0">
+              <a:rPr lang="en-US" sz="1400" baseline="-25000" dirty="0" err="1">
                 <a:latin typeface="Arial" panose="020B0604020202020204" pitchFamily="34" charset="0"/>
                 <a:cs typeface="Arial" panose="020B0604020202020204" pitchFamily="34" charset="0"/>
               </a:rPr>
               <a:t>value</a:t>
             </a:r>
             <a:r>
-              <a:rPr lang="en-US" sz="1400" dirty="0" smtClean="0">
-                <a:latin typeface="Arial" panose="020B0604020202020204" pitchFamily="34" charset="0"/>
-                <a:cs typeface="Arial" panose="020B0604020202020204" pitchFamily="34" charset="0"/>
-              </a:rPr>
-              <a:t> </a:t>
-            </a:r>
-            <a:r>
               <a:rPr lang="en-US" sz="1400" dirty="0">
                 <a:latin typeface="Arial" panose="020B0604020202020204" pitchFamily="34" charset="0"/>
                 <a:cs typeface="Arial" panose="020B0604020202020204" pitchFamily="34" charset="0"/>
               </a:rPr>
-              <a:t>= 10 ^ (-1 * </a:t>
-            </a:r>
-            <a:r>
-              <a:rPr lang="en-US" sz="1400" dirty="0" err="1" smtClean="0">
+              <a:t> = 10 ^ (-1 * </a:t>
+            </a:r>
+            <a:r>
+              <a:rPr lang="en-US" sz="1400" dirty="0" err="1">
                 <a:latin typeface="Arial" panose="020B0604020202020204" pitchFamily="34" charset="0"/>
                 <a:cs typeface="Arial" panose="020B0604020202020204" pitchFamily="34" charset="0"/>
               </a:rPr>
               <a:t>RiskPerception</a:t>
             </a:r>
             <a:r>
-              <a:rPr lang="en-US" sz="1400" baseline="-25000" dirty="0" err="1" smtClean="0">
+              <a:rPr lang="en-US" sz="1400" baseline="-25000" dirty="0" err="1">
                 <a:latin typeface="Arial" panose="020B0604020202020204" pitchFamily="34" charset="0"/>
                 <a:cs typeface="Arial" panose="020B0604020202020204" pitchFamily="34" charset="0"/>
               </a:rPr>
@@ -7777,20 +8736,13 @@
     </p:spTree>
     <p:extLst>
       <p:ext uri="{BB962C8B-B14F-4D97-AF65-F5344CB8AC3E}">
-        <p14:creationId xmlns:p14="http://schemas.microsoft.com/office/powerpoint/2010/main" val="171744729"/>
+        <p14:creationId xmlns:p14="http://schemas.microsoft.com/office/powerpoint/2010/main" val="2455687570"/>
       </p:ext>
     </p:extLst>
   </p:cSld>
   <p:clrMapOvr>
     <a:masterClrMapping/>
   </p:clrMapOvr>
-  <p:timing>
-    <p:tnLst>
-      <p:par>
-        <p:cTn id="1" dur="indefinite" restart="never" nodeType="tmRoot"/>
-      </p:par>
-    </p:tnLst>
-  </p:timing>
 </p:sld>
 </file>
 
@@ -7984,21 +8936,7 @@
                 <a:latin typeface="Arial" panose="020B0604020202020204" pitchFamily="34" charset="0"/>
                 <a:cs typeface="Arial" panose="020B0604020202020204" pitchFamily="34" charset="0"/>
               </a:rPr>
-              <a:t>The SOCJOBCODE is a numerical valued categorical classification system, that is used to encode the occupational type, however it is encoded in such a way, that it can also be used as an independent variable. The SOC job code number is a six digit number, where the powers of 10 place value, implement a value of manual operation encoding.  The numerical range of this encoding is also enumerated in increasing risk order, since the employment classifications at the lower range of value represents an occupation with a higher degree of </a:t>
-            </a:r>
-            <a:r>
-              <a:rPr lang="en-US" sz="1600" dirty="0" smtClean="0">
-                <a:latin typeface="Arial" panose="020B0604020202020204" pitchFamily="34" charset="0"/>
-                <a:cs typeface="Arial" panose="020B0604020202020204" pitchFamily="34" charset="0"/>
-              </a:rPr>
-              <a:t>administrative </a:t>
-            </a:r>
-            <a:r>
-              <a:rPr lang="en-US" sz="1600" dirty="0" smtClean="0">
-                <a:latin typeface="Arial" panose="020B0604020202020204" pitchFamily="34" charset="0"/>
-                <a:cs typeface="Arial" panose="020B0604020202020204" pitchFamily="34" charset="0"/>
-              </a:rPr>
-              <a:t>type work.</a:t>
+              <a:t>The SOCJOBCODE is a numerical valued categorical classification system, that is used to encode the occupational type, however it is encoded in such a way, that it can also be used as an independent variable. The SOC job code number is a six digit number, where the powers of 10 place value, implement a value of manual operation encoding.  The numerical range of this encoding is also enumerated in increasing risk order, since the employment classifications at the lower range of value represents an occupation with a higher degree of administrative type work.</a:t>
             </a:r>
           </a:p>
           <a:p>
@@ -11197,19 +12135,8 @@
                 <a:latin typeface="Arial" panose="020B0604020202020204" pitchFamily="34" charset="0"/>
                 <a:cs typeface="Arial" panose="020B0604020202020204" pitchFamily="34" charset="0"/>
               </a:rPr>
-              <a:t>To </a:t>
-            </a:r>
-            <a:r>
-              <a:rPr lang="en-US" sz="1400" dirty="0" smtClean="0">
-                <a:latin typeface="Arial" panose="020B0604020202020204" pitchFamily="34" charset="0"/>
-                <a:cs typeface="Arial" panose="020B0604020202020204" pitchFamily="34" charset="0"/>
-              </a:rPr>
-              <a:t>create a factor, where the magnitude of the index will demonstrate fatalities normalized to injuries. </a:t>
-            </a:r>
-            <a:endParaRPr lang="en-US" sz="1400" dirty="0" smtClean="0">
-              <a:latin typeface="Arial" panose="020B0604020202020204" pitchFamily="34" charset="0"/>
-              <a:cs typeface="Arial" panose="020B0604020202020204" pitchFamily="34" charset="0"/>
-            </a:endParaRPr>
+              <a:t>To create a factor, where the magnitude of the index will demonstrate fatalities normalized to injuries. </a:t>
+            </a:r>
           </a:p>
           <a:p>
             <a:pPr marL="342900" indent="-342900">
@@ -11229,19 +12156,8 @@
                 <a:latin typeface="Arial" panose="020B0604020202020204" pitchFamily="34" charset="0"/>
                 <a:cs typeface="Arial" panose="020B0604020202020204" pitchFamily="34" charset="0"/>
               </a:rPr>
-              <a:t>To create a risk perception index.</a:t>
-            </a:r>
-            <a:r>
-              <a:rPr lang="en-US" sz="1400" dirty="0" smtClean="0">
-                <a:latin typeface="Arial" panose="020B0604020202020204" pitchFamily="34" charset="0"/>
-                <a:cs typeface="Arial" panose="020B0604020202020204" pitchFamily="34" charset="0"/>
-              </a:rPr>
-              <a:t> </a:t>
-            </a:r>
-            <a:endParaRPr lang="en-US" sz="1400" dirty="0" smtClean="0">
-              <a:latin typeface="Arial" panose="020B0604020202020204" pitchFamily="34" charset="0"/>
-              <a:cs typeface="Arial" panose="020B0604020202020204" pitchFamily="34" charset="0"/>
-            </a:endParaRPr>
+              <a:t>To create a risk perception index. </a:t>
+            </a:r>
           </a:p>
           <a:p>
             <a:pPr marL="0" indent="0">

</xml_diff>